<commit_message>
Work on slides, making the JMH-Runner independent of the main presentation project.
</commit_message>
<xml_diff>
--- a/doc/slides.pptx
+++ b/doc/slides.pptx
@@ -5,15 +5,20 @@
     <p:sldMasterId id="2147483648" r:id="rId1"/>
   </p:sldMasterIdLst>
   <p:notesMasterIdLst>
-    <p:notesMasterId r:id="rId8"/>
+    <p:notesMasterId r:id="rId13"/>
   </p:notesMasterIdLst>
   <p:sldIdLst>
     <p:sldId id="256" r:id="rId2"/>
     <p:sldId id="257" r:id="rId3"/>
     <p:sldId id="258" r:id="rId4"/>
-    <p:sldId id="259" r:id="rId5"/>
-    <p:sldId id="260" r:id="rId6"/>
-    <p:sldId id="261" r:id="rId7"/>
+    <p:sldId id="262" r:id="rId5"/>
+    <p:sldId id="259" r:id="rId6"/>
+    <p:sldId id="263" r:id="rId7"/>
+    <p:sldId id="260" r:id="rId8"/>
+    <p:sldId id="265" r:id="rId9"/>
+    <p:sldId id="266" r:id="rId10"/>
+    <p:sldId id="264" r:id="rId11"/>
+    <p:sldId id="261" r:id="rId12"/>
   </p:sldIdLst>
   <p:sldSz cx="12192000" cy="6858000"/>
   <p:notesSz cx="6858000" cy="9144000"/>
@@ -202,7 +207,7 @@
           <a:p>
             <a:fld id="{D5C9E47B-4149-4D78-AEA7-6A63220E520D}" type="datetimeFigureOut">
               <a:rPr lang="en-US" smtClean="0"/>
-              <a:t>1/12/2016</a:t>
+              <a:t>1/14/2016</a:t>
             </a:fld>
             <a:endParaRPr lang="en-US"/>
           </a:p>
@@ -520,9 +525,52 @@
             </a:r>
             <a:r>
               <a:rPr lang="en-US" baseline="0" dirty="0" smtClean="0"/>
-              <a:t> for MICRO benchmarks – i.e., which version of a method is faster</a:t>
-            </a:r>
-            <a:endParaRPr lang="en-US" dirty="0"/>
+              <a:t> for MICRO benchmarks – i.e., which version of a method is </a:t>
+            </a:r>
+            <a:r>
+              <a:rPr lang="en-US" baseline="0" dirty="0" smtClean="0"/>
+              <a:t>faster</a:t>
+            </a:r>
+          </a:p>
+          <a:p>
+            <a:endParaRPr lang="en-US" b="1" baseline="0" dirty="0" smtClean="0"/>
+          </a:p>
+          <a:p>
+            <a:r>
+              <a:rPr lang="en-US" b="1" dirty="0" smtClean="0"/>
+              <a:t>“Its distinctive advantage </a:t>
+            </a:r>
+            <a:r>
+              <a:rPr lang="en-US" dirty="0" smtClean="0"/>
+              <a:t>over other frameworks is that it is developed by the same guys in Oracle who implement the JIT. In particular I want to mention </a:t>
+            </a:r>
+            <a:r>
+              <a:rPr lang="en-US" dirty="0" smtClean="0">
+                <a:hlinkClick r:id="rId3"/>
+              </a:rPr>
+              <a:t>Aleksey </a:t>
+            </a:r>
+            <a:r>
+              <a:rPr lang="en-US" dirty="0" err="1" smtClean="0">
+                <a:hlinkClick r:id="rId3"/>
+              </a:rPr>
+              <a:t>Shipilev</a:t>
+            </a:r>
+            <a:r>
+              <a:rPr lang="en-US" dirty="0" smtClean="0">
+                <a:hlinkClick r:id="rId3"/>
+              </a:rPr>
+              <a:t> and his brilliant blog</a:t>
+            </a:r>
+            <a:r>
+              <a:rPr lang="en-US" dirty="0" smtClean="0"/>
+              <a:t>. </a:t>
+            </a:r>
+            <a:r>
+              <a:rPr lang="en-US" b="1" dirty="0" smtClean="0"/>
+              <a:t>JMH is likely to be in sync with the latest Oracle JRE changes, which makes its results very reliable. “</a:t>
+            </a:r>
+            <a:endParaRPr lang="en-US" b="1" dirty="0"/>
           </a:p>
         </p:txBody>
       </p:sp>
@@ -608,19 +656,13 @@
           <a:p>
             <a:r>
               <a:rPr lang="en-US" dirty="0" smtClean="0"/>
-              <a:t>Because </a:t>
-            </a:r>
-            <a:r>
-              <a:rPr lang="en-US" dirty="0" err="1" smtClean="0"/>
-              <a:t>Gradle</a:t>
-            </a:r>
-            <a:r>
-              <a:rPr lang="en-US" dirty="0" smtClean="0"/>
-              <a:t> is</a:t>
-            </a:r>
-            <a:r>
-              <a:rPr lang="en-US" baseline="0" dirty="0" smtClean="0"/>
-              <a:t> several hundred times </a:t>
+              <a:t>Setup is somewhat difficult because - </a:t>
+            </a:r>
+          </a:p>
+          <a:p>
+            <a:r>
+              <a:rPr lang="en-US" dirty="0" smtClean="0"/>
+              <a:t>In all cases, the key to using JMH is enabling the annotation- or bytecode-processors to generate the synthetic benchmark code</a:t>
             </a:r>
             <a:endParaRPr lang="en-US" dirty="0"/>
           </a:p>
@@ -652,7 +694,7 @@
     </p:spTree>
     <p:extLst>
       <p:ext uri="{BB962C8B-B14F-4D97-AF65-F5344CB8AC3E}">
-        <p14:creationId xmlns:p14="http://schemas.microsoft.com/office/powerpoint/2010/main" val="278153674"/>
+        <p14:creationId xmlns:p14="http://schemas.microsoft.com/office/powerpoint/2010/main" val="3160364319"/>
       </p:ext>
     </p:extLst>
   </p:cSld>
@@ -708,11 +750,193 @@
           <a:p>
             <a:r>
               <a:rPr lang="en-US" dirty="0" smtClean="0"/>
-              <a:t>Max</a:t>
+              <a:t>The</a:t>
             </a:r>
             <a:r>
               <a:rPr lang="en-US" baseline="0" dirty="0" smtClean="0"/>
-              <a:t> of 1 second – shows emphasis on “micro”-benchmarks</a:t>
+              <a:t> separate project business is </a:t>
+            </a:r>
+            <a:r>
+              <a:rPr lang="en-US" dirty="0" smtClean="0"/>
+              <a:t>JMH</a:t>
+            </a:r>
+            <a:r>
+              <a:rPr lang="en-US" baseline="0" dirty="0" smtClean="0"/>
+              <a:t> is trying to ensure that </a:t>
+            </a:r>
+            <a:r>
+              <a:rPr lang="en-US" dirty="0" smtClean="0"/>
+              <a:t>the benchmarks are </a:t>
+            </a:r>
+            <a:r>
+              <a:rPr lang="en-US" b="1" dirty="0" smtClean="0"/>
+              <a:t>correctly initialized and produce reliable results</a:t>
+            </a:r>
+            <a:r>
+              <a:rPr lang="en-US" dirty="0" smtClean="0"/>
+              <a:t>. </a:t>
+            </a:r>
+          </a:p>
+          <a:p>
+            <a:endParaRPr lang="en-US" dirty="0" smtClean="0"/>
+          </a:p>
+          <a:p>
+            <a:r>
+              <a:rPr lang="en-US" dirty="0" smtClean="0"/>
+              <a:t>Because </a:t>
+            </a:r>
+            <a:r>
+              <a:rPr lang="en-US" dirty="0" err="1" smtClean="0"/>
+              <a:t>Gradle</a:t>
+            </a:r>
+            <a:r>
+              <a:rPr lang="en-US" dirty="0" smtClean="0"/>
+              <a:t> is</a:t>
+            </a:r>
+            <a:r>
+              <a:rPr lang="en-US" baseline="0" dirty="0" smtClean="0"/>
+              <a:t> several hundred times </a:t>
+            </a:r>
+            <a:r>
+              <a:rPr lang="en-US" baseline="0" dirty="0" smtClean="0"/>
+              <a:t>better than JMH, I’ve setup a simple </a:t>
+            </a:r>
+            <a:r>
+              <a:rPr lang="en-US" baseline="0" dirty="0" err="1" smtClean="0"/>
+              <a:t>Gradle</a:t>
+            </a:r>
+            <a:r>
+              <a:rPr lang="en-US" baseline="0" dirty="0" smtClean="0"/>
+              <a:t> project which will run JMH for you – all you have to do is add your code to the </a:t>
+            </a:r>
+            <a:r>
+              <a:rPr lang="en-US" baseline="0" dirty="0" err="1" smtClean="0"/>
+              <a:t>src</a:t>
+            </a:r>
+            <a:r>
+              <a:rPr lang="en-US" baseline="0" dirty="0" smtClean="0"/>
+              <a:t>/</a:t>
+            </a:r>
+            <a:r>
+              <a:rPr lang="en-US" baseline="0" dirty="0" err="1" smtClean="0"/>
+              <a:t>jmh</a:t>
+            </a:r>
+            <a:r>
+              <a:rPr lang="en-US" baseline="0" dirty="0" smtClean="0"/>
+              <a:t>/java folder, and run.</a:t>
+            </a:r>
+          </a:p>
+          <a:p>
+            <a:endParaRPr lang="en-US" baseline="0" dirty="0" smtClean="0"/>
+          </a:p>
+          <a:p>
+            <a:pPr marL="0" marR="0" indent="0" algn="l" defTabSz="914400" rtl="0" eaLnBrk="1" fontAlgn="auto" latinLnBrk="0" hangingPunct="1">
+              <a:lnSpc>
+                <a:spcPct val="100000"/>
+              </a:lnSpc>
+              <a:spcBef>
+                <a:spcPts val="0"/>
+              </a:spcBef>
+              <a:spcAft>
+                <a:spcPts val="0"/>
+              </a:spcAft>
+              <a:buClrTx/>
+              <a:buSzTx/>
+              <a:buFontTx/>
+              <a:buNone/>
+              <a:tabLst/>
+              <a:defRPr/>
+            </a:pPr>
+            <a:r>
+              <a:rPr lang="en-US" dirty="0" smtClean="0"/>
+              <a:t>It is possible to run benchmarks from within an existing project, and even from within an IDE, however setup is more complex and the results are less reliable.</a:t>
+            </a:r>
+          </a:p>
+        </p:txBody>
+      </p:sp>
+      <p:sp>
+        <p:nvSpPr>
+          <p:cNvPr id="4" name="Slide Number Placeholder 3"/>
+          <p:cNvSpPr>
+            <a:spLocks noGrp="1"/>
+          </p:cNvSpPr>
+          <p:nvPr>
+            <p:ph type="sldNum" sz="quarter" idx="10"/>
+          </p:nvPr>
+        </p:nvSpPr>
+        <p:spPr/>
+        <p:txBody>
+          <a:bodyPr/>
+          <a:lstStyle/>
+          <a:p>
+            <a:fld id="{CFAD290B-5269-4E99-8A8A-8691B1EB0AE9}" type="slidenum">
+              <a:rPr lang="en-US" smtClean="0"/>
+              <a:t>5</a:t>
+            </a:fld>
+            <a:endParaRPr lang="en-US"/>
+          </a:p>
+        </p:txBody>
+      </p:sp>
+    </p:spTree>
+    <p:extLst>
+      <p:ext uri="{BB962C8B-B14F-4D97-AF65-F5344CB8AC3E}">
+        <p14:creationId xmlns:p14="http://schemas.microsoft.com/office/powerpoint/2010/main" val="278153674"/>
+      </p:ext>
+    </p:extLst>
+  </p:cSld>
+  <p:clrMapOvr>
+    <a:masterClrMapping/>
+  </p:clrMapOvr>
+</p:notes>
+</file>
+
+<file path=ppt/notesSlides/notesSlide4.xml><?xml version="1.0" encoding="utf-8"?>
+<p:notes xmlns:a="http://schemas.openxmlformats.org/drawingml/2006/main" xmlns:r="http://schemas.openxmlformats.org/officeDocument/2006/relationships" xmlns:p="http://schemas.openxmlformats.org/presentationml/2006/main">
+  <p:cSld>
+    <p:spTree>
+      <p:nvGrpSpPr>
+        <p:cNvPr id="1" name=""/>
+        <p:cNvGrpSpPr/>
+        <p:nvPr/>
+      </p:nvGrpSpPr>
+      <p:grpSpPr>
+        <a:xfrm>
+          <a:off x="0" y="0"/>
+          <a:ext cx="0" cy="0"/>
+          <a:chOff x="0" y="0"/>
+          <a:chExt cx="0" cy="0"/>
+        </a:xfrm>
+      </p:grpSpPr>
+      <p:sp>
+        <p:nvSpPr>
+          <p:cNvPr id="2" name="Slide Image Placeholder 1"/>
+          <p:cNvSpPr>
+            <a:spLocks noGrp="1" noRot="1" noChangeAspect="1"/>
+          </p:cNvSpPr>
+          <p:nvPr>
+            <p:ph type="sldImg"/>
+          </p:nvPr>
+        </p:nvSpPr>
+        <p:spPr/>
+      </p:sp>
+      <p:sp>
+        <p:nvSpPr>
+          <p:cNvPr id="3" name="Notes Placeholder 2"/>
+          <p:cNvSpPr>
+            <a:spLocks noGrp="1"/>
+          </p:cNvSpPr>
+          <p:nvPr>
+            <p:ph type="body" idx="1"/>
+          </p:nvPr>
+        </p:nvSpPr>
+        <p:spPr/>
+        <p:txBody>
+          <a:bodyPr/>
+          <a:lstStyle/>
+          <a:p>
+            <a:r>
+              <a:rPr lang="en-US" dirty="0" smtClean="0"/>
+              <a:t>When dealing with large projects, it is customary to keep the benchmarks in a separate subproject, which then depends on the tested modules via the usual build dependencies.</a:t>
             </a:r>
             <a:endParaRPr lang="en-US" dirty="0"/>
           </a:p>
@@ -735,7 +959,123 @@
           <a:p>
             <a:fld id="{CFAD290B-5269-4E99-8A8A-8691B1EB0AE9}" type="slidenum">
               <a:rPr lang="en-US" smtClean="0"/>
-              <a:t>5</a:t>
+              <a:t>6</a:t>
+            </a:fld>
+            <a:endParaRPr lang="en-US"/>
+          </a:p>
+        </p:txBody>
+      </p:sp>
+    </p:spTree>
+    <p:extLst>
+      <p:ext uri="{BB962C8B-B14F-4D97-AF65-F5344CB8AC3E}">
+        <p14:creationId xmlns:p14="http://schemas.microsoft.com/office/powerpoint/2010/main" val="3355601355"/>
+      </p:ext>
+    </p:extLst>
+  </p:cSld>
+  <p:clrMapOvr>
+    <a:masterClrMapping/>
+  </p:clrMapOvr>
+</p:notes>
+</file>
+
+<file path=ppt/notesSlides/notesSlide5.xml><?xml version="1.0" encoding="utf-8"?>
+<p:notes xmlns:a="http://schemas.openxmlformats.org/drawingml/2006/main" xmlns:r="http://schemas.openxmlformats.org/officeDocument/2006/relationships" xmlns:p="http://schemas.openxmlformats.org/presentationml/2006/main">
+  <p:cSld>
+    <p:spTree>
+      <p:nvGrpSpPr>
+        <p:cNvPr id="1" name=""/>
+        <p:cNvGrpSpPr/>
+        <p:nvPr/>
+      </p:nvGrpSpPr>
+      <p:grpSpPr>
+        <a:xfrm>
+          <a:off x="0" y="0"/>
+          <a:ext cx="0" cy="0"/>
+          <a:chOff x="0" y="0"/>
+          <a:chExt cx="0" cy="0"/>
+        </a:xfrm>
+      </p:grpSpPr>
+      <p:sp>
+        <p:nvSpPr>
+          <p:cNvPr id="2" name="Slide Image Placeholder 1"/>
+          <p:cNvSpPr>
+            <a:spLocks noGrp="1" noRot="1" noChangeAspect="1"/>
+          </p:cNvSpPr>
+          <p:nvPr>
+            <p:ph type="sldImg"/>
+          </p:nvPr>
+        </p:nvSpPr>
+        <p:spPr/>
+      </p:sp>
+      <p:sp>
+        <p:nvSpPr>
+          <p:cNvPr id="3" name="Notes Placeholder 2"/>
+          <p:cNvSpPr>
+            <a:spLocks noGrp="1"/>
+          </p:cNvSpPr>
+          <p:nvPr>
+            <p:ph type="body" idx="1"/>
+          </p:nvPr>
+        </p:nvSpPr>
+        <p:spPr/>
+        <p:txBody>
+          <a:bodyPr/>
+          <a:lstStyle/>
+          <a:p>
+            <a:r>
+              <a:rPr lang="en-US" dirty="0" smtClean="0"/>
+              <a:t>The</a:t>
+            </a:r>
+            <a:r>
+              <a:rPr lang="en-US" baseline="0" dirty="0" smtClean="0"/>
+              <a:t> default m</a:t>
+            </a:r>
+            <a:r>
+              <a:rPr lang="en-US" dirty="0" smtClean="0"/>
+              <a:t>ax</a:t>
+            </a:r>
+            <a:r>
+              <a:rPr lang="en-US" baseline="0" dirty="0" smtClean="0"/>
+              <a:t> </a:t>
+            </a:r>
+            <a:r>
+              <a:rPr lang="en-US" baseline="0" dirty="0" smtClean="0"/>
+              <a:t>of 1 second – shows </a:t>
+            </a:r>
+            <a:r>
+              <a:rPr lang="en-US" baseline="0" dirty="0" smtClean="0"/>
+              <a:t>the emphasis </a:t>
+            </a:r>
+            <a:r>
+              <a:rPr lang="en-US" baseline="0" dirty="0" smtClean="0"/>
+              <a:t>on “micro”-</a:t>
+            </a:r>
+            <a:r>
+              <a:rPr lang="en-US" baseline="0" dirty="0" smtClean="0"/>
+              <a:t>benchmarks.</a:t>
+            </a:r>
+            <a:endParaRPr lang="en-US" dirty="0"/>
+          </a:p>
+        </p:txBody>
+      </p:sp>
+      <p:sp>
+        <p:nvSpPr>
+          <p:cNvPr id="4" name="Slide Number Placeholder 3"/>
+          <p:cNvSpPr>
+            <a:spLocks noGrp="1"/>
+          </p:cNvSpPr>
+          <p:nvPr>
+            <p:ph type="sldNum" sz="quarter" idx="10"/>
+          </p:nvPr>
+        </p:nvSpPr>
+        <p:spPr/>
+        <p:txBody>
+          <a:bodyPr/>
+          <a:lstStyle/>
+          <a:p>
+            <a:fld id="{CFAD290B-5269-4E99-8A8A-8691B1EB0AE9}" type="slidenum">
+              <a:rPr lang="en-US" smtClean="0"/>
+              <a:t>7</a:t>
             </a:fld>
             <a:endParaRPr lang="en-US"/>
           </a:p>
@@ -745,6 +1085,184 @@
     <p:extLst>
       <p:ext uri="{BB962C8B-B14F-4D97-AF65-F5344CB8AC3E}">
         <p14:creationId xmlns:p14="http://schemas.microsoft.com/office/powerpoint/2010/main" val="1668912180"/>
+      </p:ext>
+    </p:extLst>
+  </p:cSld>
+  <p:clrMapOvr>
+    <a:masterClrMapping/>
+  </p:clrMapOvr>
+</p:notes>
+</file>
+
+<file path=ppt/notesSlides/notesSlide6.xml><?xml version="1.0" encoding="utf-8"?>
+<p:notes xmlns:a="http://schemas.openxmlformats.org/drawingml/2006/main" xmlns:r="http://schemas.openxmlformats.org/officeDocument/2006/relationships" xmlns:p="http://schemas.openxmlformats.org/presentationml/2006/main">
+  <p:cSld>
+    <p:spTree>
+      <p:nvGrpSpPr>
+        <p:cNvPr id="1" name=""/>
+        <p:cNvGrpSpPr/>
+        <p:nvPr/>
+      </p:nvGrpSpPr>
+      <p:grpSpPr>
+        <a:xfrm>
+          <a:off x="0" y="0"/>
+          <a:ext cx="0" cy="0"/>
+          <a:chOff x="0" y="0"/>
+          <a:chExt cx="0" cy="0"/>
+        </a:xfrm>
+      </p:grpSpPr>
+      <p:sp>
+        <p:nvSpPr>
+          <p:cNvPr id="2" name="Slide Image Placeholder 1"/>
+          <p:cNvSpPr>
+            <a:spLocks noGrp="1" noRot="1" noChangeAspect="1"/>
+          </p:cNvSpPr>
+          <p:nvPr>
+            <p:ph type="sldImg"/>
+          </p:nvPr>
+        </p:nvSpPr>
+        <p:spPr/>
+      </p:sp>
+      <p:sp>
+        <p:nvSpPr>
+          <p:cNvPr id="3" name="Notes Placeholder 2"/>
+          <p:cNvSpPr>
+            <a:spLocks noGrp="1"/>
+          </p:cNvSpPr>
+          <p:nvPr>
+            <p:ph type="body" idx="1"/>
+          </p:nvPr>
+        </p:nvSpPr>
+        <p:spPr/>
+        <p:txBody>
+          <a:bodyPr/>
+          <a:lstStyle/>
+          <a:p>
+            <a:r>
+              <a:rPr lang="en-US" dirty="0" smtClean="0"/>
+              <a:t>Results of running</a:t>
+            </a:r>
+            <a:r>
+              <a:rPr lang="en-US" baseline="0" dirty="0" smtClean="0"/>
+              <a:t> JMH are written to /build/reports – which is the default </a:t>
+            </a:r>
+            <a:r>
+              <a:rPr lang="en-US" baseline="0" dirty="0" err="1" smtClean="0"/>
+              <a:t>Gradle</a:t>
+            </a:r>
+            <a:r>
+              <a:rPr lang="en-US" baseline="0" dirty="0" smtClean="0"/>
+              <a:t> report output directory </a:t>
+            </a:r>
+            <a:r>
+              <a:rPr lang="en-US" baseline="0" dirty="0" smtClean="0"/>
+              <a:t>– </a:t>
+            </a:r>
+            <a:r>
+              <a:rPr lang="en-US" baseline="0" dirty="0" smtClean="0"/>
+              <a:t>/</a:t>
+            </a:r>
+            <a:r>
+              <a:rPr lang="en-US" baseline="0" dirty="0" err="1" smtClean="0"/>
+              <a:t>jmh</a:t>
+            </a:r>
+            <a:r>
+              <a:rPr lang="en-US" baseline="0" dirty="0" smtClean="0"/>
+              <a:t>/human.txt for human-readable output</a:t>
+            </a:r>
+            <a:endParaRPr lang="en-US" dirty="0" smtClean="0"/>
+          </a:p>
+          <a:p>
+            <a:endParaRPr lang="en-US" dirty="0" smtClean="0"/>
+          </a:p>
+          <a:p>
+            <a:r>
+              <a:rPr lang="en-US" dirty="0" smtClean="0"/>
+              <a:t>Alternately,</a:t>
+            </a:r>
+            <a:r>
+              <a:rPr lang="en-US" baseline="0" dirty="0" smtClean="0"/>
+              <a:t> this runner is setup as a Visual Studio Code project – which is in many ways a nicer editor/runner than eclipse for this sort of thing – I’d use eclipse for heavy java development, but for managing the project and running it, </a:t>
+            </a:r>
+            <a:r>
+              <a:rPr lang="en-US" baseline="0" dirty="0" err="1" smtClean="0"/>
+              <a:t>VSCode</a:t>
+            </a:r>
+            <a:r>
+              <a:rPr lang="en-US" baseline="0" dirty="0" smtClean="0"/>
+              <a:t> is nicer.  It calls out to </a:t>
+            </a:r>
+            <a:r>
+              <a:rPr lang="en-US" baseline="0" dirty="0" err="1" smtClean="0"/>
+              <a:t>Gradle</a:t>
+            </a:r>
+            <a:r>
+              <a:rPr lang="en-US" baseline="0" dirty="0" smtClean="0"/>
+              <a:t>.</a:t>
+            </a:r>
+          </a:p>
+          <a:p>
+            <a:r>
+              <a:rPr lang="en-US" b="1" baseline="0" dirty="0" smtClean="0"/>
+              <a:t>Ctrl-Shift-R </a:t>
+            </a:r>
+            <a:r>
+              <a:rPr lang="en-US" b="0" baseline="0" dirty="0" smtClean="0"/>
+              <a:t>to run tasks – </a:t>
+            </a:r>
+            <a:r>
+              <a:rPr lang="en-US" b="0" baseline="0" dirty="0" err="1" smtClean="0"/>
+              <a:t>jmh</a:t>
+            </a:r>
+            <a:r>
+              <a:rPr lang="en-US" b="0" baseline="0" dirty="0" smtClean="0"/>
+              <a:t> task</a:t>
+            </a:r>
+            <a:endParaRPr lang="en-US" b="1" baseline="0" dirty="0" smtClean="0"/>
+          </a:p>
+          <a:p>
+            <a:r>
+              <a:rPr lang="en-US" b="0" baseline="0" dirty="0" smtClean="0"/>
+              <a:t>Bindings defined in hidden .</a:t>
+            </a:r>
+            <a:r>
+              <a:rPr lang="en-US" b="0" baseline="0" dirty="0" err="1" smtClean="0"/>
+              <a:t>vscode</a:t>
+            </a:r>
+            <a:r>
+              <a:rPr lang="en-US" b="0" baseline="0" dirty="0" smtClean="0"/>
+              <a:t> directory</a:t>
+            </a:r>
+          </a:p>
+        </p:txBody>
+      </p:sp>
+      <p:sp>
+        <p:nvSpPr>
+          <p:cNvPr id="4" name="Slide Number Placeholder 3"/>
+          <p:cNvSpPr>
+            <a:spLocks noGrp="1"/>
+          </p:cNvSpPr>
+          <p:nvPr>
+            <p:ph type="sldNum" sz="quarter" idx="10"/>
+          </p:nvPr>
+        </p:nvSpPr>
+        <p:spPr/>
+        <p:txBody>
+          <a:bodyPr/>
+          <a:lstStyle/>
+          <a:p>
+            <a:fld id="{CFAD290B-5269-4E99-8A8A-8691B1EB0AE9}" type="slidenum">
+              <a:rPr lang="en-US" smtClean="0"/>
+              <a:t>8</a:t>
+            </a:fld>
+            <a:endParaRPr lang="en-US"/>
+          </a:p>
+        </p:txBody>
+      </p:sp>
+    </p:spTree>
+    <p:extLst>
+      <p:ext uri="{BB962C8B-B14F-4D97-AF65-F5344CB8AC3E}">
+        <p14:creationId xmlns:p14="http://schemas.microsoft.com/office/powerpoint/2010/main" val="1506391699"/>
       </p:ext>
     </p:extLst>
   </p:cSld>
@@ -885,7 +1403,7 @@
           <a:p>
             <a:fld id="{389CBC56-3CF8-4B9B-874C-BFFEBE1619EE}" type="datetimeFigureOut">
               <a:rPr lang="en-US" smtClean="0"/>
-              <a:t>1/12/2016</a:t>
+              <a:t>1/14/2016</a:t>
             </a:fld>
             <a:endParaRPr lang="en-US"/>
           </a:p>
@@ -1055,7 +1573,7 @@
           <a:p>
             <a:fld id="{389CBC56-3CF8-4B9B-874C-BFFEBE1619EE}" type="datetimeFigureOut">
               <a:rPr lang="en-US" smtClean="0"/>
-              <a:t>1/12/2016</a:t>
+              <a:t>1/14/2016</a:t>
             </a:fld>
             <a:endParaRPr lang="en-US"/>
           </a:p>
@@ -1235,7 +1753,7 @@
           <a:p>
             <a:fld id="{389CBC56-3CF8-4B9B-874C-BFFEBE1619EE}" type="datetimeFigureOut">
               <a:rPr lang="en-US" smtClean="0"/>
-              <a:t>1/12/2016</a:t>
+              <a:t>1/14/2016</a:t>
             </a:fld>
             <a:endParaRPr lang="en-US"/>
           </a:p>
@@ -1405,7 +1923,7 @@
           <a:p>
             <a:fld id="{389CBC56-3CF8-4B9B-874C-BFFEBE1619EE}" type="datetimeFigureOut">
               <a:rPr lang="en-US" smtClean="0"/>
-              <a:t>1/12/2016</a:t>
+              <a:t>1/14/2016</a:t>
             </a:fld>
             <a:endParaRPr lang="en-US"/>
           </a:p>
@@ -1651,7 +2169,7 @@
           <a:p>
             <a:fld id="{389CBC56-3CF8-4B9B-874C-BFFEBE1619EE}" type="datetimeFigureOut">
               <a:rPr lang="en-US" smtClean="0"/>
-              <a:t>1/12/2016</a:t>
+              <a:t>1/14/2016</a:t>
             </a:fld>
             <a:endParaRPr lang="en-US"/>
           </a:p>
@@ -1883,7 +2401,7 @@
           <a:p>
             <a:fld id="{389CBC56-3CF8-4B9B-874C-BFFEBE1619EE}" type="datetimeFigureOut">
               <a:rPr lang="en-US" smtClean="0"/>
-              <a:t>1/12/2016</a:t>
+              <a:t>1/14/2016</a:t>
             </a:fld>
             <a:endParaRPr lang="en-US"/>
           </a:p>
@@ -2250,7 +2768,7 @@
           <a:p>
             <a:fld id="{389CBC56-3CF8-4B9B-874C-BFFEBE1619EE}" type="datetimeFigureOut">
               <a:rPr lang="en-US" smtClean="0"/>
-              <a:t>1/12/2016</a:t>
+              <a:t>1/14/2016</a:t>
             </a:fld>
             <a:endParaRPr lang="en-US"/>
           </a:p>
@@ -2368,7 +2886,7 @@
           <a:p>
             <a:fld id="{389CBC56-3CF8-4B9B-874C-BFFEBE1619EE}" type="datetimeFigureOut">
               <a:rPr lang="en-US" smtClean="0"/>
-              <a:t>1/12/2016</a:t>
+              <a:t>1/14/2016</a:t>
             </a:fld>
             <a:endParaRPr lang="en-US"/>
           </a:p>
@@ -2463,7 +2981,7 @@
           <a:p>
             <a:fld id="{389CBC56-3CF8-4B9B-874C-BFFEBE1619EE}" type="datetimeFigureOut">
               <a:rPr lang="en-US" smtClean="0"/>
-              <a:t>1/12/2016</a:t>
+              <a:t>1/14/2016</a:t>
             </a:fld>
             <a:endParaRPr lang="en-US"/>
           </a:p>
@@ -2740,7 +3258,7 @@
           <a:p>
             <a:fld id="{389CBC56-3CF8-4B9B-874C-BFFEBE1619EE}" type="datetimeFigureOut">
               <a:rPr lang="en-US" smtClean="0"/>
-              <a:t>1/12/2016</a:t>
+              <a:t>1/14/2016</a:t>
             </a:fld>
             <a:endParaRPr lang="en-US"/>
           </a:p>
@@ -2993,7 +3511,7 @@
           <a:p>
             <a:fld id="{389CBC56-3CF8-4B9B-874C-BFFEBE1619EE}" type="datetimeFigureOut">
               <a:rPr lang="en-US" smtClean="0"/>
-              <a:t>1/12/2016</a:t>
+              <a:t>1/14/2016</a:t>
             </a:fld>
             <a:endParaRPr lang="en-US"/>
           </a:p>
@@ -3206,7 +3724,7 @@
           <a:p>
             <a:fld id="{389CBC56-3CF8-4B9B-874C-BFFEBE1619EE}" type="datetimeFigureOut">
               <a:rPr lang="en-US" smtClean="0"/>
-              <a:t>1/12/2016</a:t>
+              <a:t>1/14/2016</a:t>
             </a:fld>
             <a:endParaRPr lang="en-US"/>
           </a:p>
@@ -3662,6 +4180,296 @@
 </p:sld>
 </file>
 
+<file path=ppt/slides/slide10.xml><?xml version="1.0" encoding="utf-8"?>
+<p:sld xmlns:a="http://schemas.openxmlformats.org/drawingml/2006/main" xmlns:r="http://schemas.openxmlformats.org/officeDocument/2006/relationships" xmlns:p="http://schemas.openxmlformats.org/presentationml/2006/main">
+  <p:cSld>
+    <p:spTree>
+      <p:nvGrpSpPr>
+        <p:cNvPr id="1" name=""/>
+        <p:cNvGrpSpPr/>
+        <p:nvPr/>
+      </p:nvGrpSpPr>
+      <p:grpSpPr>
+        <a:xfrm>
+          <a:off x="0" y="0"/>
+          <a:ext cx="0" cy="0"/>
+          <a:chOff x="0" y="0"/>
+          <a:chExt cx="0" cy="0"/>
+        </a:xfrm>
+      </p:grpSpPr>
+      <p:sp>
+        <p:nvSpPr>
+          <p:cNvPr id="2" name="Title 1"/>
+          <p:cNvSpPr>
+            <a:spLocks noGrp="1"/>
+          </p:cNvSpPr>
+          <p:nvPr>
+            <p:ph type="title"/>
+          </p:nvPr>
+        </p:nvSpPr>
+        <p:spPr/>
+        <p:txBody>
+          <a:bodyPr/>
+          <a:lstStyle/>
+          <a:p>
+            <a:r>
+              <a:rPr lang="en-US" dirty="0" smtClean="0"/>
+              <a:t>Further Considerations</a:t>
+            </a:r>
+            <a:endParaRPr lang="en-US" dirty="0"/>
+          </a:p>
+        </p:txBody>
+      </p:sp>
+      <p:sp>
+        <p:nvSpPr>
+          <p:cNvPr id="3" name="Content Placeholder 2"/>
+          <p:cNvSpPr>
+            <a:spLocks noGrp="1"/>
+          </p:cNvSpPr>
+          <p:nvPr>
+            <p:ph idx="1"/>
+          </p:nvPr>
+        </p:nvSpPr>
+        <p:spPr/>
+        <p:txBody>
+          <a:bodyPr/>
+          <a:lstStyle/>
+          <a:p>
+            <a:r>
+              <a:rPr lang="en-US" b="1" dirty="0"/>
+              <a:t>JMH annotations </a:t>
+            </a:r>
+            <a:r>
+              <a:rPr lang="en-US" b="1" dirty="0" err="1"/>
+              <a:t>Javadocs</a:t>
+            </a:r>
+            <a:r>
+              <a:rPr lang="en-US" b="1" dirty="0"/>
+              <a:t> and Samples are essential </a:t>
+            </a:r>
+            <a:r>
+              <a:rPr lang="en-US" b="1" dirty="0" smtClean="0"/>
+              <a:t>reading</a:t>
+            </a:r>
+            <a:endParaRPr lang="en-US" dirty="0" smtClean="0"/>
+          </a:p>
+          <a:p>
+            <a:pPr lvl="1"/>
+            <a:r>
+              <a:rPr lang="en-US" dirty="0" smtClean="0"/>
+              <a:t>Follow </a:t>
+            </a:r>
+            <a:r>
+              <a:rPr lang="en-US" dirty="0"/>
+              <a:t>the </a:t>
+            </a:r>
+            <a:r>
+              <a:rPr lang="en-US" dirty="0">
+                <a:hlinkClick r:id="rId2"/>
+              </a:rPr>
+              <a:t>JMH samples</a:t>
+            </a:r>
+            <a:r>
+              <a:rPr lang="en-US" dirty="0"/>
+              <a:t> to get familiar with the API, use cases, culprits, and pitfalls </a:t>
+            </a:r>
+          </a:p>
+          <a:p>
+            <a:r>
+              <a:rPr lang="en-US" b="1" dirty="0" smtClean="0"/>
+              <a:t>Your </a:t>
+            </a:r>
+            <a:r>
+              <a:rPr lang="en-US" b="1" dirty="0"/>
+              <a:t>benchmarks should be </a:t>
+            </a:r>
+            <a:r>
+              <a:rPr lang="en-US" b="1" dirty="0" smtClean="0"/>
+              <a:t>peer-reviewed</a:t>
+            </a:r>
+            <a:endParaRPr lang="en-US" dirty="0" smtClean="0"/>
+          </a:p>
+          <a:p>
+            <a:pPr lvl="1"/>
+            <a:r>
+              <a:rPr lang="en-US" dirty="0" smtClean="0"/>
+              <a:t>JMH does </a:t>
+            </a:r>
+            <a:r>
+              <a:rPr lang="en-US" b="1" dirty="0" smtClean="0"/>
+              <a:t>NOT</a:t>
+            </a:r>
+            <a:r>
+              <a:rPr lang="en-US" dirty="0" smtClean="0"/>
+              <a:t> magically </a:t>
+            </a:r>
+            <a:r>
+              <a:rPr lang="en-US" dirty="0"/>
+              <a:t>free you from considering benchmarking </a:t>
+            </a:r>
+            <a:r>
+              <a:rPr lang="en-US" dirty="0" smtClean="0"/>
+              <a:t>pitfalls</a:t>
+            </a:r>
+          </a:p>
+          <a:p>
+            <a:pPr lvl="1"/>
+            <a:r>
+              <a:rPr lang="en-US" dirty="0" smtClean="0"/>
+              <a:t>“We </a:t>
+            </a:r>
+            <a:r>
+              <a:rPr lang="en-US" dirty="0"/>
+              <a:t>only promise to make avoiding them easier, not </a:t>
+            </a:r>
+            <a:r>
+              <a:rPr lang="en-US" dirty="0" smtClean="0"/>
+              <a:t>avoid </a:t>
+            </a:r>
+            <a:r>
+              <a:rPr lang="en-US" dirty="0"/>
+              <a:t>them completely</a:t>
+            </a:r>
+            <a:r>
+              <a:rPr lang="en-US" dirty="0" smtClean="0"/>
+              <a:t>.”</a:t>
+            </a:r>
+            <a:endParaRPr lang="en-US" dirty="0"/>
+          </a:p>
+          <a:p>
+            <a:endParaRPr lang="en-US" dirty="0"/>
+          </a:p>
+        </p:txBody>
+      </p:sp>
+    </p:spTree>
+    <p:extLst>
+      <p:ext uri="{BB962C8B-B14F-4D97-AF65-F5344CB8AC3E}">
+        <p14:creationId xmlns:p14="http://schemas.microsoft.com/office/powerpoint/2010/main" val="347531558"/>
+      </p:ext>
+    </p:extLst>
+  </p:cSld>
+  <p:clrMapOvr>
+    <a:masterClrMapping/>
+  </p:clrMapOvr>
+</p:sld>
+</file>
+
+<file path=ppt/slides/slide11.xml><?xml version="1.0" encoding="utf-8"?>
+<p:sld xmlns:a="http://schemas.openxmlformats.org/drawingml/2006/main" xmlns:r="http://schemas.openxmlformats.org/officeDocument/2006/relationships" xmlns:p="http://schemas.openxmlformats.org/presentationml/2006/main">
+  <p:cSld>
+    <p:spTree>
+      <p:nvGrpSpPr>
+        <p:cNvPr id="1" name=""/>
+        <p:cNvGrpSpPr/>
+        <p:nvPr/>
+      </p:nvGrpSpPr>
+      <p:grpSpPr>
+        <a:xfrm>
+          <a:off x="0" y="0"/>
+          <a:ext cx="0" cy="0"/>
+          <a:chOff x="0" y="0"/>
+          <a:chExt cx="0" cy="0"/>
+        </a:xfrm>
+      </p:grpSpPr>
+      <p:sp>
+        <p:nvSpPr>
+          <p:cNvPr id="2" name="Title 1"/>
+          <p:cNvSpPr>
+            <a:spLocks noGrp="1"/>
+          </p:cNvSpPr>
+          <p:nvPr>
+            <p:ph type="title"/>
+          </p:nvPr>
+        </p:nvSpPr>
+        <p:spPr/>
+        <p:txBody>
+          <a:bodyPr/>
+          <a:lstStyle/>
+          <a:p>
+            <a:r>
+              <a:rPr lang="en-US" dirty="0" smtClean="0"/>
+              <a:t>References</a:t>
+            </a:r>
+            <a:endParaRPr lang="en-US" dirty="0"/>
+          </a:p>
+        </p:txBody>
+      </p:sp>
+      <p:sp>
+        <p:nvSpPr>
+          <p:cNvPr id="3" name="Content Placeholder 2"/>
+          <p:cNvSpPr>
+            <a:spLocks noGrp="1"/>
+          </p:cNvSpPr>
+          <p:nvPr>
+            <p:ph idx="1"/>
+          </p:nvPr>
+        </p:nvSpPr>
+        <p:spPr/>
+        <p:txBody>
+          <a:bodyPr/>
+          <a:lstStyle/>
+          <a:p>
+            <a:r>
+              <a:rPr lang="en-US" dirty="0">
+                <a:hlinkClick r:id="rId2"/>
+              </a:rPr>
+              <a:t>http://</a:t>
+            </a:r>
+            <a:r>
+              <a:rPr lang="en-US" dirty="0" smtClean="0">
+                <a:hlinkClick r:id="rId2"/>
+              </a:rPr>
+              <a:t>www.oracle.com/technetwork/articles/java/architect-benchmarking-2266277.html</a:t>
+            </a:r>
+            <a:endParaRPr lang="en-US" dirty="0" smtClean="0"/>
+          </a:p>
+          <a:p>
+            <a:pPr lvl="1"/>
+            <a:r>
+              <a:rPr lang="en-US" dirty="0" smtClean="0"/>
+              <a:t>The basis for this whole </a:t>
+            </a:r>
+            <a:r>
+              <a:rPr lang="en-US" dirty="0" smtClean="0"/>
+              <a:t>presentation</a:t>
+            </a:r>
+          </a:p>
+          <a:p>
+            <a:pPr lvl="1"/>
+            <a:endParaRPr lang="en-US" dirty="0" smtClean="0"/>
+          </a:p>
+          <a:p>
+            <a:r>
+              <a:rPr lang="en-US" dirty="0" smtClean="0"/>
+              <a:t>Background</a:t>
+            </a:r>
+            <a:endParaRPr lang="en-US" dirty="0"/>
+          </a:p>
+          <a:p>
+            <a:pPr lvl="1"/>
+            <a:r>
+              <a:rPr lang="en-US" dirty="0">
+                <a:hlinkClick r:id="rId3"/>
+              </a:rPr>
+              <a:t>http://java-performance.info/jmh/</a:t>
+            </a:r>
+            <a:endParaRPr lang="en-US" dirty="0"/>
+          </a:p>
+        </p:txBody>
+      </p:sp>
+    </p:spTree>
+    <p:extLst>
+      <p:ext uri="{BB962C8B-B14F-4D97-AF65-F5344CB8AC3E}">
+        <p14:creationId xmlns:p14="http://schemas.microsoft.com/office/powerpoint/2010/main" val="1280026601"/>
+      </p:ext>
+    </p:extLst>
+  </p:cSld>
+  <p:clrMapOvr>
+    <a:masterClrMapping/>
+  </p:clrMapOvr>
+</p:sld>
+</file>
+
 <file path=ppt/slides/slide2.xml><?xml version="1.0" encoding="utf-8"?>
 <p:sld xmlns:a="http://schemas.openxmlformats.org/drawingml/2006/main" xmlns:r="http://schemas.openxmlformats.org/officeDocument/2006/relationships" xmlns:p="http://schemas.openxmlformats.org/presentationml/2006/main">
   <p:cSld>
@@ -3803,14 +4611,17 @@
         <p:spPr/>
         <p:txBody>
           <a:bodyPr>
-            <a:normAutofit lnSpcReduction="10000"/>
+            <a:normAutofit fontScale="92500" lnSpcReduction="10000"/>
           </a:bodyPr>
           <a:lstStyle/>
           <a:p>
             <a:r>
-              <a:rPr lang="en-US" dirty="0"/>
+              <a:rPr lang="en-US" dirty="0" smtClean="0">
+                <a:hlinkClick r:id="rId3"/>
+              </a:rPr>
               <a:t>http://openjdk.java.net/projects/code-tools/jmh/</a:t>
             </a:r>
+            <a:endParaRPr lang="en-US" dirty="0" smtClean="0"/>
           </a:p>
           <a:p>
             <a:r>
@@ -3822,7 +4633,11 @@
             <a:pPr lvl="1"/>
             <a:r>
               <a:rPr lang="en-US" dirty="0" smtClean="0"/>
-              <a:t>Does not prevent all pitfalls, but can at least mitigate MOST of them</a:t>
+              <a:t>Does </a:t>
+            </a:r>
+            <a:r>
+              <a:rPr lang="en-US" dirty="0" smtClean="0"/>
+              <a:t>not prevent all pitfalls, but can at least mitigate MOST of them</a:t>
             </a:r>
           </a:p>
           <a:p>
@@ -3847,8 +4662,20 @@
             <a:pPr lvl="1"/>
             <a:r>
               <a:rPr lang="en-US" dirty="0" smtClean="0"/>
-              <a:t>Active development (1.11.2 released October 2015)</a:t>
-            </a:r>
+              <a:t>Active development (1.11.2 released October 2015</a:t>
+            </a:r>
+            <a:r>
+              <a:rPr lang="en-US" dirty="0" smtClean="0"/>
+              <a:t>)</a:t>
+            </a:r>
+          </a:p>
+          <a:p>
+            <a:pPr lvl="1"/>
+            <a:r>
+              <a:rPr lang="en-US" dirty="0" smtClean="0"/>
+              <a:t>Developed by same guys in Oracle who maintain the JIT</a:t>
+            </a:r>
+            <a:endParaRPr lang="en-US" dirty="0" smtClean="0"/>
           </a:p>
           <a:p>
             <a:r>
@@ -3918,7 +4745,7 @@
           <a:p>
             <a:r>
               <a:rPr lang="en-US" dirty="0" smtClean="0"/>
-              <a:t>JMH and Maven</a:t>
+              <a:t>JMH – How it Works</a:t>
             </a:r>
             <a:endParaRPr lang="en-US" dirty="0"/>
           </a:p>
@@ -3939,67 +4766,14 @@
           <a:bodyPr/>
           <a:lstStyle/>
           <a:p>
-            <a:r>
-              <a:rPr lang="en-US" dirty="0" smtClean="0"/>
-              <a:t>Setup as a Maven project</a:t>
-            </a:r>
-          </a:p>
-          <a:p>
-            <a:r>
-              <a:rPr lang="en-US" dirty="0" smtClean="0"/>
-              <a:t>#$*@ Maven – use </a:t>
-            </a:r>
-            <a:r>
-              <a:rPr lang="en-US" dirty="0" err="1" smtClean="0"/>
-              <a:t>Gradle</a:t>
-            </a:r>
-            <a:r>
-              <a:rPr lang="en-US" dirty="0" smtClean="0"/>
-              <a:t> instead</a:t>
-            </a:r>
-          </a:p>
-          <a:p>
-            <a:pPr lvl="1"/>
-            <a:r>
-              <a:rPr lang="en-US" dirty="0">
-                <a:hlinkClick r:id="rId3"/>
-              </a:rPr>
-              <a:t>https://</a:t>
-            </a:r>
-            <a:r>
-              <a:rPr lang="en-US" dirty="0" smtClean="0">
-                <a:hlinkClick r:id="rId3"/>
-              </a:rPr>
-              <a:t>github.com/melix/jmh-gradle-plugin</a:t>
-            </a:r>
-            <a:endParaRPr lang="en-US" dirty="0" smtClean="0"/>
-          </a:p>
-          <a:p>
-            <a:pPr lvl="1"/>
-            <a:r>
-              <a:rPr lang="en-US" dirty="0" smtClean="0"/>
-              <a:t>“The </a:t>
-            </a:r>
-            <a:r>
-              <a:rPr lang="en-US" dirty="0" err="1"/>
-              <a:t>jmh</a:t>
-            </a:r>
-            <a:r>
-              <a:rPr lang="en-US" dirty="0"/>
-              <a:t> plugin makes it easy to test existing sources without having to create a separate project for this</a:t>
-            </a:r>
-            <a:r>
-              <a:rPr lang="en-US" dirty="0" smtClean="0"/>
-              <a:t>.”</a:t>
-            </a:r>
-            <a:endParaRPr lang="en-US" dirty="0"/>
+            <a:endParaRPr lang="en-US"/>
           </a:p>
         </p:txBody>
       </p:sp>
     </p:spTree>
     <p:extLst>
       <p:ext uri="{BB962C8B-B14F-4D97-AF65-F5344CB8AC3E}">
-        <p14:creationId xmlns:p14="http://schemas.microsoft.com/office/powerpoint/2010/main" val="3570349981"/>
+        <p14:creationId xmlns:p14="http://schemas.microsoft.com/office/powerpoint/2010/main" val="1717836692"/>
       </p:ext>
     </p:extLst>
   </p:cSld>
@@ -4043,7 +4817,7 @@
           <a:p>
             <a:r>
               <a:rPr lang="en-US" dirty="0" smtClean="0"/>
-              <a:t>JMH Defaults</a:t>
+              <a:t>JMH – Setup</a:t>
             </a:r>
             <a:endParaRPr lang="en-US" dirty="0"/>
           </a:p>
@@ -4061,73 +4835,149 @@
         </p:nvSpPr>
         <p:spPr/>
         <p:txBody>
-          <a:bodyPr/>
-          <a:lstStyle/>
-          <a:p>
-            <a:r>
-              <a:rPr lang="en-US" dirty="0" smtClean="0"/>
-              <a:t>Each benchmark run 20 warm-up rounds (max 1 second each)</a:t>
-            </a:r>
-          </a:p>
-          <a:p>
-            <a:r>
-              <a:rPr lang="en-US" dirty="0" smtClean="0"/>
-              <a:t>Then 20 measurement rounds (max 1 second each)</a:t>
-            </a:r>
-          </a:p>
-          <a:p>
-            <a:r>
-              <a:rPr lang="en-US" dirty="0" smtClean="0"/>
-              <a:t>Launches a new JVM 10 times for running each benchmark</a:t>
-            </a:r>
-          </a:p>
-          <a:p>
-            <a:r>
-              <a:rPr lang="en-US" dirty="0" smtClean="0"/>
-              <a:t>Command line flags and source annotations can customize this per benchmark</a:t>
+          <a:bodyPr>
+            <a:normAutofit fontScale="92500"/>
+          </a:bodyPr>
+          <a:lstStyle/>
+          <a:p>
+            <a:r>
+              <a:rPr lang="en-US" dirty="0" smtClean="0"/>
+              <a:t>Setup as a Maven </a:t>
+            </a:r>
+            <a:r>
+              <a:rPr lang="en-US" dirty="0" smtClean="0"/>
+              <a:t>project</a:t>
             </a:r>
           </a:p>
           <a:p>
             <a:pPr lvl="1"/>
             <a:r>
               <a:rPr lang="en-US" dirty="0" smtClean="0"/>
-              <a:t>Running through </a:t>
-            </a:r>
-            <a:r>
-              <a:rPr lang="en-US" dirty="0" err="1" smtClean="0"/>
-              <a:t>Gradle</a:t>
-            </a:r>
-            <a:r>
-              <a:rPr lang="en-US" dirty="0" smtClean="0"/>
-              <a:t> – configurable in build script</a:t>
-            </a:r>
-          </a:p>
-          <a:p>
-            <a:pPr lvl="1"/>
+              <a:t>“</a:t>
+            </a:r>
+            <a:r>
+              <a:rPr lang="en-US" dirty="0"/>
+              <a:t>The recommended way to run a JMH benchmark is to use </a:t>
+            </a:r>
             <a:r>
               <a:rPr lang="en-US" dirty="0">
                 <a:hlinkClick r:id="rId3"/>
               </a:rPr>
+              <a:t>Maven</a:t>
+            </a:r>
+            <a:r>
+              <a:rPr lang="en-US" dirty="0"/>
+              <a:t> to setup a standalone project that depends on the jar files of your </a:t>
+            </a:r>
+            <a:r>
+              <a:rPr lang="en-US" dirty="0" smtClean="0"/>
+              <a:t>application”</a:t>
+            </a:r>
+            <a:endParaRPr lang="en-US" dirty="0" smtClean="0"/>
+          </a:p>
+          <a:p>
+            <a:r>
+              <a:rPr lang="en-US" dirty="0" smtClean="0"/>
+              <a:t>#$*@ Maven – use </a:t>
+            </a:r>
+            <a:r>
+              <a:rPr lang="en-US" dirty="0" err="1" smtClean="0"/>
+              <a:t>Gradle</a:t>
+            </a:r>
+            <a:r>
+              <a:rPr lang="en-US" dirty="0" smtClean="0"/>
+              <a:t> </a:t>
+            </a:r>
+            <a:r>
+              <a:rPr lang="en-US" dirty="0" smtClean="0"/>
+              <a:t>instead	</a:t>
+            </a:r>
+            <a:endParaRPr lang="en-US" dirty="0" smtClean="0"/>
+          </a:p>
+          <a:p>
+            <a:pPr lvl="1"/>
+            <a:r>
+              <a:rPr lang="en-US" dirty="0">
+                <a:hlinkClick r:id="rId4"/>
+              </a:rPr>
               <a:t>https://</a:t>
             </a:r>
             <a:r>
               <a:rPr lang="en-US" dirty="0" smtClean="0">
-                <a:hlinkClick r:id="rId3"/>
+                <a:hlinkClick r:id="rId4"/>
               </a:rPr>
-              <a:t>github.com/melix/jmh-gradle-plugin#configuration-options</a:t>
+              <a:t>github.com/melix/jmh-gradle-plugin</a:t>
             </a:r>
             <a:endParaRPr lang="en-US" dirty="0" smtClean="0"/>
           </a:p>
           <a:p>
             <a:pPr lvl="1"/>
+            <a:r>
+              <a:rPr lang="en-US" dirty="0" smtClean="0"/>
+              <a:t>“The </a:t>
+            </a:r>
+            <a:r>
+              <a:rPr lang="en-US" dirty="0" err="1"/>
+              <a:t>jmh</a:t>
+            </a:r>
+            <a:r>
+              <a:rPr lang="en-US" dirty="0"/>
+              <a:t> plugin makes it easy to test existing sources without having to create a separate project for this</a:t>
+            </a:r>
+            <a:r>
+              <a:rPr lang="en-US" dirty="0" smtClean="0"/>
+              <a:t>.”</a:t>
+            </a:r>
             <a:endParaRPr lang="en-US" dirty="0"/>
+          </a:p>
+          <a:p>
+            <a:r>
+              <a:rPr lang="en-US" dirty="0" smtClean="0"/>
+              <a:t>Runner project already setup – just add the code you want to benchmark</a:t>
+            </a:r>
+          </a:p>
+          <a:p>
+            <a:pPr lvl="1"/>
+            <a:r>
+              <a:rPr lang="en-US" dirty="0" smtClean="0"/>
+              <a:t>Type “</a:t>
+            </a:r>
+            <a:r>
+              <a:rPr lang="en-US" dirty="0" err="1" smtClean="0"/>
+              <a:t>gradle</a:t>
+            </a:r>
+            <a:r>
+              <a:rPr lang="en-US" dirty="0" smtClean="0"/>
+              <a:t> </a:t>
+            </a:r>
+            <a:r>
+              <a:rPr lang="en-US" dirty="0" err="1" smtClean="0"/>
+              <a:t>jmh</a:t>
+            </a:r>
+            <a:r>
+              <a:rPr lang="en-US" dirty="0" smtClean="0"/>
+              <a:t>” and then wait for results</a:t>
+            </a:r>
+          </a:p>
+          <a:p>
+            <a:r>
+              <a:rPr lang="en-US" dirty="0" smtClean="0"/>
+              <a:t>Possible to run within an existing project, within an IDE</a:t>
+            </a:r>
+          </a:p>
+          <a:p>
+            <a:pPr lvl="1"/>
+            <a:r>
+              <a:rPr lang="en-US" dirty="0" smtClean="0"/>
+              <a:t>Not recommended</a:t>
+            </a:r>
           </a:p>
         </p:txBody>
       </p:sp>
     </p:spTree>
     <p:extLst>
       <p:ext uri="{BB962C8B-B14F-4D97-AF65-F5344CB8AC3E}">
-        <p14:creationId xmlns:p14="http://schemas.microsoft.com/office/powerpoint/2010/main" val="2162986850"/>
+        <p14:creationId xmlns:p14="http://schemas.microsoft.com/office/powerpoint/2010/main" val="3570349981"/>
       </p:ext>
     </p:extLst>
   </p:cSld>
@@ -4170,8 +5020,12 @@
           <a:lstStyle/>
           <a:p>
             <a:r>
-              <a:rPr lang="en-US" dirty="0" smtClean="0"/>
-              <a:t>References</a:t>
+              <a:rPr lang="en-US" dirty="0"/>
+              <a:t>JMH – </a:t>
+            </a:r>
+            <a:r>
+              <a:rPr lang="en-US" dirty="0" smtClean="0"/>
+              <a:t>Setup (2)</a:t>
             </a:r>
             <a:endParaRPr lang="en-US" dirty="0"/>
           </a:p>
@@ -4193,37 +5047,379 @@
           <a:lstStyle/>
           <a:p>
             <a:r>
-              <a:rPr lang="en-US" dirty="0">
-                <a:hlinkClick r:id="rId2"/>
-              </a:rPr>
-              <a:t>http://</a:t>
-            </a:r>
-            <a:r>
-              <a:rPr lang="en-US" dirty="0" smtClean="0">
-                <a:hlinkClick r:id="rId2"/>
-              </a:rPr>
-              <a:t>www.oracle.com/technetwork/articles/java/architect-benchmarking-2266277.html</a:t>
-            </a:r>
-            <a:endParaRPr lang="en-US" dirty="0" smtClean="0"/>
+              <a:rPr lang="en-US" dirty="0" smtClean="0"/>
+              <a:t>Keep code and benchmarks separate</a:t>
+            </a:r>
+          </a:p>
+          <a:p>
+            <a:r>
+              <a:rPr lang="en-US" dirty="0" smtClean="0"/>
+              <a:t>In </a:t>
+            </a:r>
+            <a:r>
+              <a:rPr lang="en-US" dirty="0" err="1" smtClean="0"/>
+              <a:t>Gradle</a:t>
+            </a:r>
+            <a:r>
+              <a:rPr lang="en-US" dirty="0" smtClean="0"/>
+              <a:t>/Maven – split into 2 separate source trees</a:t>
+            </a:r>
+            <a:endParaRPr lang="en-US" dirty="0"/>
           </a:p>
           <a:p>
             <a:pPr lvl="1"/>
             <a:r>
-              <a:rPr lang="en-US" dirty="0" smtClean="0"/>
-              <a:t>The basis for this </a:t>
-            </a:r>
-            <a:r>
-              <a:rPr lang="en-US" smtClean="0"/>
-              <a:t>whole presentation</a:t>
-            </a:r>
-            <a:endParaRPr lang="en-US"/>
+              <a:rPr lang="en-US" dirty="0"/>
+              <a:t>/</a:t>
+            </a:r>
+            <a:r>
+              <a:rPr lang="en-US" dirty="0" err="1" smtClean="0"/>
+              <a:t>src</a:t>
+            </a:r>
+            <a:r>
+              <a:rPr lang="en-US" dirty="0" smtClean="0"/>
+              <a:t>/main/java</a:t>
+            </a:r>
+          </a:p>
+          <a:p>
+            <a:pPr lvl="2"/>
+            <a:r>
+              <a:rPr lang="en-US" dirty="0" smtClean="0"/>
+              <a:t>Application code</a:t>
+            </a:r>
+          </a:p>
+          <a:p>
+            <a:pPr lvl="1"/>
+            <a:r>
+              <a:rPr lang="en-US" dirty="0" smtClean="0"/>
+              <a:t>/</a:t>
+            </a:r>
+            <a:r>
+              <a:rPr lang="en-US" dirty="0" err="1" smtClean="0"/>
+              <a:t>src</a:t>
+            </a:r>
+            <a:r>
+              <a:rPr lang="en-US" dirty="0" smtClean="0"/>
+              <a:t>/</a:t>
+            </a:r>
+            <a:r>
+              <a:rPr lang="en-US" dirty="0" err="1" smtClean="0"/>
+              <a:t>jmh</a:t>
+            </a:r>
+            <a:r>
+              <a:rPr lang="en-US" dirty="0" smtClean="0"/>
+              <a:t>/java</a:t>
+            </a:r>
+          </a:p>
+          <a:p>
+            <a:pPr lvl="2"/>
+            <a:r>
+              <a:rPr lang="en-US" dirty="0" smtClean="0"/>
+              <a:t>Benchmark code</a:t>
+            </a:r>
+          </a:p>
+          <a:p>
+            <a:r>
+              <a:rPr lang="en-US" dirty="0" smtClean="0"/>
+              <a:t>Or build a benchmark project which depends on your application jar(s)</a:t>
+            </a:r>
           </a:p>
         </p:txBody>
       </p:sp>
     </p:spTree>
     <p:extLst>
       <p:ext uri="{BB962C8B-B14F-4D97-AF65-F5344CB8AC3E}">
-        <p14:creationId xmlns:p14="http://schemas.microsoft.com/office/powerpoint/2010/main" val="1280026601"/>
+        <p14:creationId xmlns:p14="http://schemas.microsoft.com/office/powerpoint/2010/main" val="324309615"/>
+      </p:ext>
+    </p:extLst>
+  </p:cSld>
+  <p:clrMapOvr>
+    <a:masterClrMapping/>
+  </p:clrMapOvr>
+</p:sld>
+</file>
+
+<file path=ppt/slides/slide7.xml><?xml version="1.0" encoding="utf-8"?>
+<p:sld xmlns:a="http://schemas.openxmlformats.org/drawingml/2006/main" xmlns:r="http://schemas.openxmlformats.org/officeDocument/2006/relationships" xmlns:p="http://schemas.openxmlformats.org/presentationml/2006/main">
+  <p:cSld>
+    <p:spTree>
+      <p:nvGrpSpPr>
+        <p:cNvPr id="1" name=""/>
+        <p:cNvGrpSpPr/>
+        <p:nvPr/>
+      </p:nvGrpSpPr>
+      <p:grpSpPr>
+        <a:xfrm>
+          <a:off x="0" y="0"/>
+          <a:ext cx="0" cy="0"/>
+          <a:chOff x="0" y="0"/>
+          <a:chExt cx="0" cy="0"/>
+        </a:xfrm>
+      </p:grpSpPr>
+      <p:sp>
+        <p:nvSpPr>
+          <p:cNvPr id="2" name="Title 1"/>
+          <p:cNvSpPr>
+            <a:spLocks noGrp="1"/>
+          </p:cNvSpPr>
+          <p:nvPr>
+            <p:ph type="title"/>
+          </p:nvPr>
+        </p:nvSpPr>
+        <p:spPr/>
+        <p:txBody>
+          <a:bodyPr/>
+          <a:lstStyle/>
+          <a:p>
+            <a:r>
+              <a:rPr lang="en-US" dirty="0" smtClean="0"/>
+              <a:t>JMH </a:t>
+            </a:r>
+            <a:r>
+              <a:rPr lang="en-US" dirty="0" smtClean="0"/>
+              <a:t>– Defaults</a:t>
+            </a:r>
+            <a:endParaRPr lang="en-US" dirty="0"/>
+          </a:p>
+        </p:txBody>
+      </p:sp>
+      <p:sp>
+        <p:nvSpPr>
+          <p:cNvPr id="3" name="Content Placeholder 2"/>
+          <p:cNvSpPr>
+            <a:spLocks noGrp="1"/>
+          </p:cNvSpPr>
+          <p:nvPr>
+            <p:ph idx="1"/>
+          </p:nvPr>
+        </p:nvSpPr>
+        <p:spPr/>
+        <p:txBody>
+          <a:bodyPr/>
+          <a:lstStyle/>
+          <a:p>
+            <a:r>
+              <a:rPr lang="en-US" dirty="0" smtClean="0"/>
+              <a:t>Each benchmark run 20 warm-up rounds (max 1 second each)</a:t>
+            </a:r>
+          </a:p>
+          <a:p>
+            <a:r>
+              <a:rPr lang="en-US" dirty="0" smtClean="0"/>
+              <a:t>Then 20 measurement rounds (max 1 second each)</a:t>
+            </a:r>
+          </a:p>
+          <a:p>
+            <a:r>
+              <a:rPr lang="en-US" dirty="0" smtClean="0"/>
+              <a:t>Launches a new JVM 10 times for running each benchmark</a:t>
+            </a:r>
+          </a:p>
+          <a:p>
+            <a:r>
+              <a:rPr lang="en-US" dirty="0" smtClean="0"/>
+              <a:t>Command line flags and source annotations can customize this per benchmark</a:t>
+            </a:r>
+          </a:p>
+          <a:p>
+            <a:pPr lvl="1"/>
+            <a:r>
+              <a:rPr lang="en-US" dirty="0" smtClean="0"/>
+              <a:t>Running through </a:t>
+            </a:r>
+            <a:r>
+              <a:rPr lang="en-US" dirty="0" err="1" smtClean="0"/>
+              <a:t>Gradle</a:t>
+            </a:r>
+            <a:r>
+              <a:rPr lang="en-US" dirty="0" smtClean="0"/>
+              <a:t> – configurable in build script</a:t>
+            </a:r>
+          </a:p>
+          <a:p>
+            <a:pPr lvl="1"/>
+            <a:r>
+              <a:rPr lang="en-US" dirty="0">
+                <a:hlinkClick r:id="rId3"/>
+              </a:rPr>
+              <a:t>https://</a:t>
+            </a:r>
+            <a:r>
+              <a:rPr lang="en-US" dirty="0" smtClean="0">
+                <a:hlinkClick r:id="rId3"/>
+              </a:rPr>
+              <a:t>github.com/melix/jmh-gradle-plugin#configuration-options</a:t>
+            </a:r>
+            <a:endParaRPr lang="en-US" dirty="0" smtClean="0"/>
+          </a:p>
+          <a:p>
+            <a:pPr lvl="1"/>
+            <a:endParaRPr lang="en-US" dirty="0"/>
+          </a:p>
+        </p:txBody>
+      </p:sp>
+    </p:spTree>
+    <p:extLst>
+      <p:ext uri="{BB962C8B-B14F-4D97-AF65-F5344CB8AC3E}">
+        <p14:creationId xmlns:p14="http://schemas.microsoft.com/office/powerpoint/2010/main" val="2162986850"/>
+      </p:ext>
+    </p:extLst>
+  </p:cSld>
+  <p:clrMapOvr>
+    <a:masterClrMapping/>
+  </p:clrMapOvr>
+</p:sld>
+</file>
+
+<file path=ppt/slides/slide8.xml><?xml version="1.0" encoding="utf-8"?>
+<p:sld xmlns:a="http://schemas.openxmlformats.org/drawingml/2006/main" xmlns:r="http://schemas.openxmlformats.org/officeDocument/2006/relationships" xmlns:p="http://schemas.openxmlformats.org/presentationml/2006/main">
+  <p:cSld>
+    <p:spTree>
+      <p:nvGrpSpPr>
+        <p:cNvPr id="1" name=""/>
+        <p:cNvGrpSpPr/>
+        <p:nvPr/>
+      </p:nvGrpSpPr>
+      <p:grpSpPr>
+        <a:xfrm>
+          <a:off x="0" y="0"/>
+          <a:ext cx="0" cy="0"/>
+          <a:chOff x="0" y="0"/>
+          <a:chExt cx="0" cy="0"/>
+        </a:xfrm>
+      </p:grpSpPr>
+      <p:sp>
+        <p:nvSpPr>
+          <p:cNvPr id="2" name="Title 1"/>
+          <p:cNvSpPr>
+            <a:spLocks noGrp="1"/>
+          </p:cNvSpPr>
+          <p:nvPr>
+            <p:ph type="title"/>
+          </p:nvPr>
+        </p:nvSpPr>
+        <p:spPr/>
+        <p:txBody>
+          <a:bodyPr/>
+          <a:lstStyle/>
+          <a:p>
+            <a:r>
+              <a:rPr lang="en-US" dirty="0" smtClean="0"/>
+              <a:t>JMH – Hello World</a:t>
+            </a:r>
+            <a:endParaRPr lang="en-US" dirty="0"/>
+          </a:p>
+        </p:txBody>
+      </p:sp>
+      <p:sp>
+        <p:nvSpPr>
+          <p:cNvPr id="3" name="Content Placeholder 2"/>
+          <p:cNvSpPr>
+            <a:spLocks noGrp="1"/>
+          </p:cNvSpPr>
+          <p:nvPr>
+            <p:ph idx="1"/>
+          </p:nvPr>
+        </p:nvSpPr>
+        <p:spPr/>
+        <p:txBody>
+          <a:bodyPr/>
+          <a:lstStyle/>
+          <a:p>
+            <a:r>
+              <a:rPr lang="en-US" dirty="0" smtClean="0"/>
+              <a:t>JMH-Runner project is self-contained example</a:t>
+            </a:r>
+          </a:p>
+          <a:p>
+            <a:r>
+              <a:rPr lang="en-US" dirty="0" smtClean="0"/>
+              <a:t>Output in build/reports/</a:t>
+            </a:r>
+            <a:r>
+              <a:rPr lang="en-US" dirty="0" err="1" smtClean="0"/>
+              <a:t>jmh</a:t>
+            </a:r>
+            <a:r>
+              <a:rPr lang="en-US" dirty="0" smtClean="0"/>
+              <a:t>/human.txt</a:t>
+            </a:r>
+            <a:endParaRPr lang="en-US" dirty="0"/>
+          </a:p>
+        </p:txBody>
+      </p:sp>
+    </p:spTree>
+    <p:extLst>
+      <p:ext uri="{BB962C8B-B14F-4D97-AF65-F5344CB8AC3E}">
+        <p14:creationId xmlns:p14="http://schemas.microsoft.com/office/powerpoint/2010/main" val="1353279716"/>
+      </p:ext>
+    </p:extLst>
+  </p:cSld>
+  <p:clrMapOvr>
+    <a:masterClrMapping/>
+  </p:clrMapOvr>
+</p:sld>
+</file>
+
+<file path=ppt/slides/slide9.xml><?xml version="1.0" encoding="utf-8"?>
+<p:sld xmlns:a="http://schemas.openxmlformats.org/drawingml/2006/main" xmlns:r="http://schemas.openxmlformats.org/officeDocument/2006/relationships" xmlns:p="http://schemas.openxmlformats.org/presentationml/2006/main">
+  <p:cSld>
+    <p:spTree>
+      <p:nvGrpSpPr>
+        <p:cNvPr id="1" name=""/>
+        <p:cNvGrpSpPr/>
+        <p:nvPr/>
+      </p:nvGrpSpPr>
+      <p:grpSpPr>
+        <a:xfrm>
+          <a:off x="0" y="0"/>
+          <a:ext cx="0" cy="0"/>
+          <a:chOff x="0" y="0"/>
+          <a:chExt cx="0" cy="0"/>
+        </a:xfrm>
+      </p:grpSpPr>
+      <p:sp>
+        <p:nvSpPr>
+          <p:cNvPr id="2" name="Title 1"/>
+          <p:cNvSpPr>
+            <a:spLocks noGrp="1"/>
+          </p:cNvSpPr>
+          <p:nvPr>
+            <p:ph type="title"/>
+          </p:nvPr>
+        </p:nvSpPr>
+        <p:spPr/>
+        <p:txBody>
+          <a:bodyPr/>
+          <a:lstStyle/>
+          <a:p>
+            <a:endParaRPr lang="en-US"/>
+          </a:p>
+        </p:txBody>
+      </p:sp>
+      <p:sp>
+        <p:nvSpPr>
+          <p:cNvPr id="3" name="Content Placeholder 2"/>
+          <p:cNvSpPr>
+            <a:spLocks noGrp="1"/>
+          </p:cNvSpPr>
+          <p:nvPr>
+            <p:ph idx="1"/>
+          </p:nvPr>
+        </p:nvSpPr>
+        <p:spPr/>
+        <p:txBody>
+          <a:bodyPr/>
+          <a:lstStyle/>
+          <a:p>
+            <a:endParaRPr lang="en-US"/>
+          </a:p>
+        </p:txBody>
+      </p:sp>
+    </p:spTree>
+    <p:extLst>
+      <p:ext uri="{BB962C8B-B14F-4D97-AF65-F5344CB8AC3E}">
+        <p14:creationId xmlns:p14="http://schemas.microsoft.com/office/powerpoint/2010/main" val="2727199964"/>
       </p:ext>
     </p:extLst>
   </p:cSld>

</xml_diff>

<commit_message>
Much progress on presentation.
</commit_message>
<xml_diff>
--- a/doc/slides.pptx
+++ b/doc/slides.pptx
@@ -5,7 +5,7 @@
     <p:sldMasterId id="2147483648" r:id="rId1"/>
   </p:sldMasterIdLst>
   <p:notesMasterIdLst>
-    <p:notesMasterId r:id="rId13"/>
+    <p:notesMasterId r:id="rId24"/>
   </p:notesMasterIdLst>
   <p:sldIdLst>
     <p:sldId id="256" r:id="rId2"/>
@@ -16,9 +16,20 @@
     <p:sldId id="263" r:id="rId7"/>
     <p:sldId id="260" r:id="rId8"/>
     <p:sldId id="265" r:id="rId9"/>
-    <p:sldId id="266" r:id="rId10"/>
-    <p:sldId id="264" r:id="rId11"/>
-    <p:sldId id="261" r:id="rId12"/>
+    <p:sldId id="267" r:id="rId10"/>
+    <p:sldId id="268" r:id="rId11"/>
+    <p:sldId id="266" r:id="rId12"/>
+    <p:sldId id="269" r:id="rId13"/>
+    <p:sldId id="270" r:id="rId14"/>
+    <p:sldId id="271" r:id="rId15"/>
+    <p:sldId id="272" r:id="rId16"/>
+    <p:sldId id="274" r:id="rId17"/>
+    <p:sldId id="275" r:id="rId18"/>
+    <p:sldId id="273" r:id="rId19"/>
+    <p:sldId id="276" r:id="rId20"/>
+    <p:sldId id="277" r:id="rId21"/>
+    <p:sldId id="264" r:id="rId22"/>
+    <p:sldId id="261" r:id="rId23"/>
   </p:sldIdLst>
   <p:sldSz cx="12192000" cy="6858000"/>
   <p:notesSz cx="6858000" cy="9144000"/>
@@ -207,7 +218,7 @@
           <a:p>
             <a:fld id="{D5C9E47B-4149-4D78-AEA7-6A63220E520D}" type="datetimeFigureOut">
               <a:rPr lang="en-US" smtClean="0"/>
-              <a:t>1/14/2016</a:t>
+              <a:t>1/21/2016</a:t>
             </a:fld>
             <a:endParaRPr lang="en-US"/>
           </a:p>
@@ -521,56 +532,46 @@
           <a:p>
             <a:r>
               <a:rPr lang="en-US" dirty="0" smtClean="0"/>
-              <a:t>Other than micro and concurrent, JMH is a general-purpose benchmarking harness also possibly useful for larger benchmarks, too.  Emphasis is on using it</a:t>
+              <a:t>I</a:t>
             </a:r>
             <a:r>
               <a:rPr lang="en-US" baseline="0" dirty="0" smtClean="0"/>
-              <a:t> for MICRO benchmarks – i.e., which version of a method is </a:t>
-            </a:r>
+              <a:t> plan to *introduce* a tool called JMH and show how to use it.</a:t>
+            </a:r>
+          </a:p>
+          <a:p>
+            <a:endParaRPr lang="en-US" baseline="0" dirty="0" smtClean="0"/>
+          </a:p>
+          <a:p>
+            <a:pPr marL="0" marR="0" indent="0" algn="l" defTabSz="914400" rtl="0" eaLnBrk="1" fontAlgn="auto" latinLnBrk="0" hangingPunct="1">
+              <a:lnSpc>
+                <a:spcPct val="100000"/>
+              </a:lnSpc>
+              <a:spcBef>
+                <a:spcPts val="0"/>
+              </a:spcBef>
+              <a:spcAft>
+                <a:spcPts val="0"/>
+              </a:spcAft>
+              <a:buClrTx/>
+              <a:buSzTx/>
+              <a:buFontTx/>
+              <a:buNone/>
+              <a:tabLst/>
+              <a:defRPr/>
+            </a:pPr>
             <a:r>
               <a:rPr lang="en-US" baseline="0" dirty="0" smtClean="0"/>
-              <a:t>faster</a:t>
-            </a:r>
-          </a:p>
-          <a:p>
-            <a:endParaRPr lang="en-US" b="1" baseline="0" dirty="0" smtClean="0"/>
-          </a:p>
-          <a:p>
-            <a:r>
-              <a:rPr lang="en-US" b="1" dirty="0" smtClean="0"/>
-              <a:t>“Its distinctive advantage </a:t>
-            </a:r>
-            <a:r>
-              <a:rPr lang="en-US" dirty="0" smtClean="0"/>
-              <a:t>over other frameworks is that it is developed by the same guys in Oracle who implement the JIT. In particular I want to mention </a:t>
-            </a:r>
-            <a:r>
-              <a:rPr lang="en-US" dirty="0" smtClean="0">
-                <a:hlinkClick r:id="rId3"/>
-              </a:rPr>
-              <a:t>Aleksey </a:t>
-            </a:r>
-            <a:r>
-              <a:rPr lang="en-US" dirty="0" err="1" smtClean="0">
-                <a:hlinkClick r:id="rId3"/>
-              </a:rPr>
-              <a:t>Shipilev</a:t>
-            </a:r>
-            <a:r>
-              <a:rPr lang="en-US" dirty="0" smtClean="0">
-                <a:hlinkClick r:id="rId3"/>
-              </a:rPr>
-              <a:t> and his brilliant blog</a:t>
-            </a:r>
-            <a:r>
-              <a:rPr lang="en-US" dirty="0" smtClean="0"/>
-              <a:t>. </a:t>
-            </a:r>
-            <a:r>
-              <a:rPr lang="en-US" b="1" dirty="0" smtClean="0"/>
-              <a:t>JMH is likely to be in sync with the latest Oracle JRE changes, which makes its results very reliable. “</a:t>
-            </a:r>
-            <a:endParaRPr lang="en-US" b="1" dirty="0"/>
+              <a:t>I’ll say up front that understanding this tool is difficult, and I am by no means an expert on either it or </a:t>
+            </a:r>
+            <a:r>
+              <a:rPr lang="en-US" baseline="0" dirty="0" smtClean="0"/>
+              <a:t>– the complex and cryptic internal workings of the JVM</a:t>
+            </a:r>
+            <a:endParaRPr lang="en-US" dirty="0" smtClean="0"/>
+          </a:p>
+          <a:p>
+            <a:endParaRPr lang="en-US" dirty="0"/>
           </a:p>
         </p:txBody>
       </p:sp>
@@ -591,7 +592,7 @@
           <a:p>
             <a:fld id="{CFAD290B-5269-4E99-8A8A-8691B1EB0AE9}" type="slidenum">
               <a:rPr lang="en-US" smtClean="0"/>
-              <a:t>3</a:t>
+              <a:t>1</a:t>
             </a:fld>
             <a:endParaRPr lang="en-US"/>
           </a:p>
@@ -600,7 +601,602 @@
     </p:spTree>
     <p:extLst>
       <p:ext uri="{BB962C8B-B14F-4D97-AF65-F5344CB8AC3E}">
-        <p14:creationId xmlns:p14="http://schemas.microsoft.com/office/powerpoint/2010/main" val="1811639297"/>
+        <p14:creationId xmlns:p14="http://schemas.microsoft.com/office/powerpoint/2010/main" val="1999268038"/>
+      </p:ext>
+    </p:extLst>
+  </p:cSld>
+  <p:clrMapOvr>
+    <a:masterClrMapping/>
+  </p:clrMapOvr>
+</p:notes>
+</file>
+
+<file path=ppt/notesSlides/notesSlide10.xml><?xml version="1.0" encoding="utf-8"?>
+<p:notes xmlns:a="http://schemas.openxmlformats.org/drawingml/2006/main" xmlns:r="http://schemas.openxmlformats.org/officeDocument/2006/relationships" xmlns:p="http://schemas.openxmlformats.org/presentationml/2006/main">
+  <p:cSld>
+    <p:spTree>
+      <p:nvGrpSpPr>
+        <p:cNvPr id="1" name=""/>
+        <p:cNvGrpSpPr/>
+        <p:nvPr/>
+      </p:nvGrpSpPr>
+      <p:grpSpPr>
+        <a:xfrm>
+          <a:off x="0" y="0"/>
+          <a:ext cx="0" cy="0"/>
+          <a:chOff x="0" y="0"/>
+          <a:chExt cx="0" cy="0"/>
+        </a:xfrm>
+      </p:grpSpPr>
+      <p:sp>
+        <p:nvSpPr>
+          <p:cNvPr id="2" name="Slide Image Placeholder 1"/>
+          <p:cNvSpPr>
+            <a:spLocks noGrp="1" noRot="1" noChangeAspect="1"/>
+          </p:cNvSpPr>
+          <p:nvPr>
+            <p:ph type="sldImg"/>
+          </p:nvPr>
+        </p:nvSpPr>
+        <p:spPr/>
+      </p:sp>
+      <p:sp>
+        <p:nvSpPr>
+          <p:cNvPr id="3" name="Notes Placeholder 2"/>
+          <p:cNvSpPr>
+            <a:spLocks noGrp="1"/>
+          </p:cNvSpPr>
+          <p:nvPr>
+            <p:ph type="body" idx="1"/>
+          </p:nvPr>
+        </p:nvSpPr>
+        <p:spPr/>
+        <p:txBody>
+          <a:bodyPr/>
+          <a:lstStyle/>
+          <a:p>
+            <a:r>
+              <a:rPr lang="en-US" dirty="0" smtClean="0"/>
+              <a:t>So</a:t>
+            </a:r>
+            <a:r>
+              <a:rPr lang="en-US" baseline="0" dirty="0" smtClean="0"/>
+              <a:t> 10 times we’ll launch a new JVM to run a loop of 20 + 20 = 40 iterations, each of which will run for a max of 1 second – 400 seconds = 6min 40sec max test time</a:t>
+            </a:r>
+          </a:p>
+          <a:p>
+            <a:endParaRPr lang="en-US" baseline="0" dirty="0" smtClean="0"/>
+          </a:p>
+          <a:p>
+            <a:r>
+              <a:rPr lang="en-US" baseline="0" dirty="0" smtClean="0"/>
+              <a:t>So these can be slow, you probably want to tweak the defaults to tone it down – especially at first, if you’re serious about optimizing, you focus on large differences, right – should be easy to see at much less precise levels of measurement which will let you spend less time waiting for your benchmarks to run.  Then you can iterate and enhance.</a:t>
+            </a:r>
+            <a:endParaRPr lang="en-US" dirty="0"/>
+          </a:p>
+        </p:txBody>
+      </p:sp>
+      <p:sp>
+        <p:nvSpPr>
+          <p:cNvPr id="4" name="Slide Number Placeholder 3"/>
+          <p:cNvSpPr>
+            <a:spLocks noGrp="1"/>
+          </p:cNvSpPr>
+          <p:nvPr>
+            <p:ph type="sldNum" sz="quarter" idx="10"/>
+          </p:nvPr>
+        </p:nvSpPr>
+        <p:spPr/>
+        <p:txBody>
+          <a:bodyPr/>
+          <a:lstStyle/>
+          <a:p>
+            <a:fld id="{CFAD290B-5269-4E99-8A8A-8691B1EB0AE9}" type="slidenum">
+              <a:rPr lang="en-US" smtClean="0"/>
+              <a:t>12</a:t>
+            </a:fld>
+            <a:endParaRPr lang="en-US"/>
+          </a:p>
+        </p:txBody>
+      </p:sp>
+    </p:spTree>
+    <p:extLst>
+      <p:ext uri="{BB962C8B-B14F-4D97-AF65-F5344CB8AC3E}">
+        <p14:creationId xmlns:p14="http://schemas.microsoft.com/office/powerpoint/2010/main" val="1739458649"/>
+      </p:ext>
+    </p:extLst>
+  </p:cSld>
+  <p:clrMapOvr>
+    <a:masterClrMapping/>
+  </p:clrMapOvr>
+</p:notes>
+</file>
+
+<file path=ppt/notesSlides/notesSlide11.xml><?xml version="1.0" encoding="utf-8"?>
+<p:notes xmlns:a="http://schemas.openxmlformats.org/drawingml/2006/main" xmlns:r="http://schemas.openxmlformats.org/officeDocument/2006/relationships" xmlns:p="http://schemas.openxmlformats.org/presentationml/2006/main">
+  <p:cSld>
+    <p:spTree>
+      <p:nvGrpSpPr>
+        <p:cNvPr id="1" name=""/>
+        <p:cNvGrpSpPr/>
+        <p:nvPr/>
+      </p:nvGrpSpPr>
+      <p:grpSpPr>
+        <a:xfrm>
+          <a:off x="0" y="0"/>
+          <a:ext cx="0" cy="0"/>
+          <a:chOff x="0" y="0"/>
+          <a:chExt cx="0" cy="0"/>
+        </a:xfrm>
+      </p:grpSpPr>
+      <p:sp>
+        <p:nvSpPr>
+          <p:cNvPr id="2" name="Slide Image Placeholder 1"/>
+          <p:cNvSpPr>
+            <a:spLocks noGrp="1" noRot="1" noChangeAspect="1"/>
+          </p:cNvSpPr>
+          <p:nvPr>
+            <p:ph type="sldImg"/>
+          </p:nvPr>
+        </p:nvSpPr>
+        <p:spPr/>
+      </p:sp>
+      <p:sp>
+        <p:nvSpPr>
+          <p:cNvPr id="3" name="Notes Placeholder 2"/>
+          <p:cNvSpPr>
+            <a:spLocks noGrp="1"/>
+          </p:cNvSpPr>
+          <p:nvPr>
+            <p:ph type="body" idx="1"/>
+          </p:nvPr>
+        </p:nvSpPr>
+        <p:spPr/>
+        <p:txBody>
+          <a:bodyPr/>
+          <a:lstStyle/>
+          <a:p>
+            <a:r>
+              <a:rPr lang="en-US" dirty="0" smtClean="0"/>
+              <a:t>Obviously, if you start asking for NS precision</a:t>
+            </a:r>
+            <a:r>
+              <a:rPr lang="en-US" baseline="0" dirty="0" smtClean="0"/>
+              <a:t> on a process which takes several milliseconds, no matter how many runs you do, you are not going to get more precise answers – but as I’ve played with JMH, I’ve found the defaults to be too precise</a:t>
+            </a:r>
+            <a:endParaRPr lang="en-US" dirty="0"/>
+          </a:p>
+        </p:txBody>
+      </p:sp>
+      <p:sp>
+        <p:nvSpPr>
+          <p:cNvPr id="4" name="Slide Number Placeholder 3"/>
+          <p:cNvSpPr>
+            <a:spLocks noGrp="1"/>
+          </p:cNvSpPr>
+          <p:nvPr>
+            <p:ph type="sldNum" sz="quarter" idx="10"/>
+          </p:nvPr>
+        </p:nvSpPr>
+        <p:spPr/>
+        <p:txBody>
+          <a:bodyPr/>
+          <a:lstStyle/>
+          <a:p>
+            <a:fld id="{CFAD290B-5269-4E99-8A8A-8691B1EB0AE9}" type="slidenum">
+              <a:rPr lang="en-US" smtClean="0"/>
+              <a:t>13</a:t>
+            </a:fld>
+            <a:endParaRPr lang="en-US"/>
+          </a:p>
+        </p:txBody>
+      </p:sp>
+    </p:spTree>
+    <p:extLst>
+      <p:ext uri="{BB962C8B-B14F-4D97-AF65-F5344CB8AC3E}">
+        <p14:creationId xmlns:p14="http://schemas.microsoft.com/office/powerpoint/2010/main" val="1749795084"/>
+      </p:ext>
+    </p:extLst>
+  </p:cSld>
+  <p:clrMapOvr>
+    <a:masterClrMapping/>
+  </p:clrMapOvr>
+</p:notes>
+</file>
+
+<file path=ppt/notesSlides/notesSlide12.xml><?xml version="1.0" encoding="utf-8"?>
+<p:notes xmlns:a="http://schemas.openxmlformats.org/drawingml/2006/main" xmlns:r="http://schemas.openxmlformats.org/officeDocument/2006/relationships" xmlns:p="http://schemas.openxmlformats.org/presentationml/2006/main">
+  <p:cSld>
+    <p:spTree>
+      <p:nvGrpSpPr>
+        <p:cNvPr id="1" name=""/>
+        <p:cNvGrpSpPr/>
+        <p:nvPr/>
+      </p:nvGrpSpPr>
+      <p:grpSpPr>
+        <a:xfrm>
+          <a:off x="0" y="0"/>
+          <a:ext cx="0" cy="0"/>
+          <a:chOff x="0" y="0"/>
+          <a:chExt cx="0" cy="0"/>
+        </a:xfrm>
+      </p:grpSpPr>
+      <p:sp>
+        <p:nvSpPr>
+          <p:cNvPr id="2" name="Slide Image Placeholder 1"/>
+          <p:cNvSpPr>
+            <a:spLocks noGrp="1" noRot="1" noChangeAspect="1"/>
+          </p:cNvSpPr>
+          <p:nvPr>
+            <p:ph type="sldImg"/>
+          </p:nvPr>
+        </p:nvSpPr>
+        <p:spPr/>
+      </p:sp>
+      <p:sp>
+        <p:nvSpPr>
+          <p:cNvPr id="3" name="Notes Placeholder 2"/>
+          <p:cNvSpPr>
+            <a:spLocks noGrp="1"/>
+          </p:cNvSpPr>
+          <p:nvPr>
+            <p:ph type="body" idx="1"/>
+          </p:nvPr>
+        </p:nvSpPr>
+        <p:spPr/>
+        <p:txBody>
+          <a:bodyPr/>
+          <a:lstStyle/>
+          <a:p>
+            <a:r>
+              <a:rPr lang="en-US" dirty="0" smtClean="0"/>
+              <a:t>This</a:t>
+            </a:r>
+            <a:r>
+              <a:rPr lang="en-US" baseline="0" dirty="0" smtClean="0"/>
+              <a:t> is the attempt by the makers of JMH (the same people who work on the JIT) to tell the JVM in no uncertain terms to avoid optimizing away the thing you are trying to benchmark.</a:t>
+            </a:r>
+          </a:p>
+          <a:p>
+            <a:endParaRPr lang="en-US" baseline="0" dirty="0" smtClean="0"/>
+          </a:p>
+          <a:p>
+            <a:r>
+              <a:rPr lang="en-US" dirty="0" smtClean="0"/>
+              <a:t>I have no clue what</a:t>
+            </a:r>
+            <a:r>
+              <a:rPr lang="en-US" baseline="0" dirty="0" smtClean="0"/>
+              <a:t> this class is doing or why it is doing it.  Looking at the internals – it’s all just voodoo to me.  But the JMH guys, who are the JIT guys, say this is the best way to avoid your code getting optimized away – and its very easy to use.</a:t>
+            </a:r>
+            <a:endParaRPr lang="en-US" dirty="0"/>
+          </a:p>
+        </p:txBody>
+      </p:sp>
+      <p:sp>
+        <p:nvSpPr>
+          <p:cNvPr id="4" name="Slide Number Placeholder 3"/>
+          <p:cNvSpPr>
+            <a:spLocks noGrp="1"/>
+          </p:cNvSpPr>
+          <p:nvPr>
+            <p:ph type="sldNum" sz="quarter" idx="10"/>
+          </p:nvPr>
+        </p:nvSpPr>
+        <p:spPr/>
+        <p:txBody>
+          <a:bodyPr/>
+          <a:lstStyle/>
+          <a:p>
+            <a:fld id="{CFAD290B-5269-4E99-8A8A-8691B1EB0AE9}" type="slidenum">
+              <a:rPr lang="en-US" smtClean="0"/>
+              <a:t>16</a:t>
+            </a:fld>
+            <a:endParaRPr lang="en-US"/>
+          </a:p>
+        </p:txBody>
+      </p:sp>
+    </p:spTree>
+    <p:extLst>
+      <p:ext uri="{BB962C8B-B14F-4D97-AF65-F5344CB8AC3E}">
+        <p14:creationId xmlns:p14="http://schemas.microsoft.com/office/powerpoint/2010/main" val="3515685751"/>
+      </p:ext>
+    </p:extLst>
+  </p:cSld>
+  <p:clrMapOvr>
+    <a:masterClrMapping/>
+  </p:clrMapOvr>
+</p:notes>
+</file>
+
+<file path=ppt/notesSlides/notesSlide13.xml><?xml version="1.0" encoding="utf-8"?>
+<p:notes xmlns:a="http://schemas.openxmlformats.org/drawingml/2006/main" xmlns:r="http://schemas.openxmlformats.org/officeDocument/2006/relationships" xmlns:p="http://schemas.openxmlformats.org/presentationml/2006/main">
+  <p:cSld>
+    <p:spTree>
+      <p:nvGrpSpPr>
+        <p:cNvPr id="1" name=""/>
+        <p:cNvGrpSpPr/>
+        <p:nvPr/>
+      </p:nvGrpSpPr>
+      <p:grpSpPr>
+        <a:xfrm>
+          <a:off x="0" y="0"/>
+          <a:ext cx="0" cy="0"/>
+          <a:chOff x="0" y="0"/>
+          <a:chExt cx="0" cy="0"/>
+        </a:xfrm>
+      </p:grpSpPr>
+      <p:sp>
+        <p:nvSpPr>
+          <p:cNvPr id="2" name="Slide Image Placeholder 1"/>
+          <p:cNvSpPr>
+            <a:spLocks noGrp="1" noRot="1" noChangeAspect="1"/>
+          </p:cNvSpPr>
+          <p:nvPr>
+            <p:ph type="sldImg"/>
+          </p:nvPr>
+        </p:nvSpPr>
+        <p:spPr/>
+      </p:sp>
+      <p:sp>
+        <p:nvSpPr>
+          <p:cNvPr id="3" name="Notes Placeholder 2"/>
+          <p:cNvSpPr>
+            <a:spLocks noGrp="1"/>
+          </p:cNvSpPr>
+          <p:nvPr>
+            <p:ph type="body" idx="1"/>
+          </p:nvPr>
+        </p:nvSpPr>
+        <p:spPr/>
+        <p:txBody>
+          <a:bodyPr/>
+          <a:lstStyle/>
+          <a:p>
+            <a:endParaRPr lang="en-US" dirty="0"/>
+          </a:p>
+        </p:txBody>
+      </p:sp>
+      <p:sp>
+        <p:nvSpPr>
+          <p:cNvPr id="4" name="Slide Number Placeholder 3"/>
+          <p:cNvSpPr>
+            <a:spLocks noGrp="1"/>
+          </p:cNvSpPr>
+          <p:nvPr>
+            <p:ph type="sldNum" sz="quarter" idx="10"/>
+          </p:nvPr>
+        </p:nvSpPr>
+        <p:spPr/>
+        <p:txBody>
+          <a:bodyPr/>
+          <a:lstStyle/>
+          <a:p>
+            <a:fld id="{CFAD290B-5269-4E99-8A8A-8691B1EB0AE9}" type="slidenum">
+              <a:rPr lang="en-US" smtClean="0"/>
+              <a:t>17</a:t>
+            </a:fld>
+            <a:endParaRPr lang="en-US"/>
+          </a:p>
+        </p:txBody>
+      </p:sp>
+    </p:spTree>
+    <p:extLst>
+      <p:ext uri="{BB962C8B-B14F-4D97-AF65-F5344CB8AC3E}">
+        <p14:creationId xmlns:p14="http://schemas.microsoft.com/office/powerpoint/2010/main" val="1383870499"/>
+      </p:ext>
+    </p:extLst>
+  </p:cSld>
+  <p:clrMapOvr>
+    <a:masterClrMapping/>
+  </p:clrMapOvr>
+</p:notes>
+</file>
+
+<file path=ppt/notesSlides/notesSlide14.xml><?xml version="1.0" encoding="utf-8"?>
+<p:notes xmlns:a="http://schemas.openxmlformats.org/drawingml/2006/main" xmlns:r="http://schemas.openxmlformats.org/officeDocument/2006/relationships" xmlns:p="http://schemas.openxmlformats.org/presentationml/2006/main">
+  <p:cSld>
+    <p:spTree>
+      <p:nvGrpSpPr>
+        <p:cNvPr id="1" name=""/>
+        <p:cNvGrpSpPr/>
+        <p:nvPr/>
+      </p:nvGrpSpPr>
+      <p:grpSpPr>
+        <a:xfrm>
+          <a:off x="0" y="0"/>
+          <a:ext cx="0" cy="0"/>
+          <a:chOff x="0" y="0"/>
+          <a:chExt cx="0" cy="0"/>
+        </a:xfrm>
+      </p:grpSpPr>
+      <p:sp>
+        <p:nvSpPr>
+          <p:cNvPr id="2" name="Slide Image Placeholder 1"/>
+          <p:cNvSpPr>
+            <a:spLocks noGrp="1" noRot="1" noChangeAspect="1"/>
+          </p:cNvSpPr>
+          <p:nvPr>
+            <p:ph type="sldImg"/>
+          </p:nvPr>
+        </p:nvSpPr>
+        <p:spPr/>
+      </p:sp>
+      <p:sp>
+        <p:nvSpPr>
+          <p:cNvPr id="3" name="Notes Placeholder 2"/>
+          <p:cNvSpPr>
+            <a:spLocks noGrp="1"/>
+          </p:cNvSpPr>
+          <p:nvPr>
+            <p:ph type="body" idx="1"/>
+          </p:nvPr>
+        </p:nvSpPr>
+        <p:spPr/>
+        <p:txBody>
+          <a:bodyPr/>
+          <a:lstStyle/>
+          <a:p>
+            <a:endParaRPr lang="en-US" dirty="0"/>
+          </a:p>
+        </p:txBody>
+      </p:sp>
+      <p:sp>
+        <p:nvSpPr>
+          <p:cNvPr id="4" name="Slide Number Placeholder 3"/>
+          <p:cNvSpPr>
+            <a:spLocks noGrp="1"/>
+          </p:cNvSpPr>
+          <p:nvPr>
+            <p:ph type="sldNum" sz="quarter" idx="10"/>
+          </p:nvPr>
+        </p:nvSpPr>
+        <p:spPr/>
+        <p:txBody>
+          <a:bodyPr/>
+          <a:lstStyle/>
+          <a:p>
+            <a:fld id="{CFAD290B-5269-4E99-8A8A-8691B1EB0AE9}" type="slidenum">
+              <a:rPr lang="en-US" smtClean="0"/>
+              <a:t>18</a:t>
+            </a:fld>
+            <a:endParaRPr lang="en-US"/>
+          </a:p>
+        </p:txBody>
+      </p:sp>
+    </p:spTree>
+    <p:extLst>
+      <p:ext uri="{BB962C8B-B14F-4D97-AF65-F5344CB8AC3E}">
+        <p14:creationId xmlns:p14="http://schemas.microsoft.com/office/powerpoint/2010/main" val="1269356262"/>
+      </p:ext>
+    </p:extLst>
+  </p:cSld>
+  <p:clrMapOvr>
+    <a:masterClrMapping/>
+  </p:clrMapOvr>
+</p:notes>
+</file>
+
+<file path=ppt/notesSlides/notesSlide15.xml><?xml version="1.0" encoding="utf-8"?>
+<p:notes xmlns:a="http://schemas.openxmlformats.org/drawingml/2006/main" xmlns:r="http://schemas.openxmlformats.org/officeDocument/2006/relationships" xmlns:p="http://schemas.openxmlformats.org/presentationml/2006/main">
+  <p:cSld>
+    <p:spTree>
+      <p:nvGrpSpPr>
+        <p:cNvPr id="1" name=""/>
+        <p:cNvGrpSpPr/>
+        <p:nvPr/>
+      </p:nvGrpSpPr>
+      <p:grpSpPr>
+        <a:xfrm>
+          <a:off x="0" y="0"/>
+          <a:ext cx="0" cy="0"/>
+          <a:chOff x="0" y="0"/>
+          <a:chExt cx="0" cy="0"/>
+        </a:xfrm>
+      </p:grpSpPr>
+      <p:sp>
+        <p:nvSpPr>
+          <p:cNvPr id="2" name="Slide Image Placeholder 1"/>
+          <p:cNvSpPr>
+            <a:spLocks noGrp="1" noRot="1" noChangeAspect="1"/>
+          </p:cNvSpPr>
+          <p:nvPr>
+            <p:ph type="sldImg"/>
+          </p:nvPr>
+        </p:nvSpPr>
+        <p:spPr/>
+      </p:sp>
+      <p:sp>
+        <p:nvSpPr>
+          <p:cNvPr id="3" name="Notes Placeholder 2"/>
+          <p:cNvSpPr>
+            <a:spLocks noGrp="1"/>
+          </p:cNvSpPr>
+          <p:nvPr>
+            <p:ph type="body" idx="1"/>
+          </p:nvPr>
+        </p:nvSpPr>
+        <p:spPr/>
+        <p:txBody>
+          <a:bodyPr/>
+          <a:lstStyle/>
+          <a:p>
+            <a:r>
+              <a:rPr lang="en-US" dirty="0" smtClean="0"/>
+              <a:t>We can clearly see the effects of dead-code elimination and constant folding. The only meaningful measurement of distance() is when the value is being consumed by JMH (using the </a:t>
+            </a:r>
+            <a:r>
+              <a:rPr lang="en-US" dirty="0" err="1" smtClean="0"/>
+              <a:t>bBlackhole</a:t>
+            </a:r>
+            <a:r>
+              <a:rPr lang="en-US" dirty="0" smtClean="0"/>
+              <a:t>) and the</a:t>
+            </a:r>
+            <a:r>
+              <a:rPr lang="en-US" baseline="0" dirty="0" smtClean="0"/>
+              <a:t> </a:t>
+            </a:r>
+            <a:r>
+              <a:rPr lang="en-US" dirty="0" smtClean="0"/>
+              <a:t>parameters are passed through field values of a @State class. </a:t>
+            </a:r>
+          </a:p>
+          <a:p>
+            <a:endParaRPr lang="en-US" dirty="0" smtClean="0"/>
+          </a:p>
+          <a:p>
+            <a:r>
+              <a:rPr lang="en-US" dirty="0" smtClean="0"/>
+              <a:t>All other cases are meaningless</a:t>
+            </a:r>
+            <a:r>
+              <a:rPr lang="en-US" baseline="0" dirty="0" smtClean="0"/>
+              <a:t> – they are similar to measuring </a:t>
+            </a:r>
+            <a:r>
+              <a:rPr lang="en-US" dirty="0" smtClean="0"/>
+              <a:t>the performance </a:t>
+            </a:r>
+            <a:r>
+              <a:rPr lang="en-US" smtClean="0"/>
+              <a:t>of benchmarking a </a:t>
+            </a:r>
+            <a:r>
+              <a:rPr lang="en-US" dirty="0" smtClean="0"/>
+              <a:t>constant double or an empty void-returning method.</a:t>
+            </a:r>
+            <a:endParaRPr lang="en-US" dirty="0"/>
+          </a:p>
+        </p:txBody>
+      </p:sp>
+      <p:sp>
+        <p:nvSpPr>
+          <p:cNvPr id="4" name="Slide Number Placeholder 3"/>
+          <p:cNvSpPr>
+            <a:spLocks noGrp="1"/>
+          </p:cNvSpPr>
+          <p:nvPr>
+            <p:ph type="sldNum" sz="quarter" idx="10"/>
+          </p:nvPr>
+        </p:nvSpPr>
+        <p:spPr/>
+        <p:txBody>
+          <a:bodyPr/>
+          <a:lstStyle/>
+          <a:p>
+            <a:fld id="{CFAD290B-5269-4E99-8A8A-8691B1EB0AE9}" type="slidenum">
+              <a:rPr lang="en-US" smtClean="0"/>
+              <a:t>20</a:t>
+            </a:fld>
+            <a:endParaRPr lang="en-US"/>
+          </a:p>
+        </p:txBody>
+      </p:sp>
+    </p:spTree>
+    <p:extLst>
+      <p:ext uri="{BB962C8B-B14F-4D97-AF65-F5344CB8AC3E}">
+        <p14:creationId xmlns:p14="http://schemas.microsoft.com/office/powerpoint/2010/main" val="543214475"/>
       </p:ext>
     </p:extLst>
   </p:cSld>
@@ -656,15 +1252,52 @@
           <a:p>
             <a:r>
               <a:rPr lang="en-US" dirty="0" smtClean="0"/>
-              <a:t>Setup is somewhat difficult because - </a:t>
-            </a:r>
-          </a:p>
-          <a:p>
-            <a:r>
-              <a:rPr lang="en-US" dirty="0" smtClean="0"/>
-              <a:t>In all cases, the key to using JMH is enabling the annotation- or bytecode-processors to generate the synthetic benchmark code</a:t>
-            </a:r>
-            <a:endParaRPr lang="en-US" dirty="0"/>
+              <a:t>Other than micro and concurrent, JMH is a general-purpose benchmarking harness also possibly useful for larger benchmarks, too.  Emphasis is on using it</a:t>
+            </a:r>
+            <a:r>
+              <a:rPr lang="en-US" baseline="0" dirty="0" smtClean="0"/>
+              <a:t> for MICRO benchmarks – i.e., which version of a method is faster</a:t>
+            </a:r>
+          </a:p>
+          <a:p>
+            <a:endParaRPr lang="en-US" b="1" baseline="0" dirty="0" smtClean="0"/>
+          </a:p>
+          <a:p>
+            <a:r>
+              <a:rPr lang="en-US" b="1" dirty="0" smtClean="0"/>
+              <a:t>“Its distinctive advantage </a:t>
+            </a:r>
+            <a:r>
+              <a:rPr lang="en-US" dirty="0" smtClean="0"/>
+              <a:t>over other frameworks is that it is developed by the same guys in Oracle who implement the JIT. In particular I want to mention </a:t>
+            </a:r>
+            <a:r>
+              <a:rPr lang="en-US" dirty="0" smtClean="0">
+                <a:hlinkClick r:id="rId3"/>
+              </a:rPr>
+              <a:t>Aleksey </a:t>
+            </a:r>
+            <a:r>
+              <a:rPr lang="en-US" dirty="0" err="1" smtClean="0">
+                <a:hlinkClick r:id="rId3"/>
+              </a:rPr>
+              <a:t>Shipilev</a:t>
+            </a:r>
+            <a:r>
+              <a:rPr lang="en-US" dirty="0" smtClean="0">
+                <a:hlinkClick r:id="rId3"/>
+              </a:rPr>
+              <a:t> and his brilliant blog</a:t>
+            </a:r>
+            <a:r>
+              <a:rPr lang="en-US" dirty="0" smtClean="0"/>
+              <a:t>. </a:t>
+            </a:r>
+            <a:r>
+              <a:rPr lang="en-US" b="1" dirty="0" smtClean="0"/>
+              <a:t>JMH is likely to be in sync with the latest Oracle JRE changes, which makes its results very reliable. “</a:t>
+            </a:r>
+            <a:endParaRPr lang="en-US" b="1" dirty="0"/>
           </a:p>
         </p:txBody>
       </p:sp>
@@ -685,7 +1318,7 @@
           <a:p>
             <a:fld id="{CFAD290B-5269-4E99-8A8A-8691B1EB0AE9}" type="slidenum">
               <a:rPr lang="en-US" smtClean="0"/>
-              <a:t>4</a:t>
+              <a:t>3</a:t>
             </a:fld>
             <a:endParaRPr lang="en-US"/>
           </a:p>
@@ -694,7 +1327,7 @@
     </p:spTree>
     <p:extLst>
       <p:ext uri="{BB962C8B-B14F-4D97-AF65-F5344CB8AC3E}">
-        <p14:creationId xmlns:p14="http://schemas.microsoft.com/office/powerpoint/2010/main" val="3160364319"/>
+        <p14:creationId xmlns:p14="http://schemas.microsoft.com/office/powerpoint/2010/main" val="1811639297"/>
       </p:ext>
     </p:extLst>
   </p:cSld>
@@ -750,107 +1383,15 @@
           <a:p>
             <a:r>
               <a:rPr lang="en-US" dirty="0" smtClean="0"/>
-              <a:t>The</a:t>
-            </a:r>
-            <a:r>
-              <a:rPr lang="en-US" baseline="0" dirty="0" smtClean="0"/>
-              <a:t> separate project business is </a:t>
-            </a:r>
-            <a:r>
-              <a:rPr lang="en-US" dirty="0" smtClean="0"/>
-              <a:t>JMH</a:t>
-            </a:r>
-            <a:r>
-              <a:rPr lang="en-US" baseline="0" dirty="0" smtClean="0"/>
-              <a:t> is trying to ensure that </a:t>
-            </a:r>
-            <a:r>
-              <a:rPr lang="en-US" dirty="0" smtClean="0"/>
-              <a:t>the benchmarks are </a:t>
-            </a:r>
-            <a:r>
-              <a:rPr lang="en-US" b="1" dirty="0" smtClean="0"/>
-              <a:t>correctly initialized and produce reliable results</a:t>
-            </a:r>
-            <a:r>
-              <a:rPr lang="en-US" dirty="0" smtClean="0"/>
-              <a:t>. </a:t>
-            </a:r>
-          </a:p>
-          <a:p>
-            <a:endParaRPr lang="en-US" dirty="0" smtClean="0"/>
-          </a:p>
-          <a:p>
-            <a:r>
-              <a:rPr lang="en-US" dirty="0" smtClean="0"/>
-              <a:t>Because </a:t>
-            </a:r>
-            <a:r>
-              <a:rPr lang="en-US" dirty="0" err="1" smtClean="0"/>
-              <a:t>Gradle</a:t>
-            </a:r>
-            <a:r>
-              <a:rPr lang="en-US" dirty="0" smtClean="0"/>
-              <a:t> is</a:t>
-            </a:r>
-            <a:r>
-              <a:rPr lang="en-US" baseline="0" dirty="0" smtClean="0"/>
-              <a:t> several hundred times </a:t>
-            </a:r>
-            <a:r>
-              <a:rPr lang="en-US" baseline="0" dirty="0" smtClean="0"/>
-              <a:t>better than JMH, I’ve setup a simple </a:t>
-            </a:r>
-            <a:r>
-              <a:rPr lang="en-US" baseline="0" dirty="0" err="1" smtClean="0"/>
-              <a:t>Gradle</a:t>
-            </a:r>
-            <a:r>
-              <a:rPr lang="en-US" baseline="0" dirty="0" smtClean="0"/>
-              <a:t> project which will run JMH for you – all you have to do is add your code to the </a:t>
-            </a:r>
-            <a:r>
-              <a:rPr lang="en-US" baseline="0" dirty="0" err="1" smtClean="0"/>
-              <a:t>src</a:t>
-            </a:r>
-            <a:r>
-              <a:rPr lang="en-US" baseline="0" dirty="0" smtClean="0"/>
-              <a:t>/</a:t>
-            </a:r>
-            <a:r>
-              <a:rPr lang="en-US" baseline="0" dirty="0" err="1" smtClean="0"/>
-              <a:t>jmh</a:t>
-            </a:r>
-            <a:r>
-              <a:rPr lang="en-US" baseline="0" dirty="0" smtClean="0"/>
-              <a:t>/java folder, and run.</a:t>
-            </a:r>
-          </a:p>
-          <a:p>
-            <a:endParaRPr lang="en-US" baseline="0" dirty="0" smtClean="0"/>
-          </a:p>
-          <a:p>
-            <a:pPr marL="0" marR="0" indent="0" algn="l" defTabSz="914400" rtl="0" eaLnBrk="1" fontAlgn="auto" latinLnBrk="0" hangingPunct="1">
-              <a:lnSpc>
-                <a:spcPct val="100000"/>
-              </a:lnSpc>
-              <a:spcBef>
-                <a:spcPts val="0"/>
-              </a:spcBef>
-              <a:spcAft>
-                <a:spcPts val="0"/>
-              </a:spcAft>
-              <a:buClrTx/>
-              <a:buSzTx/>
-              <a:buFontTx/>
-              <a:buNone/>
-              <a:tabLst/>
-              <a:defRPr/>
-            </a:pPr>
-            <a:r>
-              <a:rPr lang="en-US" dirty="0" smtClean="0"/>
-              <a:t>It is possible to run benchmarks from within an existing project, and even from within an IDE, however setup is more complex and the results are less reliable.</a:t>
-            </a:r>
+              <a:t>Setup is somewhat difficult because - </a:t>
+            </a:r>
+          </a:p>
+          <a:p>
+            <a:r>
+              <a:rPr lang="en-US" dirty="0" smtClean="0"/>
+              <a:t>In all cases, the key to using JMH is enabling the annotation- or bytecode-processors to generate the synthetic benchmark code</a:t>
+            </a:r>
+            <a:endParaRPr lang="en-US" dirty="0"/>
           </a:p>
         </p:txBody>
       </p:sp>
@@ -871,7 +1412,7 @@
           <a:p>
             <a:fld id="{CFAD290B-5269-4E99-8A8A-8691B1EB0AE9}" type="slidenum">
               <a:rPr lang="en-US" smtClean="0"/>
-              <a:t>5</a:t>
+              <a:t>4</a:t>
             </a:fld>
             <a:endParaRPr lang="en-US"/>
           </a:p>
@@ -880,7 +1421,7 @@
     </p:spTree>
     <p:extLst>
       <p:ext uri="{BB962C8B-B14F-4D97-AF65-F5344CB8AC3E}">
-        <p14:creationId xmlns:p14="http://schemas.microsoft.com/office/powerpoint/2010/main" val="278153674"/>
+        <p14:creationId xmlns:p14="http://schemas.microsoft.com/office/powerpoint/2010/main" val="3160364319"/>
       </p:ext>
     </p:extLst>
   </p:cSld>
@@ -936,9 +1477,103 @@
           <a:p>
             <a:r>
               <a:rPr lang="en-US" dirty="0" smtClean="0"/>
-              <a:t>When dealing with large projects, it is customary to keep the benchmarks in a separate subproject, which then depends on the tested modules via the usual build dependencies.</a:t>
-            </a:r>
-            <a:endParaRPr lang="en-US" dirty="0"/>
+              <a:t>The</a:t>
+            </a:r>
+            <a:r>
+              <a:rPr lang="en-US" baseline="0" dirty="0" smtClean="0"/>
+              <a:t> separate project business is </a:t>
+            </a:r>
+            <a:r>
+              <a:rPr lang="en-US" dirty="0" smtClean="0"/>
+              <a:t>JMH</a:t>
+            </a:r>
+            <a:r>
+              <a:rPr lang="en-US" baseline="0" dirty="0" smtClean="0"/>
+              <a:t> is trying to ensure that </a:t>
+            </a:r>
+            <a:r>
+              <a:rPr lang="en-US" dirty="0" smtClean="0"/>
+              <a:t>the benchmarks are </a:t>
+            </a:r>
+            <a:r>
+              <a:rPr lang="en-US" b="1" dirty="0" smtClean="0"/>
+              <a:t>correctly initialized and produce reliable results</a:t>
+            </a:r>
+            <a:r>
+              <a:rPr lang="en-US" dirty="0" smtClean="0"/>
+              <a:t>. </a:t>
+            </a:r>
+          </a:p>
+          <a:p>
+            <a:endParaRPr lang="en-US" dirty="0" smtClean="0"/>
+          </a:p>
+          <a:p>
+            <a:r>
+              <a:rPr lang="en-US" dirty="0" smtClean="0"/>
+              <a:t>Because </a:t>
+            </a:r>
+            <a:r>
+              <a:rPr lang="en-US" dirty="0" err="1" smtClean="0"/>
+              <a:t>Gradle</a:t>
+            </a:r>
+            <a:r>
+              <a:rPr lang="en-US" dirty="0" smtClean="0"/>
+              <a:t> is</a:t>
+            </a:r>
+            <a:r>
+              <a:rPr lang="en-US" baseline="0" dirty="0" smtClean="0"/>
+              <a:t> several hundred times better than JMH, I’ve setup a simple </a:t>
+            </a:r>
+            <a:r>
+              <a:rPr lang="en-US" baseline="0" dirty="0" err="1" smtClean="0"/>
+              <a:t>Gradle</a:t>
+            </a:r>
+            <a:r>
+              <a:rPr lang="en-US" baseline="0" dirty="0" smtClean="0"/>
+              <a:t> project which will run JMH for you – all you have to do is add your code to the </a:t>
+            </a:r>
+            <a:r>
+              <a:rPr lang="en-US" baseline="0" dirty="0" err="1" smtClean="0"/>
+              <a:t>src</a:t>
+            </a:r>
+            <a:r>
+              <a:rPr lang="en-US" baseline="0" dirty="0" smtClean="0"/>
+              <a:t>/</a:t>
+            </a:r>
+            <a:r>
+              <a:rPr lang="en-US" baseline="0" dirty="0" err="1" smtClean="0"/>
+              <a:t>jmh</a:t>
+            </a:r>
+            <a:r>
+              <a:rPr lang="en-US" baseline="0" dirty="0" smtClean="0"/>
+              <a:t>/java folder, and run.</a:t>
+            </a:r>
+          </a:p>
+          <a:p>
+            <a:endParaRPr lang="en-US" baseline="0" dirty="0" smtClean="0"/>
+          </a:p>
+          <a:p>
+            <a:pPr marL="0" marR="0" indent="0" algn="l" defTabSz="914400" rtl="0" eaLnBrk="1" fontAlgn="auto" latinLnBrk="0" hangingPunct="1">
+              <a:lnSpc>
+                <a:spcPct val="100000"/>
+              </a:lnSpc>
+              <a:spcBef>
+                <a:spcPts val="0"/>
+              </a:spcBef>
+              <a:spcAft>
+                <a:spcPts val="0"/>
+              </a:spcAft>
+              <a:buClrTx/>
+              <a:buSzTx/>
+              <a:buFontTx/>
+              <a:buNone/>
+              <a:tabLst/>
+              <a:defRPr/>
+            </a:pPr>
+            <a:r>
+              <a:rPr lang="en-US" dirty="0" smtClean="0"/>
+              <a:t>It is possible to run benchmarks from within an existing project, and even from within an IDE, however setup is more complex and the results are less reliable.</a:t>
+            </a:r>
           </a:p>
         </p:txBody>
       </p:sp>
@@ -959,7 +1594,7 @@
           <a:p>
             <a:fld id="{CFAD290B-5269-4E99-8A8A-8691B1EB0AE9}" type="slidenum">
               <a:rPr lang="en-US" smtClean="0"/>
-              <a:t>6</a:t>
+              <a:t>5</a:t>
             </a:fld>
             <a:endParaRPr lang="en-US"/>
           </a:p>
@@ -968,7 +1603,7 @@
     </p:spTree>
     <p:extLst>
       <p:ext uri="{BB962C8B-B14F-4D97-AF65-F5344CB8AC3E}">
-        <p14:creationId xmlns:p14="http://schemas.microsoft.com/office/powerpoint/2010/main" val="3355601355"/>
+        <p14:creationId xmlns:p14="http://schemas.microsoft.com/office/powerpoint/2010/main" val="278153674"/>
       </p:ext>
     </p:extLst>
   </p:cSld>
@@ -1024,35 +1659,7 @@
           <a:p>
             <a:r>
               <a:rPr lang="en-US" dirty="0" smtClean="0"/>
-              <a:t>The</a:t>
-            </a:r>
-            <a:r>
-              <a:rPr lang="en-US" baseline="0" dirty="0" smtClean="0"/>
-              <a:t> default m</a:t>
-            </a:r>
-            <a:r>
-              <a:rPr lang="en-US" dirty="0" smtClean="0"/>
-              <a:t>ax</a:t>
-            </a:r>
-            <a:r>
-              <a:rPr lang="en-US" baseline="0" dirty="0" smtClean="0"/>
-              <a:t> </a:t>
-            </a:r>
-            <a:r>
-              <a:rPr lang="en-US" baseline="0" dirty="0" smtClean="0"/>
-              <a:t>of 1 second – shows </a:t>
-            </a:r>
-            <a:r>
-              <a:rPr lang="en-US" baseline="0" dirty="0" smtClean="0"/>
-              <a:t>the emphasis </a:t>
-            </a:r>
-            <a:r>
-              <a:rPr lang="en-US" baseline="0" dirty="0" smtClean="0"/>
-              <a:t>on “micro”-</a:t>
-            </a:r>
-            <a:r>
-              <a:rPr lang="en-US" baseline="0" dirty="0" smtClean="0"/>
-              <a:t>benchmarks.</a:t>
+              <a:t>When dealing with large projects, it is customary to keep the benchmarks in a separate subproject, which then depends on the tested modules via the usual build dependencies.</a:t>
             </a:r>
             <a:endParaRPr lang="en-US" dirty="0"/>
           </a:p>
@@ -1075,7 +1682,7 @@
           <a:p>
             <a:fld id="{CFAD290B-5269-4E99-8A8A-8691B1EB0AE9}" type="slidenum">
               <a:rPr lang="en-US" smtClean="0"/>
-              <a:t>7</a:t>
+              <a:t>6</a:t>
             </a:fld>
             <a:endParaRPr lang="en-US"/>
           </a:p>
@@ -1084,7 +1691,7 @@
     </p:spTree>
     <p:extLst>
       <p:ext uri="{BB962C8B-B14F-4D97-AF65-F5344CB8AC3E}">
-        <p14:creationId xmlns:p14="http://schemas.microsoft.com/office/powerpoint/2010/main" val="1668912180"/>
+        <p14:creationId xmlns:p14="http://schemas.microsoft.com/office/powerpoint/2010/main" val="3355601355"/>
       </p:ext>
     </p:extLst>
   </p:cSld>
@@ -1140,6 +1747,106 @@
           <a:p>
             <a:r>
               <a:rPr lang="en-US" dirty="0" smtClean="0"/>
+              <a:t>The</a:t>
+            </a:r>
+            <a:r>
+              <a:rPr lang="en-US" baseline="0" dirty="0" smtClean="0"/>
+              <a:t> default m</a:t>
+            </a:r>
+            <a:r>
+              <a:rPr lang="en-US" dirty="0" smtClean="0"/>
+              <a:t>ax</a:t>
+            </a:r>
+            <a:r>
+              <a:rPr lang="en-US" baseline="0" dirty="0" smtClean="0"/>
+              <a:t> of 1 second – shows the emphasis on “micro”-benchmarks.</a:t>
+            </a:r>
+            <a:endParaRPr lang="en-US" dirty="0"/>
+          </a:p>
+        </p:txBody>
+      </p:sp>
+      <p:sp>
+        <p:nvSpPr>
+          <p:cNvPr id="4" name="Slide Number Placeholder 3"/>
+          <p:cNvSpPr>
+            <a:spLocks noGrp="1"/>
+          </p:cNvSpPr>
+          <p:nvPr>
+            <p:ph type="sldNum" sz="quarter" idx="10"/>
+          </p:nvPr>
+        </p:nvSpPr>
+        <p:spPr/>
+        <p:txBody>
+          <a:bodyPr/>
+          <a:lstStyle/>
+          <a:p>
+            <a:fld id="{CFAD290B-5269-4E99-8A8A-8691B1EB0AE9}" type="slidenum">
+              <a:rPr lang="en-US" smtClean="0"/>
+              <a:t>7</a:t>
+            </a:fld>
+            <a:endParaRPr lang="en-US"/>
+          </a:p>
+        </p:txBody>
+      </p:sp>
+    </p:spTree>
+    <p:extLst>
+      <p:ext uri="{BB962C8B-B14F-4D97-AF65-F5344CB8AC3E}">
+        <p14:creationId xmlns:p14="http://schemas.microsoft.com/office/powerpoint/2010/main" val="1668912180"/>
+      </p:ext>
+    </p:extLst>
+  </p:cSld>
+  <p:clrMapOvr>
+    <a:masterClrMapping/>
+  </p:clrMapOvr>
+</p:notes>
+</file>
+
+<file path=ppt/notesSlides/notesSlide7.xml><?xml version="1.0" encoding="utf-8"?>
+<p:notes xmlns:a="http://schemas.openxmlformats.org/drawingml/2006/main" xmlns:r="http://schemas.openxmlformats.org/officeDocument/2006/relationships" xmlns:p="http://schemas.openxmlformats.org/presentationml/2006/main">
+  <p:cSld>
+    <p:spTree>
+      <p:nvGrpSpPr>
+        <p:cNvPr id="1" name=""/>
+        <p:cNvGrpSpPr/>
+        <p:nvPr/>
+      </p:nvGrpSpPr>
+      <p:grpSpPr>
+        <a:xfrm>
+          <a:off x="0" y="0"/>
+          <a:ext cx="0" cy="0"/>
+          <a:chOff x="0" y="0"/>
+          <a:chExt cx="0" cy="0"/>
+        </a:xfrm>
+      </p:grpSpPr>
+      <p:sp>
+        <p:nvSpPr>
+          <p:cNvPr id="2" name="Slide Image Placeholder 1"/>
+          <p:cNvSpPr>
+            <a:spLocks noGrp="1" noRot="1" noChangeAspect="1"/>
+          </p:cNvSpPr>
+          <p:nvPr>
+            <p:ph type="sldImg"/>
+          </p:nvPr>
+        </p:nvSpPr>
+        <p:spPr/>
+      </p:sp>
+      <p:sp>
+        <p:nvSpPr>
+          <p:cNvPr id="3" name="Notes Placeholder 2"/>
+          <p:cNvSpPr>
+            <a:spLocks noGrp="1"/>
+          </p:cNvSpPr>
+          <p:nvPr>
+            <p:ph type="body" idx="1"/>
+          </p:nvPr>
+        </p:nvSpPr>
+        <p:spPr/>
+        <p:txBody>
+          <a:bodyPr/>
+          <a:lstStyle/>
+          <a:p>
+            <a:r>
+              <a:rPr lang="en-US" dirty="0" smtClean="0"/>
               <a:t>Results of running</a:t>
             </a:r>
             <a:r>
@@ -1152,15 +1859,7 @@
             </a:r>
             <a:r>
               <a:rPr lang="en-US" baseline="0" dirty="0" smtClean="0"/>
-              <a:t> report output directory </a:t>
-            </a:r>
-            <a:r>
-              <a:rPr lang="en-US" baseline="0" dirty="0" smtClean="0"/>
-              <a:t>– </a:t>
-            </a:r>
-            <a:r>
-              <a:rPr lang="en-US" baseline="0" dirty="0" smtClean="0"/>
-              <a:t>/</a:t>
+              <a:t> report output directory – /</a:t>
             </a:r>
             <a:r>
               <a:rPr lang="en-US" baseline="0" dirty="0" err="1" smtClean="0"/>
@@ -1263,6 +1962,302 @@
     <p:extLst>
       <p:ext uri="{BB962C8B-B14F-4D97-AF65-F5344CB8AC3E}">
         <p14:creationId xmlns:p14="http://schemas.microsoft.com/office/powerpoint/2010/main" val="1506391699"/>
+      </p:ext>
+    </p:extLst>
+  </p:cSld>
+  <p:clrMapOvr>
+    <a:masterClrMapping/>
+  </p:clrMapOvr>
+</p:notes>
+</file>
+
+<file path=ppt/notesSlides/notesSlide8.xml><?xml version="1.0" encoding="utf-8"?>
+<p:notes xmlns:a="http://schemas.openxmlformats.org/drawingml/2006/main" xmlns:r="http://schemas.openxmlformats.org/officeDocument/2006/relationships" xmlns:p="http://schemas.openxmlformats.org/presentationml/2006/main">
+  <p:cSld>
+    <p:spTree>
+      <p:nvGrpSpPr>
+        <p:cNvPr id="1" name=""/>
+        <p:cNvGrpSpPr/>
+        <p:nvPr/>
+      </p:nvGrpSpPr>
+      <p:grpSpPr>
+        <a:xfrm>
+          <a:off x="0" y="0"/>
+          <a:ext cx="0" cy="0"/>
+          <a:chOff x="0" y="0"/>
+          <a:chExt cx="0" cy="0"/>
+        </a:xfrm>
+      </p:grpSpPr>
+      <p:sp>
+        <p:nvSpPr>
+          <p:cNvPr id="2" name="Slide Image Placeholder 1"/>
+          <p:cNvSpPr>
+            <a:spLocks noGrp="1" noRot="1" noChangeAspect="1"/>
+          </p:cNvSpPr>
+          <p:nvPr>
+            <p:ph type="sldImg"/>
+          </p:nvPr>
+        </p:nvSpPr>
+        <p:spPr/>
+      </p:sp>
+      <p:sp>
+        <p:nvSpPr>
+          <p:cNvPr id="3" name="Notes Placeholder 2"/>
+          <p:cNvSpPr>
+            <a:spLocks noGrp="1"/>
+          </p:cNvSpPr>
+          <p:nvPr>
+            <p:ph type="body" idx="1"/>
+          </p:nvPr>
+        </p:nvSpPr>
+        <p:spPr/>
+        <p:txBody>
+          <a:bodyPr/>
+          <a:lstStyle/>
+          <a:p>
+            <a:r>
+              <a:rPr lang="en-US" dirty="0" smtClean="0"/>
+              <a:t>Aim is that</a:t>
+            </a:r>
+            <a:r>
+              <a:rPr lang="en-US" baseline="0" dirty="0" smtClean="0"/>
+              <a:t> if you run twice on the same machine – without making major changes to that machine’s software or hardware, you can meaningfully compare output.</a:t>
+            </a:r>
+          </a:p>
+          <a:p>
+            <a:endParaRPr lang="en-US" baseline="0" dirty="0" smtClean="0"/>
+          </a:p>
+          <a:p>
+            <a:r>
+              <a:rPr lang="en-US" baseline="0" dirty="0" smtClean="0"/>
+              <a:t>The output shows the result of each run – the warmups and the test iterations for each @Benchmark annotated method</a:t>
+            </a:r>
+          </a:p>
+          <a:p>
+            <a:endParaRPr lang="en-US" baseline="0" dirty="0" smtClean="0"/>
+          </a:p>
+          <a:p>
+            <a:r>
+              <a:rPr lang="en-US" baseline="0" dirty="0" smtClean="0"/>
+              <a:t>Output is in operations/sec – so higher is faster (this is a default, you can also output in other modes)</a:t>
+            </a:r>
+          </a:p>
+          <a:p>
+            <a:endParaRPr lang="en-US" baseline="0" dirty="0" smtClean="0"/>
+          </a:p>
+          <a:p>
+            <a:r>
+              <a:rPr lang="en-US" baseline="0" dirty="0" smtClean="0"/>
+              <a:t>Benchmark mode defaults to throughput THRPT in output. Available modes are: [Throughput/</a:t>
+            </a:r>
+            <a:r>
+              <a:rPr lang="en-US" baseline="0" dirty="0" err="1" smtClean="0"/>
+              <a:t>thrpt</a:t>
+            </a:r>
+            <a:r>
+              <a:rPr lang="en-US" baseline="0" dirty="0" smtClean="0"/>
+              <a:t>, </a:t>
+            </a:r>
+            <a:r>
+              <a:rPr lang="en-US" baseline="0" dirty="0" err="1" smtClean="0"/>
+              <a:t>AverageTime</a:t>
+            </a:r>
+            <a:r>
+              <a:rPr lang="en-US" baseline="0" dirty="0" smtClean="0"/>
+              <a:t>/</a:t>
+            </a:r>
+            <a:r>
+              <a:rPr lang="en-US" baseline="0" dirty="0" err="1" smtClean="0"/>
+              <a:t>avgt</a:t>
+            </a:r>
+            <a:r>
+              <a:rPr lang="en-US" baseline="0" dirty="0" smtClean="0"/>
+              <a:t>, </a:t>
+            </a:r>
+            <a:r>
+              <a:rPr lang="en-US" baseline="0" dirty="0" err="1" smtClean="0"/>
+              <a:t>SampleTime</a:t>
+            </a:r>
+            <a:r>
+              <a:rPr lang="en-US" baseline="0" dirty="0" smtClean="0"/>
+              <a:t>/sample, </a:t>
+            </a:r>
+            <a:r>
+              <a:rPr lang="en-US" baseline="0" dirty="0" err="1" smtClean="0"/>
+              <a:t>SingleShotTime</a:t>
+            </a:r>
+            <a:r>
+              <a:rPr lang="en-US" baseline="0" dirty="0" smtClean="0"/>
+              <a:t>/</a:t>
+            </a:r>
+            <a:r>
+              <a:rPr lang="en-US" baseline="0" dirty="0" err="1" smtClean="0"/>
+              <a:t>ss</a:t>
+            </a:r>
+            <a:r>
+              <a:rPr lang="en-US" baseline="0" dirty="0" smtClean="0"/>
+              <a:t>, All/all] – </a:t>
+            </a:r>
+            <a:r>
+              <a:rPr lang="en-US" baseline="0" dirty="0" err="1" smtClean="0"/>
+              <a:t>thrpt</a:t>
+            </a:r>
+            <a:r>
+              <a:rPr lang="en-US" baseline="0" dirty="0" smtClean="0"/>
+              <a:t> seems to be the easiest to compare intuitively which is why it’s the default – the difference between 300 and 400 M is more meaningful to us than the different between .000003 and .000004 seconds, or whatever</a:t>
+            </a:r>
+          </a:p>
+          <a:p>
+            <a:endParaRPr lang="en-US" baseline="0" dirty="0" smtClean="0"/>
+          </a:p>
+          <a:p>
+            <a:r>
+              <a:rPr lang="en-US" baseline="0" dirty="0" smtClean="0"/>
+              <a:t>One other thing useful to note in the output is the ETA it prints prior to each benchmark, so if you watch the file while JMH is running during a long-running process it will attempt to guess at when its going to finish – useful if you’re comparing lots of benchmarks</a:t>
+            </a:r>
+          </a:p>
+          <a:p>
+            <a:endParaRPr lang="en-US" dirty="0"/>
+          </a:p>
+        </p:txBody>
+      </p:sp>
+      <p:sp>
+        <p:nvSpPr>
+          <p:cNvPr id="4" name="Slide Number Placeholder 3"/>
+          <p:cNvSpPr>
+            <a:spLocks noGrp="1"/>
+          </p:cNvSpPr>
+          <p:nvPr>
+            <p:ph type="sldNum" sz="quarter" idx="10"/>
+          </p:nvPr>
+        </p:nvSpPr>
+        <p:spPr/>
+        <p:txBody>
+          <a:bodyPr/>
+          <a:lstStyle/>
+          <a:p>
+            <a:fld id="{CFAD290B-5269-4E99-8A8A-8691B1EB0AE9}" type="slidenum">
+              <a:rPr lang="en-US" smtClean="0"/>
+              <a:t>9</a:t>
+            </a:fld>
+            <a:endParaRPr lang="en-US"/>
+          </a:p>
+        </p:txBody>
+      </p:sp>
+    </p:spTree>
+    <p:extLst>
+      <p:ext uri="{BB962C8B-B14F-4D97-AF65-F5344CB8AC3E}">
+        <p14:creationId xmlns:p14="http://schemas.microsoft.com/office/powerpoint/2010/main" val="1157746845"/>
+      </p:ext>
+    </p:extLst>
+  </p:cSld>
+  <p:clrMapOvr>
+    <a:masterClrMapping/>
+  </p:clrMapOvr>
+</p:notes>
+</file>
+
+<file path=ppt/notesSlides/notesSlide9.xml><?xml version="1.0" encoding="utf-8"?>
+<p:notes xmlns:a="http://schemas.openxmlformats.org/drawingml/2006/main" xmlns:r="http://schemas.openxmlformats.org/officeDocument/2006/relationships" xmlns:p="http://schemas.openxmlformats.org/presentationml/2006/main">
+  <p:cSld>
+    <p:spTree>
+      <p:nvGrpSpPr>
+        <p:cNvPr id="1" name=""/>
+        <p:cNvGrpSpPr/>
+        <p:nvPr/>
+      </p:nvGrpSpPr>
+      <p:grpSpPr>
+        <a:xfrm>
+          <a:off x="0" y="0"/>
+          <a:ext cx="0" cy="0"/>
+          <a:chOff x="0" y="0"/>
+          <a:chExt cx="0" cy="0"/>
+        </a:xfrm>
+      </p:grpSpPr>
+      <p:sp>
+        <p:nvSpPr>
+          <p:cNvPr id="2" name="Slide Image Placeholder 1"/>
+          <p:cNvSpPr>
+            <a:spLocks noGrp="1" noRot="1" noChangeAspect="1"/>
+          </p:cNvSpPr>
+          <p:nvPr>
+            <p:ph type="sldImg"/>
+          </p:nvPr>
+        </p:nvSpPr>
+        <p:spPr/>
+      </p:sp>
+      <p:sp>
+        <p:nvSpPr>
+          <p:cNvPr id="3" name="Notes Placeholder 2"/>
+          <p:cNvSpPr>
+            <a:spLocks noGrp="1"/>
+          </p:cNvSpPr>
+          <p:nvPr>
+            <p:ph type="body" idx="1"/>
+          </p:nvPr>
+        </p:nvSpPr>
+        <p:spPr/>
+        <p:txBody>
+          <a:bodyPr/>
+          <a:lstStyle/>
+          <a:p>
+            <a:r>
+              <a:rPr lang="en-US" dirty="0" smtClean="0"/>
+              <a:t>We have a baseline benchmark that gives us a reference on returning an </a:t>
+            </a:r>
+            <a:r>
+              <a:rPr lang="en-US" dirty="0" err="1" smtClean="0"/>
+              <a:t>int</a:t>
+            </a:r>
+            <a:r>
+              <a:rPr lang="en-US" dirty="0" smtClean="0"/>
+              <a:t> value.   So we can subtract</a:t>
+            </a:r>
+            <a:r>
+              <a:rPr lang="en-US" baseline="0" dirty="0" smtClean="0"/>
+              <a:t> this from the cost of the sum method</a:t>
+            </a:r>
+            <a:endParaRPr lang="en-US" dirty="0" smtClean="0"/>
+          </a:p>
+          <a:p>
+            <a:endParaRPr lang="en-US" dirty="0" smtClean="0"/>
+          </a:p>
+          <a:p>
+            <a:r>
+              <a:rPr lang="en-US" dirty="0" smtClean="0"/>
+              <a:t>JMH takes care of reusing return values so as to defeat dead-code elimination. We also return the value of field x; because the value can be changed from a large number of sources, the virtual machine is unlikely to attempt constant folding optimizations. The code of sum is very similar.</a:t>
+            </a:r>
+            <a:endParaRPr lang="en-US" dirty="0"/>
+          </a:p>
+        </p:txBody>
+      </p:sp>
+      <p:sp>
+        <p:nvSpPr>
+          <p:cNvPr id="4" name="Slide Number Placeholder 3"/>
+          <p:cNvSpPr>
+            <a:spLocks noGrp="1"/>
+          </p:cNvSpPr>
+          <p:nvPr>
+            <p:ph type="sldNum" sz="quarter" idx="10"/>
+          </p:nvPr>
+        </p:nvSpPr>
+        <p:spPr/>
+        <p:txBody>
+          <a:bodyPr/>
+          <a:lstStyle/>
+          <a:p>
+            <a:fld id="{CFAD290B-5269-4E99-8A8A-8691B1EB0AE9}" type="slidenum">
+              <a:rPr lang="en-US" smtClean="0"/>
+              <a:t>11</a:t>
+            </a:fld>
+            <a:endParaRPr lang="en-US"/>
+          </a:p>
+        </p:txBody>
+      </p:sp>
+    </p:spTree>
+    <p:extLst>
+      <p:ext uri="{BB962C8B-B14F-4D97-AF65-F5344CB8AC3E}">
+        <p14:creationId xmlns:p14="http://schemas.microsoft.com/office/powerpoint/2010/main" val="335753211"/>
       </p:ext>
     </p:extLst>
   </p:cSld>
@@ -1403,7 +2398,7 @@
           <a:p>
             <a:fld id="{389CBC56-3CF8-4B9B-874C-BFFEBE1619EE}" type="datetimeFigureOut">
               <a:rPr lang="en-US" smtClean="0"/>
-              <a:t>1/14/2016</a:t>
+              <a:t>1/21/2016</a:t>
             </a:fld>
             <a:endParaRPr lang="en-US"/>
           </a:p>
@@ -1573,7 +2568,7 @@
           <a:p>
             <a:fld id="{389CBC56-3CF8-4B9B-874C-BFFEBE1619EE}" type="datetimeFigureOut">
               <a:rPr lang="en-US" smtClean="0"/>
-              <a:t>1/14/2016</a:t>
+              <a:t>1/21/2016</a:t>
             </a:fld>
             <a:endParaRPr lang="en-US"/>
           </a:p>
@@ -1753,7 +2748,7 @@
           <a:p>
             <a:fld id="{389CBC56-3CF8-4B9B-874C-BFFEBE1619EE}" type="datetimeFigureOut">
               <a:rPr lang="en-US" smtClean="0"/>
-              <a:t>1/14/2016</a:t>
+              <a:t>1/21/2016</a:t>
             </a:fld>
             <a:endParaRPr lang="en-US"/>
           </a:p>
@@ -1923,7 +2918,7 @@
           <a:p>
             <a:fld id="{389CBC56-3CF8-4B9B-874C-BFFEBE1619EE}" type="datetimeFigureOut">
               <a:rPr lang="en-US" smtClean="0"/>
-              <a:t>1/14/2016</a:t>
+              <a:t>1/21/2016</a:t>
             </a:fld>
             <a:endParaRPr lang="en-US"/>
           </a:p>
@@ -2169,7 +3164,7 @@
           <a:p>
             <a:fld id="{389CBC56-3CF8-4B9B-874C-BFFEBE1619EE}" type="datetimeFigureOut">
               <a:rPr lang="en-US" smtClean="0"/>
-              <a:t>1/14/2016</a:t>
+              <a:t>1/21/2016</a:t>
             </a:fld>
             <a:endParaRPr lang="en-US"/>
           </a:p>
@@ -2401,7 +3396,7 @@
           <a:p>
             <a:fld id="{389CBC56-3CF8-4B9B-874C-BFFEBE1619EE}" type="datetimeFigureOut">
               <a:rPr lang="en-US" smtClean="0"/>
-              <a:t>1/14/2016</a:t>
+              <a:t>1/21/2016</a:t>
             </a:fld>
             <a:endParaRPr lang="en-US"/>
           </a:p>
@@ -2768,7 +3763,7 @@
           <a:p>
             <a:fld id="{389CBC56-3CF8-4B9B-874C-BFFEBE1619EE}" type="datetimeFigureOut">
               <a:rPr lang="en-US" smtClean="0"/>
-              <a:t>1/14/2016</a:t>
+              <a:t>1/21/2016</a:t>
             </a:fld>
             <a:endParaRPr lang="en-US"/>
           </a:p>
@@ -2886,7 +3881,7 @@
           <a:p>
             <a:fld id="{389CBC56-3CF8-4B9B-874C-BFFEBE1619EE}" type="datetimeFigureOut">
               <a:rPr lang="en-US" smtClean="0"/>
-              <a:t>1/14/2016</a:t>
+              <a:t>1/21/2016</a:t>
             </a:fld>
             <a:endParaRPr lang="en-US"/>
           </a:p>
@@ -2981,7 +3976,7 @@
           <a:p>
             <a:fld id="{389CBC56-3CF8-4B9B-874C-BFFEBE1619EE}" type="datetimeFigureOut">
               <a:rPr lang="en-US" smtClean="0"/>
-              <a:t>1/14/2016</a:t>
+              <a:t>1/21/2016</a:t>
             </a:fld>
             <a:endParaRPr lang="en-US"/>
           </a:p>
@@ -3258,7 +4253,7 @@
           <a:p>
             <a:fld id="{389CBC56-3CF8-4B9B-874C-BFFEBE1619EE}" type="datetimeFigureOut">
               <a:rPr lang="en-US" smtClean="0"/>
-              <a:t>1/14/2016</a:t>
+              <a:t>1/21/2016</a:t>
             </a:fld>
             <a:endParaRPr lang="en-US"/>
           </a:p>
@@ -3511,7 +4506,7 @@
           <a:p>
             <a:fld id="{389CBC56-3CF8-4B9B-874C-BFFEBE1619EE}" type="datetimeFigureOut">
               <a:rPr lang="en-US" smtClean="0"/>
-              <a:t>1/14/2016</a:t>
+              <a:t>1/21/2016</a:t>
             </a:fld>
             <a:endParaRPr lang="en-US"/>
           </a:p>
@@ -3724,7 +4719,7 @@
           <a:p>
             <a:fld id="{389CBC56-3CF8-4B9B-874C-BFFEBE1619EE}" type="datetimeFigureOut">
               <a:rPr lang="en-US" smtClean="0"/>
-              <a:t>1/14/2016</a:t>
+              <a:t>1/21/2016</a:t>
             </a:fld>
             <a:endParaRPr lang="en-US"/>
           </a:p>
@@ -4141,10 +5136,32 @@
         </p:nvSpPr>
         <p:spPr/>
         <p:txBody>
-          <a:bodyPr/>
-          <a:lstStyle/>
-          <a:p>
-            <a:endParaRPr lang="en-US"/>
+          <a:bodyPr>
+            <a:normAutofit fontScale="90000"/>
+          </a:bodyPr>
+          <a:lstStyle/>
+          <a:p>
+            <a:r>
+              <a:rPr lang="en-US" dirty="0" smtClean="0"/>
+              <a:t>An Introdu</a:t>
+            </a:r>
+            <a:r>
+              <a:rPr lang="en-US" dirty="0" smtClean="0"/>
+              <a:t>ction to JVM </a:t>
+            </a:r>
+            <a:r>
+              <a:rPr lang="en-US" dirty="0" err="1" smtClean="0"/>
+              <a:t>Microbenchmarking</a:t>
+            </a:r>
+            <a:r>
+              <a:rPr lang="en-US" dirty="0" smtClean="0"/>
+              <a:t> with </a:t>
+            </a:r>
+            <a:r>
+              <a:rPr lang="en-US" dirty="0" smtClean="0"/>
+              <a:t>JMH</a:t>
+            </a:r>
+            <a:endParaRPr lang="en-US" dirty="0"/>
           </a:p>
         </p:txBody>
       </p:sp>
@@ -4163,7 +5180,17 @@
           <a:bodyPr/>
           <a:lstStyle/>
           <a:p>
-            <a:endParaRPr lang="en-US"/>
+            <a:r>
+              <a:rPr lang="en-US" dirty="0" smtClean="0"/>
+              <a:t>Tom Tresansky</a:t>
+            </a:r>
+          </a:p>
+          <a:p>
+            <a:r>
+              <a:rPr lang="en-US" dirty="0" smtClean="0"/>
+              <a:t>February 2016</a:t>
+            </a:r>
+            <a:endParaRPr lang="en-US" dirty="0"/>
           </a:p>
         </p:txBody>
       </p:sp>
@@ -4177,6 +5204,13 @@
   <p:clrMapOvr>
     <a:masterClrMapping/>
   </p:clrMapOvr>
+  <p:timing>
+    <p:tnLst>
+      <p:par>
+        <p:cTn id="1" dur="indefinite" restart="never" nodeType="tmRoot"/>
+      </p:par>
+    </p:tnLst>
+  </p:timing>
 </p:sld>
 </file>
 
@@ -4214,7 +5248,7 @@
           <a:p>
             <a:r>
               <a:rPr lang="en-US" dirty="0" smtClean="0"/>
-              <a:t>Further Considerations</a:t>
+              <a:t>Setting JVM/JMH Configuration </a:t>
             </a:r>
             <a:endParaRPr lang="en-US" dirty="0"/>
           </a:p>
@@ -4236,107 +5270,52 @@
           <a:lstStyle/>
           <a:p>
             <a:r>
-              <a:rPr lang="en-US" b="1" dirty="0"/>
-              <a:t>JMH annotations </a:t>
-            </a:r>
-            <a:r>
-              <a:rPr lang="en-US" b="1" dirty="0" err="1"/>
-              <a:t>Javadocs</a:t>
-            </a:r>
-            <a:r>
-              <a:rPr lang="en-US" b="1" dirty="0"/>
-              <a:t> and Samples are essential </a:t>
-            </a:r>
-            <a:r>
-              <a:rPr lang="en-US" b="1" dirty="0" smtClean="0"/>
-              <a:t>reading</a:t>
-            </a:r>
-            <a:endParaRPr lang="en-US" dirty="0" smtClean="0"/>
+              <a:rPr lang="en-US" dirty="0" smtClean="0"/>
+              <a:t>Like many annotations – most specific wins</a:t>
+            </a:r>
           </a:p>
           <a:p>
             <a:pPr lvl="1"/>
             <a:r>
               <a:rPr lang="en-US" dirty="0" smtClean="0"/>
-              <a:t>Follow </a:t>
-            </a:r>
-            <a:r>
-              <a:rPr lang="en-US" dirty="0"/>
-              <a:t>the </a:t>
-            </a:r>
-            <a:r>
-              <a:rPr lang="en-US" dirty="0">
-                <a:hlinkClick r:id="rId2"/>
-              </a:rPr>
-              <a:t>JMH samples</a:t>
-            </a:r>
-            <a:r>
-              <a:rPr lang="en-US" dirty="0"/>
-              <a:t> to get familiar with the API, use cases, culprits, and pitfalls </a:t>
-            </a:r>
-          </a:p>
-          <a:p>
-            <a:r>
-              <a:rPr lang="en-US" b="1" dirty="0" smtClean="0"/>
-              <a:t>Your </a:t>
-            </a:r>
-            <a:r>
-              <a:rPr lang="en-US" b="1" dirty="0"/>
-              <a:t>benchmarks should be </a:t>
-            </a:r>
-            <a:r>
-              <a:rPr lang="en-US" b="1" dirty="0" smtClean="0"/>
-              <a:t>peer-reviewed</a:t>
-            </a:r>
-            <a:endParaRPr lang="en-US" dirty="0" smtClean="0"/>
+              <a:t>Defaults in </a:t>
+            </a:r>
+            <a:r>
+              <a:rPr lang="en-US" dirty="0" err="1" smtClean="0"/>
+              <a:t>build.gradle</a:t>
+            </a:r>
+            <a:r>
+              <a:rPr lang="en-US" dirty="0" smtClean="0"/>
+              <a:t> file for all </a:t>
+            </a:r>
+            <a:r>
+              <a:rPr lang="en-US" dirty="0" err="1" smtClean="0"/>
+              <a:t>jmh</a:t>
+            </a:r>
+            <a:r>
+              <a:rPr lang="en-US" dirty="0" smtClean="0"/>
+              <a:t> benchmarks</a:t>
+            </a:r>
           </a:p>
           <a:p>
             <a:pPr lvl="1"/>
             <a:r>
               <a:rPr lang="en-US" dirty="0" smtClean="0"/>
-              <a:t>JMH does </a:t>
-            </a:r>
-            <a:r>
-              <a:rPr lang="en-US" b="1" dirty="0" smtClean="0"/>
-              <a:t>NOT</a:t>
-            </a:r>
-            <a:r>
-              <a:rPr lang="en-US" dirty="0" smtClean="0"/>
-              <a:t> magically </a:t>
-            </a:r>
-            <a:r>
-              <a:rPr lang="en-US" dirty="0"/>
-              <a:t>free you from considering benchmarking </a:t>
-            </a:r>
-            <a:r>
-              <a:rPr lang="en-US" dirty="0" smtClean="0"/>
-              <a:t>pitfalls</a:t>
+              <a:t>Override at class level (benchmark class) with JMH annotations</a:t>
             </a:r>
           </a:p>
           <a:p>
             <a:pPr lvl="1"/>
             <a:r>
               <a:rPr lang="en-US" dirty="0" smtClean="0"/>
-              <a:t>“We </a:t>
-            </a:r>
-            <a:r>
-              <a:rPr lang="en-US" dirty="0"/>
-              <a:t>only promise to make avoiding them easier, not </a:t>
-            </a:r>
-            <a:r>
-              <a:rPr lang="en-US" dirty="0" smtClean="0"/>
-              <a:t>avoid </a:t>
-            </a:r>
-            <a:r>
-              <a:rPr lang="en-US" dirty="0"/>
-              <a:t>them completely</a:t>
-            </a:r>
-            <a:r>
-              <a:rPr lang="en-US" dirty="0" smtClean="0"/>
-              <a:t>.”</a:t>
-            </a:r>
-            <a:endParaRPr lang="en-US" dirty="0"/>
-          </a:p>
-          <a:p>
+              <a:t>Override at method level (@Benchmark method) with other JMH annotations</a:t>
+            </a:r>
+          </a:p>
+          <a:p>
+            <a:r>
+              <a:rPr lang="en-US" dirty="0" smtClean="0"/>
+              <a:t>Both JMH and many relevant JVM options</a:t>
+            </a:r>
             <a:endParaRPr lang="en-US" dirty="0"/>
           </a:p>
         </p:txBody>
@@ -4344,13 +5323,20 @@
     </p:spTree>
     <p:extLst>
       <p:ext uri="{BB962C8B-B14F-4D97-AF65-F5344CB8AC3E}">
-        <p14:creationId xmlns:p14="http://schemas.microsoft.com/office/powerpoint/2010/main" val="347531558"/>
+        <p14:creationId xmlns:p14="http://schemas.microsoft.com/office/powerpoint/2010/main" val="1241904274"/>
       </p:ext>
     </p:extLst>
   </p:cSld>
   <p:clrMapOvr>
     <a:masterClrMapping/>
   </p:clrMapOvr>
+  <p:timing>
+    <p:tnLst>
+      <p:par>
+        <p:cTn id="1" dur="indefinite" restart="never" nodeType="tmRoot"/>
+      </p:par>
+    </p:tnLst>
+  </p:timing>
 </p:sld>
 </file>
 
@@ -4388,7 +5374,7 @@
           <a:p>
             <a:r>
               <a:rPr lang="en-US" dirty="0" smtClean="0"/>
-              <a:t>References</a:t>
+              <a:t>Demo 1</a:t>
             </a:r>
             <a:endParaRPr lang="en-US" dirty="0"/>
           </a:p>
@@ -4410,57 +5396,803 @@
           <a:lstStyle/>
           <a:p>
             <a:r>
-              <a:rPr lang="en-US" dirty="0">
-                <a:hlinkClick r:id="rId2"/>
-              </a:rPr>
-              <a:t>http://</a:t>
-            </a:r>
-            <a:r>
-              <a:rPr lang="en-US" dirty="0" smtClean="0">
-                <a:hlinkClick r:id="rId2"/>
-              </a:rPr>
-              <a:t>www.oracle.com/technetwork/articles/java/architect-benchmarking-2266277.html</a:t>
-            </a:r>
-            <a:endParaRPr lang="en-US" dirty="0" smtClean="0"/>
+              <a:rPr lang="en-US" dirty="0" smtClean="0"/>
+              <a:t>Goal – measure the cost of an addition</a:t>
+            </a:r>
+          </a:p>
+          <a:p>
+            <a:r>
+              <a:rPr lang="en-US" dirty="0" smtClean="0"/>
+              <a:t>Baseline method – cost</a:t>
+            </a:r>
+            <a:r>
+              <a:rPr lang="en-US" dirty="0"/>
+              <a:t> </a:t>
+            </a:r>
+            <a:r>
+              <a:rPr lang="en-US" dirty="0" smtClean="0"/>
+              <a:t>of a method call doing everything EXCEPT the addition</a:t>
+            </a:r>
+          </a:p>
+          <a:p>
+            <a:r>
+              <a:rPr lang="en-US" dirty="0" smtClean="0"/>
+              <a:t>Returning values from @Benchmark methods is important</a:t>
+            </a:r>
           </a:p>
           <a:p>
             <a:pPr lvl="1"/>
             <a:r>
               <a:rPr lang="en-US" dirty="0" smtClean="0"/>
-              <a:t>The basis for this whole </a:t>
-            </a:r>
-            <a:r>
-              <a:rPr lang="en-US" dirty="0" smtClean="0"/>
-              <a:t>presentation</a:t>
-            </a:r>
-          </a:p>
-          <a:p>
-            <a:pPr lvl="1"/>
-            <a:endParaRPr lang="en-US" dirty="0" smtClean="0"/>
-          </a:p>
-          <a:p>
-            <a:r>
-              <a:rPr lang="en-US" dirty="0" smtClean="0"/>
-              <a:t>Background</a:t>
-            </a:r>
-            <a:endParaRPr lang="en-US" dirty="0"/>
-          </a:p>
-          <a:p>
-            <a:pPr lvl="1"/>
-            <a:r>
-              <a:rPr lang="en-US" dirty="0">
-                <a:hlinkClick r:id="rId3"/>
-              </a:rPr>
-              <a:t>http://java-performance.info/jmh/</a:t>
-            </a:r>
-            <a:endParaRPr lang="en-US" dirty="0"/>
+              <a:t>Without it VM is very likely to optimize away the method calls completely</a:t>
+            </a:r>
+          </a:p>
+          <a:p>
+            <a:r>
+              <a:rPr lang="en-US" dirty="0" smtClean="0"/>
+              <a:t>Configuring benchmarks via annotations rather than </a:t>
+            </a:r>
+            <a:r>
+              <a:rPr lang="en-US" dirty="0" err="1" smtClean="0"/>
+              <a:t>Gradle</a:t>
+            </a:r>
+            <a:r>
+              <a:rPr lang="en-US" dirty="0" smtClean="0"/>
+              <a:t> properties</a:t>
+            </a:r>
+          </a:p>
+          <a:p>
+            <a:r>
+              <a:rPr lang="en-US" dirty="0" smtClean="0"/>
+              <a:t>The @State annotation tells JMH to keep x and y thread-scoped (more on this later)</a:t>
+            </a:r>
           </a:p>
         </p:txBody>
       </p:sp>
     </p:spTree>
     <p:extLst>
       <p:ext uri="{BB962C8B-B14F-4D97-AF65-F5344CB8AC3E}">
-        <p14:creationId xmlns:p14="http://schemas.microsoft.com/office/powerpoint/2010/main" val="1280026601"/>
+        <p14:creationId xmlns:p14="http://schemas.microsoft.com/office/powerpoint/2010/main" val="2727199964"/>
+      </p:ext>
+    </p:extLst>
+  </p:cSld>
+  <p:clrMapOvr>
+    <a:masterClrMapping/>
+  </p:clrMapOvr>
+  <p:timing>
+    <p:tnLst>
+      <p:par>
+        <p:cTn id="1" dur="indefinite" restart="never" nodeType="tmRoot"/>
+      </p:par>
+    </p:tnLst>
+  </p:timing>
+</p:sld>
+</file>
+
+<file path=ppt/slides/slide12.xml><?xml version="1.0" encoding="utf-8"?>
+<p:sld xmlns:a="http://schemas.openxmlformats.org/drawingml/2006/main" xmlns:r="http://schemas.openxmlformats.org/officeDocument/2006/relationships" xmlns:p="http://schemas.openxmlformats.org/presentationml/2006/main">
+  <p:cSld>
+    <p:spTree>
+      <p:nvGrpSpPr>
+        <p:cNvPr id="1" name=""/>
+        <p:cNvGrpSpPr/>
+        <p:nvPr/>
+      </p:nvGrpSpPr>
+      <p:grpSpPr>
+        <a:xfrm>
+          <a:off x="0" y="0"/>
+          <a:ext cx="0" cy="0"/>
+          <a:chOff x="0" y="0"/>
+          <a:chExt cx="0" cy="0"/>
+        </a:xfrm>
+      </p:grpSpPr>
+      <p:sp>
+        <p:nvSpPr>
+          <p:cNvPr id="2" name="Title 1"/>
+          <p:cNvSpPr>
+            <a:spLocks noGrp="1"/>
+          </p:cNvSpPr>
+          <p:nvPr>
+            <p:ph type="title"/>
+          </p:nvPr>
+        </p:nvSpPr>
+        <p:spPr/>
+        <p:txBody>
+          <a:bodyPr/>
+          <a:lstStyle/>
+          <a:p>
+            <a:r>
+              <a:rPr lang="en-US" dirty="0" smtClean="0"/>
+              <a:t>Levels of Repetition</a:t>
+            </a:r>
+            <a:endParaRPr lang="en-US" dirty="0"/>
+          </a:p>
+        </p:txBody>
+      </p:sp>
+      <p:sp>
+        <p:nvSpPr>
+          <p:cNvPr id="3" name="Content Placeholder 2"/>
+          <p:cNvSpPr>
+            <a:spLocks noGrp="1"/>
+          </p:cNvSpPr>
+          <p:nvPr>
+            <p:ph idx="1"/>
+          </p:nvPr>
+        </p:nvSpPr>
+        <p:spPr/>
+        <p:txBody>
+          <a:bodyPr/>
+          <a:lstStyle/>
+          <a:p>
+            <a:r>
+              <a:rPr lang="en-US" dirty="0" smtClean="0"/>
+              <a:t>Fork (default = 10)</a:t>
+            </a:r>
+          </a:p>
+          <a:p>
+            <a:pPr lvl="1"/>
+            <a:r>
+              <a:rPr lang="en-US" dirty="0" smtClean="0"/>
+              <a:t>Warmup Iterations (default = 20 @ 1 second each)</a:t>
+            </a:r>
+          </a:p>
+          <a:p>
+            <a:pPr lvl="1"/>
+            <a:r>
+              <a:rPr lang="en-US" dirty="0" smtClean="0"/>
+              <a:t>Test iterations (default = 20 @ 1 second each)</a:t>
+            </a:r>
+          </a:p>
+          <a:p>
+            <a:r>
+              <a:rPr lang="en-US" dirty="0" smtClean="0"/>
+              <a:t>More repetitions = greater accuracy</a:t>
+            </a:r>
+          </a:p>
+          <a:p>
+            <a:r>
+              <a:rPr lang="en-US" dirty="0" smtClean="0"/>
+              <a:t>Probably want to tone it down to begin</a:t>
+            </a:r>
+            <a:endParaRPr lang="en-US" dirty="0"/>
+          </a:p>
+        </p:txBody>
+      </p:sp>
+    </p:spTree>
+    <p:extLst>
+      <p:ext uri="{BB962C8B-B14F-4D97-AF65-F5344CB8AC3E}">
+        <p14:creationId xmlns:p14="http://schemas.microsoft.com/office/powerpoint/2010/main" val="352884205"/>
+      </p:ext>
+    </p:extLst>
+  </p:cSld>
+  <p:clrMapOvr>
+    <a:masterClrMapping/>
+  </p:clrMapOvr>
+  <p:timing>
+    <p:tnLst>
+      <p:par>
+        <p:cTn id="1" dur="indefinite" restart="never" nodeType="tmRoot"/>
+      </p:par>
+    </p:tnLst>
+  </p:timing>
+</p:sld>
+</file>
+
+<file path=ppt/slides/slide13.xml><?xml version="1.0" encoding="utf-8"?>
+<p:sld xmlns:a="http://schemas.openxmlformats.org/drawingml/2006/main" xmlns:r="http://schemas.openxmlformats.org/officeDocument/2006/relationships" xmlns:p="http://schemas.openxmlformats.org/presentationml/2006/main">
+  <p:cSld>
+    <p:spTree>
+      <p:nvGrpSpPr>
+        <p:cNvPr id="1" name=""/>
+        <p:cNvGrpSpPr/>
+        <p:nvPr/>
+      </p:nvGrpSpPr>
+      <p:grpSpPr>
+        <a:xfrm>
+          <a:off x="0" y="0"/>
+          <a:ext cx="0" cy="0"/>
+          <a:chOff x="0" y="0"/>
+          <a:chExt cx="0" cy="0"/>
+        </a:xfrm>
+      </p:grpSpPr>
+      <p:sp>
+        <p:nvSpPr>
+          <p:cNvPr id="2" name="Title 1"/>
+          <p:cNvSpPr>
+            <a:spLocks noGrp="1"/>
+          </p:cNvSpPr>
+          <p:nvPr>
+            <p:ph type="title"/>
+          </p:nvPr>
+        </p:nvSpPr>
+        <p:spPr/>
+        <p:txBody>
+          <a:bodyPr/>
+          <a:lstStyle/>
+          <a:p>
+            <a:r>
+              <a:rPr lang="en-US" dirty="0" smtClean="0"/>
+              <a:t>Limits of resolution</a:t>
+            </a:r>
+            <a:endParaRPr lang="en-US" dirty="0"/>
+          </a:p>
+        </p:txBody>
+      </p:sp>
+      <p:pic>
+        <p:nvPicPr>
+          <p:cNvPr id="4" name="Content Placeholder 3"/>
+          <p:cNvPicPr>
+            <a:picLocks noGrp="1" noChangeAspect="1"/>
+          </p:cNvPicPr>
+          <p:nvPr>
+            <p:ph idx="1"/>
+          </p:nvPr>
+        </p:nvPicPr>
+        <p:blipFill>
+          <a:blip r:embed="rId3">
+            <a:extLst>
+              <a:ext uri="{28A0092B-C50C-407E-A947-70E740481C1C}">
+                <a14:useLocalDpi xmlns:a14="http://schemas.microsoft.com/office/drawing/2010/main" val="0"/>
+              </a:ext>
+            </a:extLst>
+          </a:blip>
+          <a:stretch>
+            <a:fillRect/>
+          </a:stretch>
+        </p:blipFill>
+        <p:spPr>
+          <a:xfrm>
+            <a:off x="2602606" y="1690688"/>
+            <a:ext cx="6986788" cy="4650581"/>
+          </a:xfrm>
+        </p:spPr>
+      </p:pic>
+    </p:spTree>
+    <p:extLst>
+      <p:ext uri="{BB962C8B-B14F-4D97-AF65-F5344CB8AC3E}">
+        <p14:creationId xmlns:p14="http://schemas.microsoft.com/office/powerpoint/2010/main" val="2647426237"/>
+      </p:ext>
+    </p:extLst>
+  </p:cSld>
+  <p:clrMapOvr>
+    <a:masterClrMapping/>
+  </p:clrMapOvr>
+  <p:timing>
+    <p:tnLst>
+      <p:par>
+        <p:cTn id="1" dur="indefinite" restart="never" nodeType="tmRoot"/>
+      </p:par>
+    </p:tnLst>
+  </p:timing>
+</p:sld>
+</file>
+
+<file path=ppt/slides/slide14.xml><?xml version="1.0" encoding="utf-8"?>
+<p:sld xmlns:a="http://schemas.openxmlformats.org/drawingml/2006/main" xmlns:r="http://schemas.openxmlformats.org/officeDocument/2006/relationships" xmlns:p="http://schemas.openxmlformats.org/presentationml/2006/main">
+  <p:cSld>
+    <p:spTree>
+      <p:nvGrpSpPr>
+        <p:cNvPr id="1" name=""/>
+        <p:cNvGrpSpPr/>
+        <p:nvPr/>
+      </p:nvGrpSpPr>
+      <p:grpSpPr>
+        <a:xfrm>
+          <a:off x="0" y="0"/>
+          <a:ext cx="0" cy="0"/>
+          <a:chOff x="0" y="0"/>
+          <a:chExt cx="0" cy="0"/>
+        </a:xfrm>
+      </p:grpSpPr>
+      <p:sp>
+        <p:nvSpPr>
+          <p:cNvPr id="2" name="Title 1"/>
+          <p:cNvSpPr>
+            <a:spLocks noGrp="1"/>
+          </p:cNvSpPr>
+          <p:nvPr>
+            <p:ph type="title"/>
+          </p:nvPr>
+        </p:nvSpPr>
+        <p:spPr/>
+        <p:txBody>
+          <a:bodyPr/>
+          <a:lstStyle/>
+          <a:p>
+            <a:endParaRPr lang="en-US"/>
+          </a:p>
+        </p:txBody>
+      </p:sp>
+      <p:sp>
+        <p:nvSpPr>
+          <p:cNvPr id="3" name="Content Placeholder 2"/>
+          <p:cNvSpPr>
+            <a:spLocks noGrp="1"/>
+          </p:cNvSpPr>
+          <p:nvPr>
+            <p:ph idx="1"/>
+          </p:nvPr>
+        </p:nvSpPr>
+        <p:spPr/>
+        <p:txBody>
+          <a:bodyPr/>
+          <a:lstStyle/>
+          <a:p>
+            <a:endParaRPr lang="en-US"/>
+          </a:p>
+        </p:txBody>
+      </p:sp>
+    </p:spTree>
+    <p:extLst>
+      <p:ext uri="{BB962C8B-B14F-4D97-AF65-F5344CB8AC3E}">
+        <p14:creationId xmlns:p14="http://schemas.microsoft.com/office/powerpoint/2010/main" val="2066432178"/>
+      </p:ext>
+    </p:extLst>
+  </p:cSld>
+  <p:clrMapOvr>
+    <a:masterClrMapping/>
+  </p:clrMapOvr>
+</p:sld>
+</file>
+
+<file path=ppt/slides/slide15.xml><?xml version="1.0" encoding="utf-8"?>
+<p:sld xmlns:a="http://schemas.openxmlformats.org/drawingml/2006/main" xmlns:r="http://schemas.openxmlformats.org/officeDocument/2006/relationships" xmlns:p="http://schemas.openxmlformats.org/presentationml/2006/main">
+  <p:cSld>
+    <p:spTree>
+      <p:nvGrpSpPr>
+        <p:cNvPr id="1" name=""/>
+        <p:cNvGrpSpPr/>
+        <p:nvPr/>
+      </p:nvGrpSpPr>
+      <p:grpSpPr>
+        <a:xfrm>
+          <a:off x="0" y="0"/>
+          <a:ext cx="0" cy="0"/>
+          <a:chOff x="0" y="0"/>
+          <a:chExt cx="0" cy="0"/>
+        </a:xfrm>
+      </p:grpSpPr>
+      <p:sp>
+        <p:nvSpPr>
+          <p:cNvPr id="2" name="Title 1"/>
+          <p:cNvSpPr>
+            <a:spLocks noGrp="1"/>
+          </p:cNvSpPr>
+          <p:nvPr>
+            <p:ph type="title"/>
+          </p:nvPr>
+        </p:nvSpPr>
+        <p:spPr/>
+        <p:txBody>
+          <a:bodyPr/>
+          <a:lstStyle/>
+          <a:p>
+            <a:r>
+              <a:rPr lang="en-US" dirty="0" smtClean="0"/>
+              <a:t>@State</a:t>
+            </a:r>
+            <a:endParaRPr lang="en-US" dirty="0"/>
+          </a:p>
+        </p:txBody>
+      </p:sp>
+      <p:sp>
+        <p:nvSpPr>
+          <p:cNvPr id="3" name="Content Placeholder 2"/>
+          <p:cNvSpPr>
+            <a:spLocks noGrp="1"/>
+          </p:cNvSpPr>
+          <p:nvPr>
+            <p:ph idx="1"/>
+          </p:nvPr>
+        </p:nvSpPr>
+        <p:spPr/>
+        <p:txBody>
+          <a:bodyPr/>
+          <a:lstStyle/>
+          <a:p>
+            <a:endParaRPr lang="en-US" dirty="0"/>
+          </a:p>
+        </p:txBody>
+      </p:sp>
+    </p:spTree>
+    <p:extLst>
+      <p:ext uri="{BB962C8B-B14F-4D97-AF65-F5344CB8AC3E}">
+        <p14:creationId xmlns:p14="http://schemas.microsoft.com/office/powerpoint/2010/main" val="732500269"/>
+      </p:ext>
+    </p:extLst>
+  </p:cSld>
+  <p:clrMapOvr>
+    <a:masterClrMapping/>
+  </p:clrMapOvr>
+</p:sld>
+</file>
+
+<file path=ppt/slides/slide16.xml><?xml version="1.0" encoding="utf-8"?>
+<p:sld xmlns:a="http://schemas.openxmlformats.org/drawingml/2006/main" xmlns:r="http://schemas.openxmlformats.org/officeDocument/2006/relationships" xmlns:p="http://schemas.openxmlformats.org/presentationml/2006/main">
+  <p:cSld>
+    <p:spTree>
+      <p:nvGrpSpPr>
+        <p:cNvPr id="1" name=""/>
+        <p:cNvGrpSpPr/>
+        <p:nvPr/>
+      </p:nvGrpSpPr>
+      <p:grpSpPr>
+        <a:xfrm>
+          <a:off x="0" y="0"/>
+          <a:ext cx="0" cy="0"/>
+          <a:chOff x="0" y="0"/>
+          <a:chExt cx="0" cy="0"/>
+        </a:xfrm>
+      </p:grpSpPr>
+      <p:sp>
+        <p:nvSpPr>
+          <p:cNvPr id="2" name="Title 1"/>
+          <p:cNvSpPr>
+            <a:spLocks noGrp="1"/>
+          </p:cNvSpPr>
+          <p:nvPr>
+            <p:ph type="title"/>
+          </p:nvPr>
+        </p:nvSpPr>
+        <p:spPr/>
+        <p:txBody>
+          <a:bodyPr/>
+          <a:lstStyle/>
+          <a:p>
+            <a:r>
+              <a:rPr lang="en-US" dirty="0" err="1" smtClean="0"/>
+              <a:t>Blackhole</a:t>
+            </a:r>
+            <a:endParaRPr lang="en-US" dirty="0"/>
+          </a:p>
+        </p:txBody>
+      </p:sp>
+      <p:sp>
+        <p:nvSpPr>
+          <p:cNvPr id="3" name="Content Placeholder 2"/>
+          <p:cNvSpPr>
+            <a:spLocks noGrp="1"/>
+          </p:cNvSpPr>
+          <p:nvPr>
+            <p:ph idx="1"/>
+          </p:nvPr>
+        </p:nvSpPr>
+        <p:spPr/>
+        <p:txBody>
+          <a:bodyPr>
+            <a:normAutofit lnSpcReduction="10000"/>
+          </a:bodyPr>
+          <a:lstStyle/>
+          <a:p>
+            <a:r>
+              <a:rPr lang="en-US" dirty="0" err="1" smtClean="0"/>
+              <a:t>org.openjdk.jmh.infra.Blackhole</a:t>
+            </a:r>
+            <a:endParaRPr lang="en-US" dirty="0" smtClean="0"/>
+          </a:p>
+          <a:p>
+            <a:r>
+              <a:rPr lang="en-US" dirty="0" smtClean="0"/>
+              <a:t>Avoid possibility of dead code elimination</a:t>
+            </a:r>
+          </a:p>
+          <a:p>
+            <a:pPr lvl="1"/>
+            <a:r>
+              <a:rPr lang="en-US" dirty="0" smtClean="0"/>
+              <a:t>Provides consume(Object x) methods – send your method’s output here </a:t>
+            </a:r>
+          </a:p>
+          <a:p>
+            <a:pPr lvl="1"/>
+            <a:r>
+              <a:rPr lang="en-US" dirty="0" smtClean="0"/>
+              <a:t>Instances are </a:t>
+            </a:r>
+            <a:r>
+              <a:rPr lang="en-US" dirty="0"/>
+              <a:t>a</a:t>
+            </a:r>
+            <a:r>
+              <a:rPr lang="en-US" dirty="0" smtClean="0"/>
+              <a:t>utomatically injected into your @Benchmark method calls as arguments</a:t>
+            </a:r>
+            <a:endParaRPr lang="en-US" dirty="0"/>
+          </a:p>
+          <a:p>
+            <a:r>
+              <a:rPr lang="en-US" i="1" dirty="0" err="1" smtClean="0"/>
+              <a:t>Blackhole</a:t>
+            </a:r>
+            <a:r>
+              <a:rPr lang="en-US" i="1" dirty="0" smtClean="0"/>
+              <a:t> </a:t>
+            </a:r>
+            <a:r>
+              <a:rPr lang="en-US" i="1" dirty="0"/>
+              <a:t>"consumes" the values, conceiving no information to JIT whether </a:t>
+            </a:r>
+            <a:r>
+              <a:rPr lang="en-US" i="1" dirty="0" smtClean="0"/>
+              <a:t>the </a:t>
+            </a:r>
+            <a:r>
+              <a:rPr lang="en-US" i="1" dirty="0"/>
+              <a:t>value is actually used afterwards. This can save from the dead-code </a:t>
+            </a:r>
+            <a:r>
+              <a:rPr lang="en-US" i="1" dirty="0" smtClean="0"/>
+              <a:t>elimination </a:t>
+            </a:r>
+            <a:r>
+              <a:rPr lang="en-US" i="1" dirty="0"/>
+              <a:t>of the computations resulting in the given values</a:t>
+            </a:r>
+            <a:r>
+              <a:rPr lang="en-US" i="1" dirty="0" smtClean="0"/>
+              <a:t>.</a:t>
+            </a:r>
+          </a:p>
+          <a:p>
+            <a:r>
+              <a:rPr lang="en-US" dirty="0" smtClean="0"/>
+              <a:t>But how does it work?</a:t>
+            </a:r>
+          </a:p>
+          <a:p>
+            <a:pPr lvl="1"/>
+            <a:r>
+              <a:rPr lang="en-US" dirty="0" smtClean="0"/>
+              <a:t>???????????????</a:t>
+            </a:r>
+            <a:endParaRPr lang="en-US" dirty="0"/>
+          </a:p>
+        </p:txBody>
+      </p:sp>
+    </p:spTree>
+    <p:extLst>
+      <p:ext uri="{BB962C8B-B14F-4D97-AF65-F5344CB8AC3E}">
+        <p14:creationId xmlns:p14="http://schemas.microsoft.com/office/powerpoint/2010/main" val="3674696377"/>
+      </p:ext>
+    </p:extLst>
+  </p:cSld>
+  <p:clrMapOvr>
+    <a:masterClrMapping/>
+  </p:clrMapOvr>
+</p:sld>
+</file>
+
+<file path=ppt/slides/slide17.xml><?xml version="1.0" encoding="utf-8"?>
+<p:sld xmlns:a="http://schemas.openxmlformats.org/drawingml/2006/main" xmlns:r="http://schemas.openxmlformats.org/officeDocument/2006/relationships" xmlns:p="http://schemas.openxmlformats.org/presentationml/2006/main">
+  <p:cSld>
+    <p:spTree>
+      <p:nvGrpSpPr>
+        <p:cNvPr id="1" name=""/>
+        <p:cNvGrpSpPr/>
+        <p:nvPr/>
+      </p:nvGrpSpPr>
+      <p:grpSpPr>
+        <a:xfrm>
+          <a:off x="0" y="0"/>
+          <a:ext cx="0" cy="0"/>
+          <a:chOff x="0" y="0"/>
+          <a:chExt cx="0" cy="0"/>
+        </a:xfrm>
+      </p:grpSpPr>
+      <p:sp>
+        <p:nvSpPr>
+          <p:cNvPr id="6" name="Title 5"/>
+          <p:cNvSpPr>
+            <a:spLocks noGrp="1"/>
+          </p:cNvSpPr>
+          <p:nvPr>
+            <p:ph type="title"/>
+          </p:nvPr>
+        </p:nvSpPr>
+        <p:spPr/>
+        <p:txBody>
+          <a:bodyPr/>
+          <a:lstStyle/>
+          <a:p>
+            <a:r>
+              <a:rPr lang="en-US" dirty="0" err="1" smtClean="0"/>
+              <a:t>Blackhole</a:t>
+            </a:r>
+            <a:endParaRPr lang="en-US" dirty="0"/>
+          </a:p>
+        </p:txBody>
+      </p:sp>
+      <p:pic>
+        <p:nvPicPr>
+          <p:cNvPr id="10" name="Content Placeholder 9"/>
+          <p:cNvPicPr>
+            <a:picLocks noGrp="1" noChangeAspect="1"/>
+          </p:cNvPicPr>
+          <p:nvPr>
+            <p:ph idx="1"/>
+          </p:nvPr>
+        </p:nvPicPr>
+        <p:blipFill>
+          <a:blip r:embed="rId3">
+            <a:extLst>
+              <a:ext uri="{28A0092B-C50C-407E-A947-70E740481C1C}">
+                <a14:useLocalDpi xmlns:a14="http://schemas.microsoft.com/office/drawing/2010/main" val="0"/>
+              </a:ext>
+            </a:extLst>
+          </a:blip>
+          <a:stretch>
+            <a:fillRect/>
+          </a:stretch>
+        </p:blipFill>
+        <p:spPr>
+          <a:xfrm>
+            <a:off x="3659605" y="1690688"/>
+            <a:ext cx="4872789" cy="4872789"/>
+          </a:xfrm>
+        </p:spPr>
+      </p:pic>
+    </p:spTree>
+    <p:extLst>
+      <p:ext uri="{BB962C8B-B14F-4D97-AF65-F5344CB8AC3E}">
+        <p14:creationId xmlns:p14="http://schemas.microsoft.com/office/powerpoint/2010/main" val="4050977968"/>
+      </p:ext>
+    </p:extLst>
+  </p:cSld>
+  <p:clrMapOvr>
+    <a:masterClrMapping/>
+  </p:clrMapOvr>
+</p:sld>
+</file>
+
+<file path=ppt/slides/slide18.xml><?xml version="1.0" encoding="utf-8"?>
+<p:sld xmlns:a="http://schemas.openxmlformats.org/drawingml/2006/main" xmlns:r="http://schemas.openxmlformats.org/officeDocument/2006/relationships" xmlns:p="http://schemas.openxmlformats.org/presentationml/2006/main">
+  <p:cSld>
+    <p:spTree>
+      <p:nvGrpSpPr>
+        <p:cNvPr id="1" name=""/>
+        <p:cNvGrpSpPr/>
+        <p:nvPr/>
+      </p:nvGrpSpPr>
+      <p:grpSpPr>
+        <a:xfrm>
+          <a:off x="0" y="0"/>
+          <a:ext cx="0" cy="0"/>
+          <a:chOff x="0" y="0"/>
+          <a:chExt cx="0" cy="0"/>
+        </a:xfrm>
+      </p:grpSpPr>
+      <p:sp>
+        <p:nvSpPr>
+          <p:cNvPr id="2" name="Title 1"/>
+          <p:cNvSpPr>
+            <a:spLocks noGrp="1"/>
+          </p:cNvSpPr>
+          <p:nvPr>
+            <p:ph type="title"/>
+          </p:nvPr>
+        </p:nvSpPr>
+        <p:spPr/>
+        <p:txBody>
+          <a:bodyPr/>
+          <a:lstStyle/>
+          <a:p>
+            <a:r>
+              <a:rPr lang="en-US" dirty="0" smtClean="0"/>
+              <a:t>@</a:t>
+            </a:r>
+            <a:r>
+              <a:rPr lang="en-US" dirty="0" err="1" smtClean="0"/>
+              <a:t>Blackhole</a:t>
+            </a:r>
+            <a:endParaRPr lang="en-US" dirty="0"/>
+          </a:p>
+        </p:txBody>
+      </p:sp>
+      <p:sp>
+        <p:nvSpPr>
+          <p:cNvPr id="3" name="Content Placeholder 2"/>
+          <p:cNvSpPr>
+            <a:spLocks noGrp="1"/>
+          </p:cNvSpPr>
+          <p:nvPr>
+            <p:ph idx="1"/>
+          </p:nvPr>
+        </p:nvSpPr>
+        <p:spPr/>
+        <p:txBody>
+          <a:bodyPr/>
+          <a:lstStyle/>
+          <a:p>
+            <a:r>
+              <a:rPr lang="en-US" dirty="0" smtClean="0"/>
+              <a:t>Outsmart the JIT</a:t>
+            </a:r>
+          </a:p>
+          <a:p>
+            <a:r>
+              <a:rPr lang="en-US" dirty="0" smtClean="0"/>
+              <a:t>Make certain it can’t tell a value isn’t used afterwards…by using it</a:t>
+            </a:r>
+            <a:endParaRPr lang="en-US" dirty="0"/>
+          </a:p>
+        </p:txBody>
+      </p:sp>
+    </p:spTree>
+    <p:extLst>
+      <p:ext uri="{BB962C8B-B14F-4D97-AF65-F5344CB8AC3E}">
+        <p14:creationId xmlns:p14="http://schemas.microsoft.com/office/powerpoint/2010/main" val="602434920"/>
+      </p:ext>
+    </p:extLst>
+  </p:cSld>
+  <p:clrMapOvr>
+    <a:masterClrMapping/>
+  </p:clrMapOvr>
+</p:sld>
+</file>
+
+<file path=ppt/slides/slide19.xml><?xml version="1.0" encoding="utf-8"?>
+<p:sld xmlns:a="http://schemas.openxmlformats.org/drawingml/2006/main" xmlns:r="http://schemas.openxmlformats.org/officeDocument/2006/relationships" xmlns:p="http://schemas.openxmlformats.org/presentationml/2006/main">
+  <p:cSld>
+    <p:spTree>
+      <p:nvGrpSpPr>
+        <p:cNvPr id="1" name=""/>
+        <p:cNvGrpSpPr/>
+        <p:nvPr/>
+      </p:nvGrpSpPr>
+      <p:grpSpPr>
+        <a:xfrm>
+          <a:off x="0" y="0"/>
+          <a:ext cx="0" cy="0"/>
+          <a:chOff x="0" y="0"/>
+          <a:chExt cx="0" cy="0"/>
+        </a:xfrm>
+      </p:grpSpPr>
+      <p:sp>
+        <p:nvSpPr>
+          <p:cNvPr id="2" name="Title 1"/>
+          <p:cNvSpPr>
+            <a:spLocks noGrp="1"/>
+          </p:cNvSpPr>
+          <p:nvPr>
+            <p:ph type="title"/>
+          </p:nvPr>
+        </p:nvSpPr>
+        <p:spPr/>
+        <p:txBody>
+          <a:bodyPr/>
+          <a:lstStyle/>
+          <a:p>
+            <a:r>
+              <a:rPr lang="en-US" dirty="0" smtClean="0"/>
+              <a:t>Demo 2</a:t>
+            </a:r>
+            <a:endParaRPr lang="en-US" dirty="0"/>
+          </a:p>
+        </p:txBody>
+      </p:sp>
+      <p:sp>
+        <p:nvSpPr>
+          <p:cNvPr id="3" name="Content Placeholder 2"/>
+          <p:cNvSpPr>
+            <a:spLocks noGrp="1"/>
+          </p:cNvSpPr>
+          <p:nvPr>
+            <p:ph idx="1"/>
+          </p:nvPr>
+        </p:nvSpPr>
+        <p:spPr/>
+        <p:txBody>
+          <a:bodyPr/>
+          <a:lstStyle/>
+          <a:p>
+            <a:endParaRPr lang="en-US" dirty="0"/>
+          </a:p>
+        </p:txBody>
+      </p:sp>
+    </p:spTree>
+    <p:extLst>
+      <p:ext uri="{BB962C8B-B14F-4D97-AF65-F5344CB8AC3E}">
+        <p14:creationId xmlns:p14="http://schemas.microsoft.com/office/powerpoint/2010/main" val="1252817105"/>
       </p:ext>
     </p:extLst>
   </p:cSld>
@@ -4555,6 +6287,385 @@
   <p:clrMapOvr>
     <a:masterClrMapping/>
   </p:clrMapOvr>
+  <p:timing>
+    <p:tnLst>
+      <p:par>
+        <p:cTn id="1" dur="indefinite" restart="never" nodeType="tmRoot"/>
+      </p:par>
+    </p:tnLst>
+  </p:timing>
+</p:sld>
+</file>
+
+<file path=ppt/slides/slide20.xml><?xml version="1.0" encoding="utf-8"?>
+<p:sld xmlns:a="http://schemas.openxmlformats.org/drawingml/2006/main" xmlns:r="http://schemas.openxmlformats.org/officeDocument/2006/relationships" xmlns:p="http://schemas.openxmlformats.org/presentationml/2006/main">
+  <p:cSld>
+    <p:spTree>
+      <p:nvGrpSpPr>
+        <p:cNvPr id="1" name=""/>
+        <p:cNvGrpSpPr/>
+        <p:nvPr/>
+      </p:nvGrpSpPr>
+      <p:grpSpPr>
+        <a:xfrm>
+          <a:off x="0" y="0"/>
+          <a:ext cx="0" cy="0"/>
+          <a:chOff x="0" y="0"/>
+          <a:chExt cx="0" cy="0"/>
+        </a:xfrm>
+      </p:grpSpPr>
+      <p:sp>
+        <p:nvSpPr>
+          <p:cNvPr id="2" name="Title 1"/>
+          <p:cNvSpPr>
+            <a:spLocks noGrp="1"/>
+          </p:cNvSpPr>
+          <p:nvPr>
+            <p:ph type="title"/>
+          </p:nvPr>
+        </p:nvSpPr>
+        <p:spPr/>
+        <p:txBody>
+          <a:bodyPr/>
+          <a:lstStyle/>
+          <a:p>
+            <a:r>
+              <a:rPr lang="en-US" dirty="0" smtClean="0"/>
+              <a:t>Demo 2 - Results</a:t>
+            </a:r>
+            <a:endParaRPr lang="en-US" dirty="0"/>
+          </a:p>
+        </p:txBody>
+      </p:sp>
+      <p:sp>
+        <p:nvSpPr>
+          <p:cNvPr id="3" name="Content Placeholder 2"/>
+          <p:cNvSpPr>
+            <a:spLocks noGrp="1"/>
+          </p:cNvSpPr>
+          <p:nvPr>
+            <p:ph idx="1"/>
+          </p:nvPr>
+        </p:nvSpPr>
+        <p:spPr/>
+        <p:txBody>
+          <a:bodyPr/>
+          <a:lstStyle/>
+          <a:p>
+            <a:endParaRPr lang="en-US" dirty="0"/>
+          </a:p>
+        </p:txBody>
+      </p:sp>
+    </p:spTree>
+    <p:extLst>
+      <p:ext uri="{BB962C8B-B14F-4D97-AF65-F5344CB8AC3E}">
+        <p14:creationId xmlns:p14="http://schemas.microsoft.com/office/powerpoint/2010/main" val="2511131901"/>
+      </p:ext>
+    </p:extLst>
+  </p:cSld>
+  <p:clrMapOvr>
+    <a:masterClrMapping/>
+  </p:clrMapOvr>
+</p:sld>
+</file>
+
+<file path=ppt/slides/slide21.xml><?xml version="1.0" encoding="utf-8"?>
+<p:sld xmlns:a="http://schemas.openxmlformats.org/drawingml/2006/main" xmlns:r="http://schemas.openxmlformats.org/officeDocument/2006/relationships" xmlns:p="http://schemas.openxmlformats.org/presentationml/2006/main">
+  <p:cSld>
+    <p:spTree>
+      <p:nvGrpSpPr>
+        <p:cNvPr id="1" name=""/>
+        <p:cNvGrpSpPr/>
+        <p:nvPr/>
+      </p:nvGrpSpPr>
+      <p:grpSpPr>
+        <a:xfrm>
+          <a:off x="0" y="0"/>
+          <a:ext cx="0" cy="0"/>
+          <a:chOff x="0" y="0"/>
+          <a:chExt cx="0" cy="0"/>
+        </a:xfrm>
+      </p:grpSpPr>
+      <p:sp>
+        <p:nvSpPr>
+          <p:cNvPr id="2" name="Title 1"/>
+          <p:cNvSpPr>
+            <a:spLocks noGrp="1"/>
+          </p:cNvSpPr>
+          <p:nvPr>
+            <p:ph type="title"/>
+          </p:nvPr>
+        </p:nvSpPr>
+        <p:spPr/>
+        <p:txBody>
+          <a:bodyPr/>
+          <a:lstStyle/>
+          <a:p>
+            <a:r>
+              <a:rPr lang="en-US" dirty="0" smtClean="0"/>
+              <a:t>Further Considerations</a:t>
+            </a:r>
+            <a:endParaRPr lang="en-US" dirty="0"/>
+          </a:p>
+        </p:txBody>
+      </p:sp>
+      <p:sp>
+        <p:nvSpPr>
+          <p:cNvPr id="3" name="Content Placeholder 2"/>
+          <p:cNvSpPr>
+            <a:spLocks noGrp="1"/>
+          </p:cNvSpPr>
+          <p:nvPr>
+            <p:ph idx="1"/>
+          </p:nvPr>
+        </p:nvSpPr>
+        <p:spPr/>
+        <p:txBody>
+          <a:bodyPr/>
+          <a:lstStyle/>
+          <a:p>
+            <a:r>
+              <a:rPr lang="en-US" b="1" dirty="0"/>
+              <a:t>JMH annotations </a:t>
+            </a:r>
+            <a:r>
+              <a:rPr lang="en-US" b="1" dirty="0" err="1"/>
+              <a:t>Javadocs</a:t>
+            </a:r>
+            <a:r>
+              <a:rPr lang="en-US" b="1" dirty="0"/>
+              <a:t> and Samples are essential </a:t>
+            </a:r>
+            <a:r>
+              <a:rPr lang="en-US" b="1" dirty="0" smtClean="0"/>
+              <a:t>reading</a:t>
+            </a:r>
+            <a:endParaRPr lang="en-US" dirty="0" smtClean="0"/>
+          </a:p>
+          <a:p>
+            <a:pPr lvl="1"/>
+            <a:r>
+              <a:rPr lang="en-US" dirty="0" smtClean="0"/>
+              <a:t>Follow </a:t>
+            </a:r>
+            <a:r>
+              <a:rPr lang="en-US" dirty="0"/>
+              <a:t>the </a:t>
+            </a:r>
+            <a:r>
+              <a:rPr lang="en-US" dirty="0">
+                <a:hlinkClick r:id="rId2"/>
+              </a:rPr>
+              <a:t>JMH samples</a:t>
+            </a:r>
+            <a:r>
+              <a:rPr lang="en-US" dirty="0"/>
+              <a:t> to get familiar with the API, use cases, culprits, and pitfalls </a:t>
+            </a:r>
+          </a:p>
+          <a:p>
+            <a:r>
+              <a:rPr lang="en-US" b="1" dirty="0" smtClean="0"/>
+              <a:t>Your </a:t>
+            </a:r>
+            <a:r>
+              <a:rPr lang="en-US" b="1" dirty="0"/>
+              <a:t>benchmarks should be </a:t>
+            </a:r>
+            <a:r>
+              <a:rPr lang="en-US" b="1" dirty="0" smtClean="0"/>
+              <a:t>peer-reviewed</a:t>
+            </a:r>
+            <a:endParaRPr lang="en-US" dirty="0" smtClean="0"/>
+          </a:p>
+          <a:p>
+            <a:pPr lvl="1"/>
+            <a:r>
+              <a:rPr lang="en-US" dirty="0" smtClean="0"/>
+              <a:t>JMH does </a:t>
+            </a:r>
+            <a:r>
+              <a:rPr lang="en-US" b="1" dirty="0" smtClean="0"/>
+              <a:t>NOT</a:t>
+            </a:r>
+            <a:r>
+              <a:rPr lang="en-US" dirty="0" smtClean="0"/>
+              <a:t> magically </a:t>
+            </a:r>
+            <a:r>
+              <a:rPr lang="en-US" dirty="0"/>
+              <a:t>free you from considering benchmarking </a:t>
+            </a:r>
+            <a:r>
+              <a:rPr lang="en-US" dirty="0" smtClean="0"/>
+              <a:t>pitfalls</a:t>
+            </a:r>
+          </a:p>
+          <a:p>
+            <a:pPr lvl="1"/>
+            <a:r>
+              <a:rPr lang="en-US" dirty="0" smtClean="0"/>
+              <a:t>“We </a:t>
+            </a:r>
+            <a:r>
+              <a:rPr lang="en-US" dirty="0"/>
+              <a:t>only promise to make avoiding them easier, not </a:t>
+            </a:r>
+            <a:r>
+              <a:rPr lang="en-US" dirty="0" smtClean="0"/>
+              <a:t>avoid </a:t>
+            </a:r>
+            <a:r>
+              <a:rPr lang="en-US" dirty="0"/>
+              <a:t>them completely</a:t>
+            </a:r>
+            <a:r>
+              <a:rPr lang="en-US" dirty="0" smtClean="0"/>
+              <a:t>.”</a:t>
+            </a:r>
+            <a:endParaRPr lang="en-US" dirty="0"/>
+          </a:p>
+          <a:p>
+            <a:endParaRPr lang="en-US" dirty="0"/>
+          </a:p>
+        </p:txBody>
+      </p:sp>
+    </p:spTree>
+    <p:extLst>
+      <p:ext uri="{BB962C8B-B14F-4D97-AF65-F5344CB8AC3E}">
+        <p14:creationId xmlns:p14="http://schemas.microsoft.com/office/powerpoint/2010/main" val="347531558"/>
+      </p:ext>
+    </p:extLst>
+  </p:cSld>
+  <p:clrMapOvr>
+    <a:masterClrMapping/>
+  </p:clrMapOvr>
+  <p:timing>
+    <p:tnLst>
+      <p:par>
+        <p:cTn id="1" dur="indefinite" restart="never" nodeType="tmRoot"/>
+      </p:par>
+    </p:tnLst>
+  </p:timing>
+</p:sld>
+</file>
+
+<file path=ppt/slides/slide22.xml><?xml version="1.0" encoding="utf-8"?>
+<p:sld xmlns:a="http://schemas.openxmlformats.org/drawingml/2006/main" xmlns:r="http://schemas.openxmlformats.org/officeDocument/2006/relationships" xmlns:p="http://schemas.openxmlformats.org/presentationml/2006/main">
+  <p:cSld>
+    <p:spTree>
+      <p:nvGrpSpPr>
+        <p:cNvPr id="1" name=""/>
+        <p:cNvGrpSpPr/>
+        <p:nvPr/>
+      </p:nvGrpSpPr>
+      <p:grpSpPr>
+        <a:xfrm>
+          <a:off x="0" y="0"/>
+          <a:ext cx="0" cy="0"/>
+          <a:chOff x="0" y="0"/>
+          <a:chExt cx="0" cy="0"/>
+        </a:xfrm>
+      </p:grpSpPr>
+      <p:sp>
+        <p:nvSpPr>
+          <p:cNvPr id="2" name="Title 1"/>
+          <p:cNvSpPr>
+            <a:spLocks noGrp="1"/>
+          </p:cNvSpPr>
+          <p:nvPr>
+            <p:ph type="title"/>
+          </p:nvPr>
+        </p:nvSpPr>
+        <p:spPr/>
+        <p:txBody>
+          <a:bodyPr/>
+          <a:lstStyle/>
+          <a:p>
+            <a:r>
+              <a:rPr lang="en-US" dirty="0" smtClean="0"/>
+              <a:t>References</a:t>
+            </a:r>
+            <a:endParaRPr lang="en-US" dirty="0"/>
+          </a:p>
+        </p:txBody>
+      </p:sp>
+      <p:sp>
+        <p:nvSpPr>
+          <p:cNvPr id="3" name="Content Placeholder 2"/>
+          <p:cNvSpPr>
+            <a:spLocks noGrp="1"/>
+          </p:cNvSpPr>
+          <p:nvPr>
+            <p:ph idx="1"/>
+          </p:nvPr>
+        </p:nvSpPr>
+        <p:spPr/>
+        <p:txBody>
+          <a:bodyPr/>
+          <a:lstStyle/>
+          <a:p>
+            <a:r>
+              <a:rPr lang="en-US" dirty="0">
+                <a:hlinkClick r:id="rId2"/>
+              </a:rPr>
+              <a:t>http://</a:t>
+            </a:r>
+            <a:r>
+              <a:rPr lang="en-US" dirty="0" smtClean="0">
+                <a:hlinkClick r:id="rId2"/>
+              </a:rPr>
+              <a:t>www.oracle.com/technetwork/articles/java/architect-benchmarking-2266277.html</a:t>
+            </a:r>
+            <a:endParaRPr lang="en-US" dirty="0" smtClean="0"/>
+          </a:p>
+          <a:p>
+            <a:pPr lvl="1"/>
+            <a:r>
+              <a:rPr lang="en-US" dirty="0" smtClean="0"/>
+              <a:t>The basis for this whole presentation</a:t>
+            </a:r>
+          </a:p>
+          <a:p>
+            <a:pPr lvl="1"/>
+            <a:endParaRPr lang="en-US" dirty="0" smtClean="0"/>
+          </a:p>
+          <a:p>
+            <a:r>
+              <a:rPr lang="en-US" dirty="0" smtClean="0"/>
+              <a:t>Background</a:t>
+            </a:r>
+            <a:endParaRPr lang="en-US" dirty="0"/>
+          </a:p>
+          <a:p>
+            <a:pPr lvl="1"/>
+            <a:r>
+              <a:rPr lang="en-US" dirty="0">
+                <a:hlinkClick r:id="rId3"/>
+              </a:rPr>
+              <a:t>http://java-performance.info/jmh/</a:t>
+            </a:r>
+            <a:endParaRPr lang="en-US" dirty="0"/>
+          </a:p>
+        </p:txBody>
+      </p:sp>
+    </p:spTree>
+    <p:extLst>
+      <p:ext uri="{BB962C8B-B14F-4D97-AF65-F5344CB8AC3E}">
+        <p14:creationId xmlns:p14="http://schemas.microsoft.com/office/powerpoint/2010/main" val="1280026601"/>
+      </p:ext>
+    </p:extLst>
+  </p:cSld>
+  <p:clrMapOvr>
+    <a:masterClrMapping/>
+  </p:clrMapOvr>
+  <p:timing>
+    <p:tnLst>
+      <p:par>
+        <p:cTn id="1" dur="indefinite" restart="never" nodeType="tmRoot"/>
+      </p:par>
+    </p:tnLst>
+  </p:timing>
 </p:sld>
 </file>
 
@@ -4633,11 +6744,7 @@
             <a:pPr lvl="1"/>
             <a:r>
               <a:rPr lang="en-US" dirty="0" smtClean="0"/>
-              <a:t>Does </a:t>
-            </a:r>
-            <a:r>
-              <a:rPr lang="en-US" dirty="0" smtClean="0"/>
-              <a:t>not prevent all pitfalls, but can at least mitigate MOST of them</a:t>
+              <a:t>Does not prevent all pitfalls, but can at least mitigate MOST of them</a:t>
             </a:r>
           </a:p>
           <a:p>
@@ -4662,11 +6769,7 @@
             <a:pPr lvl="1"/>
             <a:r>
               <a:rPr lang="en-US" dirty="0" smtClean="0"/>
-              <a:t>Active development (1.11.2 released October 2015</a:t>
-            </a:r>
-            <a:r>
-              <a:rPr lang="en-US" dirty="0" smtClean="0"/>
-              <a:t>)</a:t>
+              <a:t>Active development (1.11.2 released October 2015)</a:t>
             </a:r>
           </a:p>
           <a:p>
@@ -4675,7 +6778,6 @@
               <a:rPr lang="en-US" dirty="0" smtClean="0"/>
               <a:t>Developed by same guys in Oracle who maintain the JIT</a:t>
             </a:r>
-            <a:endParaRPr lang="en-US" dirty="0" smtClean="0"/>
           </a:p>
           <a:p>
             <a:r>
@@ -4708,6 +6810,13 @@
   <p:clrMapOvr>
     <a:masterClrMapping/>
   </p:clrMapOvr>
+  <p:timing>
+    <p:tnLst>
+      <p:par>
+        <p:cTn id="1" dur="indefinite" restart="never" nodeType="tmRoot"/>
+      </p:par>
+    </p:tnLst>
+  </p:timing>
 </p:sld>
 </file>
 
@@ -4780,6 +6889,13 @@
   <p:clrMapOvr>
     <a:masterClrMapping/>
   </p:clrMapOvr>
+  <p:timing>
+    <p:tnLst>
+      <p:par>
+        <p:cTn id="1" dur="indefinite" restart="never" nodeType="tmRoot"/>
+      </p:par>
+    </p:tnLst>
+  </p:timing>
 </p:sld>
 </file>
 
@@ -4842,11 +6958,7 @@
           <a:p>
             <a:r>
               <a:rPr lang="en-US" dirty="0" smtClean="0"/>
-              <a:t>Setup as a Maven </a:t>
-            </a:r>
-            <a:r>
-              <a:rPr lang="en-US" dirty="0" smtClean="0"/>
-              <a:t>project</a:t>
+              <a:t>Setup as a Maven project</a:t>
             </a:r>
           </a:p>
           <a:p>
@@ -4873,7 +6985,6 @@
               <a:rPr lang="en-US" dirty="0" smtClean="0"/>
               <a:t>application”</a:t>
             </a:r>
-            <a:endParaRPr lang="en-US" dirty="0" smtClean="0"/>
           </a:p>
           <a:p>
             <a:r>
@@ -4886,13 +6997,8 @@
             </a:r>
             <a:r>
               <a:rPr lang="en-US" dirty="0" smtClean="0"/>
-              <a:t> </a:t>
-            </a:r>
-            <a:r>
-              <a:rPr lang="en-US" dirty="0" smtClean="0"/>
-              <a:t>instead	</a:t>
-            </a:r>
-            <a:endParaRPr lang="en-US" dirty="0" smtClean="0"/>
+              <a:t> instead	</a:t>
+            </a:r>
           </a:p>
           <a:p>
             <a:pPr lvl="1"/>
@@ -4984,6 +7090,13 @@
   <p:clrMapOvr>
     <a:masterClrMapping/>
   </p:clrMapOvr>
+  <p:timing>
+    <p:tnLst>
+      <p:par>
+        <p:cTn id="1" dur="indefinite" restart="never" nodeType="tmRoot"/>
+      </p:par>
+    </p:tnLst>
+  </p:timing>
 </p:sld>
 </file>
 
@@ -5136,6 +7249,13 @@
   <p:clrMapOvr>
     <a:masterClrMapping/>
   </p:clrMapOvr>
+  <p:timing>
+    <p:tnLst>
+      <p:par>
+        <p:cTn id="1" dur="indefinite" restart="never" nodeType="tmRoot"/>
+      </p:par>
+    </p:tnLst>
+  </p:timing>
 </p:sld>
 </file>
 
@@ -5173,11 +7293,7 @@
           <a:p>
             <a:r>
               <a:rPr lang="en-US" dirty="0" smtClean="0"/>
-              <a:t>JMH </a:t>
-            </a:r>
-            <a:r>
-              <a:rPr lang="en-US" dirty="0" smtClean="0"/>
-              <a:t>– Defaults</a:t>
+              <a:t>JMH – Defaults</a:t>
             </a:r>
             <a:endParaRPr lang="en-US" dirty="0"/>
           </a:p>
@@ -5268,6 +7384,13 @@
   <p:clrMapOvr>
     <a:masterClrMapping/>
   </p:clrMapOvr>
+  <p:timing>
+    <p:tnLst>
+      <p:par>
+        <p:cTn id="1" dur="indefinite" restart="never" nodeType="tmRoot"/>
+      </p:par>
+    </p:tnLst>
+  </p:timing>
 </p:sld>
 </file>
 
@@ -5358,6 +7481,13 @@
   <p:clrMapOvr>
     <a:masterClrMapping/>
   </p:clrMapOvr>
+  <p:timing>
+    <p:tnLst>
+      <p:par>
+        <p:cTn id="1" dur="indefinite" restart="never" nodeType="tmRoot"/>
+      </p:par>
+    </p:tnLst>
+  </p:timing>
 </p:sld>
 </file>
 
@@ -5393,7 +7523,11 @@
           <a:bodyPr/>
           <a:lstStyle/>
           <a:p>
-            <a:endParaRPr lang="en-US"/>
+            <a:r>
+              <a:rPr lang="en-US" dirty="0" smtClean="0"/>
+              <a:t>Sample JMH Output</a:t>
+            </a:r>
+            <a:endParaRPr lang="en-US" dirty="0"/>
           </a:p>
         </p:txBody>
       </p:sp>
@@ -5409,23 +7543,126 @@
         </p:nvSpPr>
         <p:spPr/>
         <p:txBody>
-          <a:bodyPr/>
-          <a:lstStyle/>
-          <a:p>
-            <a:endParaRPr lang="en-US"/>
+          <a:bodyPr>
+            <a:normAutofit fontScale="92500" lnSpcReduction="20000"/>
+          </a:bodyPr>
+          <a:lstStyle/>
+          <a:p>
+            <a:r>
+              <a:rPr lang="en-US" dirty="0" smtClean="0"/>
+              <a:t>doc\sample-human.txt</a:t>
+            </a:r>
+          </a:p>
+          <a:p>
+            <a:r>
+              <a:rPr lang="en-US" dirty="0" smtClean="0"/>
+              <a:t>Configuration Info</a:t>
+            </a:r>
+          </a:p>
+          <a:p>
+            <a:pPr lvl="1"/>
+            <a:r>
+              <a:rPr lang="en-US" dirty="0" smtClean="0"/>
+              <a:t>JMH, JVM version</a:t>
+            </a:r>
+          </a:p>
+          <a:p>
+            <a:pPr lvl="1"/>
+            <a:r>
+              <a:rPr lang="en-US" dirty="0" smtClean="0"/>
+              <a:t>JVM Configuration</a:t>
+            </a:r>
+          </a:p>
+          <a:p>
+            <a:pPr lvl="1"/>
+            <a:r>
+              <a:rPr lang="en-US" dirty="0" smtClean="0"/>
+              <a:t>JMH Configuration</a:t>
+            </a:r>
+          </a:p>
+          <a:p>
+            <a:r>
+              <a:rPr lang="en-US" dirty="0" smtClean="0"/>
+              <a:t>Profiling Results</a:t>
+            </a:r>
+          </a:p>
+          <a:p>
+            <a:pPr lvl="1"/>
+            <a:r>
+              <a:rPr lang="en-US" dirty="0" smtClean="0"/>
+              <a:t>Operations / second (default output mode) </a:t>
+            </a:r>
+          </a:p>
+          <a:p>
+            <a:pPr lvl="1"/>
+            <a:r>
+              <a:rPr lang="en-US" dirty="0" smtClean="0"/>
+              <a:t>Computed statistics (min, </a:t>
+            </a:r>
+            <a:r>
+              <a:rPr lang="en-US" dirty="0" err="1" smtClean="0"/>
+              <a:t>avg</a:t>
+            </a:r>
+            <a:r>
+              <a:rPr lang="en-US" dirty="0" smtClean="0"/>
+              <a:t>, max, </a:t>
+            </a:r>
+            <a:r>
+              <a:rPr lang="en-US" dirty="0" err="1" smtClean="0"/>
+              <a:t>stdev</a:t>
+            </a:r>
+            <a:r>
+              <a:rPr lang="en-US" dirty="0" smtClean="0"/>
+              <a:t>, confidence interval)</a:t>
+            </a:r>
+          </a:p>
+          <a:p>
+            <a:r>
+              <a:rPr lang="en-US" dirty="0" smtClean="0"/>
+              <a:t>What’s missing?</a:t>
+            </a:r>
+          </a:p>
+          <a:p>
+            <a:pPr lvl="1"/>
+            <a:r>
+              <a:rPr lang="en-US" dirty="0" smtClean="0"/>
+              <a:t>OS</a:t>
+            </a:r>
+          </a:p>
+          <a:p>
+            <a:pPr lvl="1"/>
+            <a:r>
+              <a:rPr lang="en-US" dirty="0" smtClean="0"/>
+              <a:t>Hardware</a:t>
+            </a:r>
+          </a:p>
+          <a:p>
+            <a:pPr lvl="1"/>
+            <a:r>
+              <a:rPr lang="en-US" dirty="0" smtClean="0"/>
+              <a:t>System Load</a:t>
+            </a:r>
+            <a:endParaRPr lang="en-US" dirty="0"/>
           </a:p>
         </p:txBody>
       </p:sp>
     </p:spTree>
     <p:extLst>
       <p:ext uri="{BB962C8B-B14F-4D97-AF65-F5344CB8AC3E}">
-        <p14:creationId xmlns:p14="http://schemas.microsoft.com/office/powerpoint/2010/main" val="2727199964"/>
+        <p14:creationId xmlns:p14="http://schemas.microsoft.com/office/powerpoint/2010/main" val="3822949413"/>
       </p:ext>
     </p:extLst>
   </p:cSld>
   <p:clrMapOvr>
     <a:masterClrMapping/>
   </p:clrMapOvr>
+  <p:timing>
+    <p:tnLst>
+      <p:par>
+        <p:cTn id="1" dur="indefinite" restart="never" nodeType="tmRoot"/>
+      </p:par>
+    </p:tnLst>
+  </p:timing>
 </p:sld>
 </file>
 

</xml_diff>

<commit_message>
Presentation Complete - dumped slides to PDF.
</commit_message>
<xml_diff>
--- a/doc/slides.pptx
+++ b/doc/slides.pptx
@@ -55,7 +55,7 @@
     <p:sldId id="261" r:id="rId46"/>
   </p:sldIdLst>
   <p:sldSz cx="12192000" cy="6858000"/>
-  <p:notesSz cx="6858000" cy="9144000"/>
+  <p:notesSz cx="7315200" cy="9601200"/>
   <p:defaultTextStyle>
     <a:defPPr>
       <a:defRPr lang="en-US"/>
@@ -3413,18 +3413,18 @@
         </p:nvSpPr>
         <p:spPr>
           <a:xfrm>
-            <a:off x="0" y="0"/>
-            <a:ext cx="2971800" cy="458788"/>
+            <a:off x="0" y="1"/>
+            <a:ext cx="3169920" cy="481727"/>
           </a:xfrm>
           <a:prstGeom prst="rect">
             <a:avLst/>
           </a:prstGeom>
         </p:spPr>
         <p:txBody>
-          <a:bodyPr vert="horz" lIns="91440" tIns="45720" rIns="91440" bIns="45720" rtlCol="0"/>
+          <a:bodyPr vert="horz" lIns="96661" tIns="48331" rIns="96661" bIns="48331" rtlCol="0"/>
           <a:lstStyle>
             <a:lvl1pPr algn="l">
-              <a:defRPr sz="1200"/>
+              <a:defRPr sz="1300"/>
             </a:lvl1pPr>
           </a:lstStyle>
           <a:p>
@@ -3444,24 +3444,24 @@
         </p:nvSpPr>
         <p:spPr>
           <a:xfrm>
-            <a:off x="3884613" y="0"/>
-            <a:ext cx="2971800" cy="458788"/>
+            <a:off x="4143587" y="1"/>
+            <a:ext cx="3169920" cy="481727"/>
           </a:xfrm>
           <a:prstGeom prst="rect">
             <a:avLst/>
           </a:prstGeom>
         </p:spPr>
         <p:txBody>
-          <a:bodyPr vert="horz" lIns="91440" tIns="45720" rIns="91440" bIns="45720" rtlCol="0"/>
+          <a:bodyPr vert="horz" lIns="96661" tIns="48331" rIns="96661" bIns="48331" rtlCol="0"/>
           <a:lstStyle>
             <a:lvl1pPr algn="r">
-              <a:defRPr sz="1200"/>
+              <a:defRPr sz="1300"/>
             </a:lvl1pPr>
           </a:lstStyle>
           <a:p>
             <a:fld id="{D5C9E47B-4149-4D78-AEA7-6A63220E520D}" type="datetimeFigureOut">
               <a:rPr lang="en-US" smtClean="0"/>
-              <a:t>2/4/2016</a:t>
+              <a:t>2/5/2016</a:t>
             </a:fld>
             <a:endParaRPr lang="en-US"/>
           </a:p>
@@ -3479,8 +3479,8 @@
         </p:nvSpPr>
         <p:spPr>
           <a:xfrm>
-            <a:off x="685800" y="1143000"/>
-            <a:ext cx="5486400" cy="3086100"/>
+            <a:off x="777875" y="1200150"/>
+            <a:ext cx="5759450" cy="3240088"/>
           </a:xfrm>
           <a:prstGeom prst="rect">
             <a:avLst/>
@@ -3493,7 +3493,7 @@
           </a:ln>
         </p:spPr>
         <p:txBody>
-          <a:bodyPr vert="horz" lIns="91440" tIns="45720" rIns="91440" bIns="45720" rtlCol="0" anchor="ctr"/>
+          <a:bodyPr vert="horz" lIns="96661" tIns="48331" rIns="96661" bIns="48331" rtlCol="0" anchor="ctr"/>
           <a:lstStyle/>
           <a:p>
             <a:endParaRPr lang="en-US"/>
@@ -3512,15 +3512,15 @@
         </p:nvSpPr>
         <p:spPr>
           <a:xfrm>
-            <a:off x="685800" y="4400550"/>
-            <a:ext cx="5486400" cy="3600450"/>
+            <a:off x="731520" y="4620577"/>
+            <a:ext cx="5852160" cy="3780474"/>
           </a:xfrm>
           <a:prstGeom prst="rect">
             <a:avLst/>
           </a:prstGeom>
         </p:spPr>
         <p:txBody>
-          <a:bodyPr vert="horz" lIns="91440" tIns="45720" rIns="91440" bIns="45720" rtlCol="0"/>
+          <a:bodyPr vert="horz" lIns="96661" tIns="48331" rIns="96661" bIns="48331" rtlCol="0"/>
           <a:lstStyle/>
           <a:p>
             <a:pPr lvl="0"/>
@@ -3572,18 +3572,18 @@
         </p:nvSpPr>
         <p:spPr>
           <a:xfrm>
-            <a:off x="0" y="8685213"/>
-            <a:ext cx="2971800" cy="458787"/>
+            <a:off x="0" y="9119474"/>
+            <a:ext cx="3169920" cy="481726"/>
           </a:xfrm>
           <a:prstGeom prst="rect">
             <a:avLst/>
           </a:prstGeom>
         </p:spPr>
         <p:txBody>
-          <a:bodyPr vert="horz" lIns="91440" tIns="45720" rIns="91440" bIns="45720" rtlCol="0" anchor="b"/>
+          <a:bodyPr vert="horz" lIns="96661" tIns="48331" rIns="96661" bIns="48331" rtlCol="0" anchor="b"/>
           <a:lstStyle>
             <a:lvl1pPr algn="l">
-              <a:defRPr sz="1200"/>
+              <a:defRPr sz="1300"/>
             </a:lvl1pPr>
           </a:lstStyle>
           <a:p>
@@ -3603,18 +3603,18 @@
         </p:nvSpPr>
         <p:spPr>
           <a:xfrm>
-            <a:off x="3884613" y="8685213"/>
-            <a:ext cx="2971800" cy="458787"/>
+            <a:off x="4143587" y="9119474"/>
+            <a:ext cx="3169920" cy="481726"/>
           </a:xfrm>
           <a:prstGeom prst="rect">
             <a:avLst/>
           </a:prstGeom>
         </p:spPr>
         <p:txBody>
-          <a:bodyPr vert="horz" lIns="91440" tIns="45720" rIns="91440" bIns="45720" rtlCol="0" anchor="b"/>
+          <a:bodyPr vert="horz" lIns="96661" tIns="48331" rIns="96661" bIns="48331" rtlCol="0" anchor="b"/>
           <a:lstStyle>
             <a:lvl1pPr algn="r">
-              <a:defRPr sz="1200"/>
+              <a:defRPr sz="1300"/>
             </a:lvl1pPr>
           </a:lstStyle>
           <a:p>
@@ -3786,21 +3786,7 @@
             <a:endParaRPr lang="en-US" baseline="0" dirty="0" smtClean="0"/>
           </a:p>
           <a:p>
-            <a:pPr marL="0" marR="0" indent="0" algn="l" defTabSz="914400" rtl="0" eaLnBrk="1" fontAlgn="auto" latinLnBrk="0" hangingPunct="1">
-              <a:lnSpc>
-                <a:spcPct val="100000"/>
-              </a:lnSpc>
-              <a:spcBef>
-                <a:spcPts val="0"/>
-              </a:spcBef>
-              <a:spcAft>
-                <a:spcPts val="0"/>
-              </a:spcAft>
-              <a:buClrTx/>
-              <a:buSzTx/>
-              <a:buFontTx/>
-              <a:buNone/>
-              <a:tabLst/>
+            <a:pPr defTabSz="966612">
               <a:defRPr/>
             </a:pPr>
             <a:r>
@@ -3809,41 +3795,31 @@
             </a:r>
           </a:p>
           <a:p>
-            <a:pPr marL="0" marR="0" indent="0" algn="l" defTabSz="914400" rtl="0" eaLnBrk="1" fontAlgn="auto" latinLnBrk="0" hangingPunct="1">
-              <a:lnSpc>
-                <a:spcPct val="100000"/>
-              </a:lnSpc>
-              <a:spcBef>
-                <a:spcPts val="0"/>
-              </a:spcBef>
-              <a:spcAft>
-                <a:spcPts val="0"/>
-              </a:spcAft>
-              <a:buClrTx/>
-              <a:buSzTx/>
-              <a:buFontTx/>
-              <a:buNone/>
-              <a:tabLst/>
+            <a:pPr defTabSz="966612">
               <a:defRPr/>
             </a:pPr>
             <a:endParaRPr lang="en-US" baseline="0" dirty="0" smtClean="0"/>
           </a:p>
           <a:p>
-            <a:pPr marL="0" marR="0" indent="0" algn="l" defTabSz="914400" rtl="0" eaLnBrk="1" fontAlgn="auto" latinLnBrk="0" hangingPunct="1">
-              <a:lnSpc>
-                <a:spcPct val="100000"/>
-              </a:lnSpc>
-              <a:spcBef>
-                <a:spcPts val="0"/>
-              </a:spcBef>
-              <a:spcAft>
-                <a:spcPts val="0"/>
-              </a:spcAft>
-              <a:buClrTx/>
-              <a:buSzTx/>
-              <a:buFontTx/>
-              <a:buNone/>
-              <a:tabLst/>
+            <a:pPr defTabSz="966612">
+              <a:defRPr/>
+            </a:pPr>
+            <a:r>
+              <a:rPr lang="en-US" baseline="0" dirty="0" smtClean="0"/>
+              <a:t>At the end, I’ll some </a:t>
+            </a:r>
+            <a:r>
+              <a:rPr lang="en-US" baseline="0" dirty="0" err="1" smtClean="0"/>
+              <a:t>some</a:t>
+            </a:r>
+            <a:r>
+              <a:rPr lang="en-US" baseline="0" dirty="0" smtClean="0"/>
+              <a:t> interesting results regarding some Java 8 code idioms and even UCMS.</a:t>
+            </a:r>
+            <a:endParaRPr lang="en-US" baseline="0" dirty="0" smtClean="0"/>
+          </a:p>
+          <a:p>
+            <a:pPr defTabSz="966612">
               <a:defRPr/>
             </a:pPr>
             <a:endParaRPr lang="en-US" dirty="0" smtClean="0"/>
@@ -4366,7 +4342,32 @@
             </a:r>
             <a:r>
               <a:rPr lang="en-US" dirty="0" smtClean="0"/>
-              <a:t> is the process of simplifying constant expressions at compile time. Terms in constant expressions are typically simple literals, such as the integer 2, but can also be variables whose values are never modified, or variables explicitly marked as constant</a:t>
+              <a:t> is the process of simplifying constant expressions at compile time. Terms in constant expressions are typically simple literals, such as the integer 2, but can also be variables whose values are never modified, or variables explicitly marked as </a:t>
+            </a:r>
+            <a:r>
+              <a:rPr lang="en-US" dirty="0" smtClean="0"/>
+              <a:t>constant.</a:t>
+            </a:r>
+          </a:p>
+          <a:p>
+            <a:endParaRPr lang="en-US" dirty="0" smtClean="0"/>
+          </a:p>
+          <a:p>
+            <a:r>
+              <a:rPr lang="en-US" dirty="0" smtClean="0"/>
+              <a:t>A major issue with </a:t>
+            </a:r>
+            <a:r>
+              <a:rPr lang="en-US" dirty="0" err="1" smtClean="0"/>
+              <a:t>microbenchmarks</a:t>
+            </a:r>
+            <a:r>
+              <a:rPr lang="en-US" dirty="0" smtClean="0"/>
+              <a:t>,</a:t>
+            </a:r>
+            <a:r>
+              <a:rPr lang="en-US" baseline="0" dirty="0" smtClean="0"/>
+              <a:t> because of how they are usually (simply) structured.</a:t>
             </a:r>
             <a:endParaRPr lang="en-US" dirty="0"/>
           </a:p>
@@ -4562,11 +4563,7 @@
           <a:p>
             <a:r>
               <a:rPr lang="en-US" dirty="0" smtClean="0"/>
-              <a:t>Loop unrolling</a:t>
-            </a:r>
-            <a:r>
-              <a:rPr lang="en-US" dirty="0" smtClean="0"/>
-              <a:t>.</a:t>
+              <a:t>Loop unrolling.</a:t>
             </a:r>
           </a:p>
           <a:p>
@@ -4574,16 +4571,11 @@
               <a:rPr lang="en-US" dirty="0" smtClean="0"/>
               <a:t>OSR can make benchmark code (typically a loop of calls to the profiled method) perform different to how it would in real life. </a:t>
             </a:r>
-            <a:endParaRPr lang="en-US" dirty="0" smtClean="0"/>
-          </a:p>
-          <a:p>
-            <a:r>
-              <a:rPr lang="en-US" dirty="0" smtClean="0"/>
-              <a:t>“False sharing” for multithreaded tests</a:t>
-            </a:r>
-            <a:r>
-              <a:rPr lang="en-US" dirty="0" smtClean="0"/>
-              <a:t>.</a:t>
+          </a:p>
+          <a:p>
+            <a:r>
+              <a:rPr lang="en-US" dirty="0" smtClean="0"/>
+              <a:t>“False sharing” for multithreaded tests.</a:t>
             </a:r>
           </a:p>
           <a:p>
@@ -4603,7 +4595,6 @@
               <a:rPr lang="en-US" dirty="0" smtClean="0"/>
               <a:t>A buildup to a GC might be ignored in a run or a collection may be included.</a:t>
             </a:r>
-            <a:endParaRPr lang="en-US" dirty="0" smtClean="0"/>
           </a:p>
           <a:p>
             <a:r>
@@ -4866,21 +4857,7 @@
             <a:endParaRPr lang="en-US" b="1" dirty="0" smtClean="0"/>
           </a:p>
           <a:p>
-            <a:pPr marL="0" marR="0" indent="0" algn="l" defTabSz="914400" rtl="0" eaLnBrk="1" fontAlgn="auto" latinLnBrk="0" hangingPunct="1">
-              <a:lnSpc>
-                <a:spcPct val="100000"/>
-              </a:lnSpc>
-              <a:spcBef>
-                <a:spcPts val="0"/>
-              </a:spcBef>
-              <a:spcAft>
-                <a:spcPts val="0"/>
-              </a:spcAft>
-              <a:buClrTx/>
-              <a:buSzTx/>
-              <a:buFontTx/>
-              <a:buNone/>
-              <a:tabLst/>
+            <a:pPr defTabSz="966612">
               <a:defRPr/>
             </a:pPr>
             <a:r>
@@ -4995,11 +4972,7 @@
           <a:p>
             <a:r>
               <a:rPr lang="en-US" dirty="0" smtClean="0"/>
-              <a:t>In </a:t>
-            </a:r>
-            <a:r>
-              <a:rPr lang="en-US" dirty="0" smtClean="0"/>
-              <a:t>all cases, the key to using JMH is enabling the annotation- or bytecode-processors to generate the synthetic benchmark code and properly</a:t>
+              <a:t>In all cases, the key to using JMH is enabling the annotation- or bytecode-processors to generate the synthetic benchmark code and properly</a:t>
             </a:r>
             <a:r>
               <a:rPr lang="en-US" baseline="0" dirty="0" smtClean="0"/>
@@ -5011,21 +4984,7 @@
             <a:endParaRPr lang="en-US" dirty="0" smtClean="0"/>
           </a:p>
           <a:p>
-            <a:pPr marL="0" marR="0" indent="0" algn="l" defTabSz="914400" rtl="0" eaLnBrk="1" fontAlgn="auto" latinLnBrk="0" hangingPunct="1">
-              <a:lnSpc>
-                <a:spcPct val="100000"/>
-              </a:lnSpc>
-              <a:spcBef>
-                <a:spcPts val="0"/>
-              </a:spcBef>
-              <a:spcAft>
-                <a:spcPts val="0"/>
-              </a:spcAft>
-              <a:buClrTx/>
-              <a:buSzTx/>
-              <a:buFontTx/>
-              <a:buNone/>
-              <a:tabLst/>
+            <a:pPr defTabSz="966612">
               <a:defRPr/>
             </a:pPr>
             <a:r>
@@ -5209,21 +5168,7 @@
             <a:endParaRPr lang="en-US" baseline="0" dirty="0" smtClean="0"/>
           </a:p>
           <a:p>
-            <a:pPr marL="0" marR="0" indent="0" algn="l" defTabSz="914400" rtl="0" eaLnBrk="1" fontAlgn="auto" latinLnBrk="0" hangingPunct="1">
-              <a:lnSpc>
-                <a:spcPct val="100000"/>
-              </a:lnSpc>
-              <a:spcBef>
-                <a:spcPts val="0"/>
-              </a:spcBef>
-              <a:spcAft>
-                <a:spcPts val="0"/>
-              </a:spcAft>
-              <a:buClrTx/>
-              <a:buSzTx/>
-              <a:buFontTx/>
-              <a:buNone/>
-              <a:tabLst/>
+            <a:pPr defTabSz="966612">
               <a:defRPr/>
             </a:pPr>
             <a:r>
@@ -5572,401 +5517,131 @@
               <a:rPr lang="en-US" baseline="0" dirty="0" smtClean="0"/>
               <a:t>Must be public</a:t>
             </a:r>
+          </a:p>
+          <a:p>
             <a:endParaRPr lang="en-US" baseline="0" dirty="0" smtClean="0"/>
           </a:p>
           <a:p>
-            <a:endParaRPr lang="en-US" baseline="0" dirty="0" smtClean="0"/>
-          </a:p>
-          <a:p>
             <a:r>
               <a:rPr lang="en-US" dirty="0" smtClean="0"/>
               <a:t>Show </a:t>
             </a:r>
             <a:r>
-              <a:rPr lang="en-US" sz="1200" kern="1200" dirty="0" smtClean="0">
-                <a:solidFill>
-                  <a:schemeClr val="tx1"/>
-                </a:solidFill>
-                <a:latin typeface="+mn-lt"/>
-                <a:ea typeface="+mn-ea"/>
-                <a:cs typeface="+mn-cs"/>
-              </a:rPr>
+              <a:rPr lang="en-US" sz="1300" dirty="0"/>
               <a:t>JMHSample_01_HelloWorld</a:t>
             </a:r>
           </a:p>
           <a:p>
             <a:r>
-              <a:rPr lang="en-US" sz="1200" kern="1200" dirty="0" smtClean="0">
-                <a:solidFill>
-                  <a:schemeClr val="tx1"/>
-                </a:solidFill>
-                <a:latin typeface="+mn-lt"/>
-                <a:ea typeface="+mn-ea"/>
-                <a:cs typeface="+mn-cs"/>
-              </a:rPr>
-              <a:t>So here’s the very basics – all *YOU*</a:t>
-            </a:r>
-            <a:r>
-              <a:rPr lang="en-US" sz="1200" kern="1200" baseline="0" dirty="0" smtClean="0">
-                <a:solidFill>
-                  <a:schemeClr val="tx1"/>
-                </a:solidFill>
-                <a:latin typeface="+mn-lt"/>
-                <a:ea typeface="+mn-ea"/>
-                <a:cs typeface="+mn-cs"/>
-              </a:rPr>
-              <a:t> have to do is </a:t>
-            </a:r>
-            <a:r>
-              <a:rPr lang="en-US" sz="1200" kern="1200" dirty="0" smtClean="0">
-                <a:solidFill>
-                  <a:schemeClr val="tx1"/>
-                </a:solidFill>
-                <a:latin typeface="+mn-lt"/>
-                <a:ea typeface="+mn-ea"/>
-                <a:cs typeface="+mn-cs"/>
-              </a:rPr>
-              <a:t>annotate a method with @Benchmark … and then figure out how to properly package and</a:t>
-            </a:r>
-            <a:r>
-              <a:rPr lang="en-US" sz="1200" kern="1200" baseline="0" dirty="0" smtClean="0">
-                <a:solidFill>
-                  <a:schemeClr val="tx1"/>
-                </a:solidFill>
-                <a:latin typeface="+mn-lt"/>
-                <a:ea typeface="+mn-ea"/>
-                <a:cs typeface="+mn-cs"/>
-              </a:rPr>
-              <a:t> run it.  Fortunately, </a:t>
-            </a:r>
-            <a:r>
-              <a:rPr lang="en-US" sz="1200" kern="1200" baseline="0" dirty="0" err="1" smtClean="0">
-                <a:solidFill>
-                  <a:schemeClr val="tx1"/>
-                </a:solidFill>
-                <a:latin typeface="+mn-lt"/>
-                <a:ea typeface="+mn-ea"/>
-                <a:cs typeface="+mn-cs"/>
-              </a:rPr>
+              <a:rPr lang="en-US" sz="1300" dirty="0"/>
+              <a:t>So here’s the very basics – all *YOU* have to do is annotate a method with @Benchmark … and then figure out how to properly package and run it.  Fortunately, </a:t>
+            </a:r>
+            <a:r>
+              <a:rPr lang="en-US" sz="1300" dirty="0" err="1"/>
               <a:t>Gradle</a:t>
             </a:r>
             <a:r>
-              <a:rPr lang="en-US" sz="1200" kern="1200" baseline="0" dirty="0" smtClean="0">
-                <a:solidFill>
-                  <a:schemeClr val="tx1"/>
-                </a:solidFill>
-                <a:latin typeface="+mn-lt"/>
-                <a:ea typeface="+mn-ea"/>
-                <a:cs typeface="+mn-cs"/>
-              </a:rPr>
+              <a:rPr lang="en-US" sz="1300" dirty="0"/>
               <a:t>.</a:t>
             </a:r>
           </a:p>
           <a:p>
-            <a:endParaRPr lang="en-US" sz="1200" kern="1200" baseline="0" dirty="0" smtClean="0">
-              <a:solidFill>
-                <a:schemeClr val="tx1"/>
-              </a:solidFill>
-              <a:latin typeface="+mn-lt"/>
-              <a:ea typeface="+mn-ea"/>
-              <a:cs typeface="+mn-cs"/>
-            </a:endParaRPr>
-          </a:p>
-          <a:p>
-            <a:pPr marL="0" marR="0" indent="0" algn="l" defTabSz="914400" rtl="0" eaLnBrk="1" fontAlgn="auto" latinLnBrk="0" hangingPunct="1">
-              <a:lnSpc>
-                <a:spcPct val="100000"/>
-              </a:lnSpc>
-              <a:spcBef>
-                <a:spcPts val="0"/>
-              </a:spcBef>
-              <a:spcAft>
-                <a:spcPts val="0"/>
-              </a:spcAft>
-              <a:buClrTx/>
-              <a:buSzTx/>
-              <a:buFontTx/>
-              <a:buNone/>
-              <a:tabLst/>
+            <a:endParaRPr lang="en-US" sz="1300" dirty="0"/>
+          </a:p>
+          <a:p>
+            <a:pPr defTabSz="966612">
               <a:defRPr/>
             </a:pPr>
             <a:r>
-              <a:rPr lang="en-US" sz="1200" kern="1200" baseline="0" dirty="0" smtClean="0">
-                <a:solidFill>
-                  <a:schemeClr val="tx1"/>
-                </a:solidFill>
-                <a:latin typeface="+mn-lt"/>
-                <a:ea typeface="+mn-ea"/>
-                <a:cs typeface="+mn-cs"/>
-              </a:rPr>
+              <a:rPr lang="en-US" sz="1300" dirty="0"/>
               <a:t>See the “Referenced </a:t>
             </a:r>
             <a:r>
-              <a:rPr lang="en-US" sz="1200" kern="1200" baseline="0" dirty="0" err="1" smtClean="0">
-                <a:solidFill>
-                  <a:schemeClr val="tx1"/>
-                </a:solidFill>
-                <a:latin typeface="+mn-lt"/>
-                <a:ea typeface="+mn-ea"/>
-                <a:cs typeface="+mn-cs"/>
-              </a:rPr>
+              <a:rPr lang="en-US" sz="1300" dirty="0" err="1"/>
               <a:t>Librarys</a:t>
             </a:r>
             <a:r>
-              <a:rPr lang="en-US" sz="1200" kern="1200" baseline="0" dirty="0" smtClean="0">
-                <a:solidFill>
-                  <a:schemeClr val="tx1"/>
-                </a:solidFill>
-                <a:latin typeface="+mn-lt"/>
-                <a:ea typeface="+mn-ea"/>
-                <a:cs typeface="+mn-cs"/>
-              </a:rPr>
+              <a:rPr lang="en-US" sz="1300" dirty="0"/>
               <a:t>” – here is the JMH code – the annotation processor and the core jars which we need to reference – don’t worry, </a:t>
             </a:r>
             <a:r>
-              <a:rPr lang="en-US" sz="1200" kern="1200" baseline="0" dirty="0" err="1" smtClean="0">
-                <a:solidFill>
-                  <a:schemeClr val="tx1"/>
-                </a:solidFill>
-                <a:latin typeface="+mn-lt"/>
-                <a:ea typeface="+mn-ea"/>
-                <a:cs typeface="+mn-cs"/>
-              </a:rPr>
+              <a:rPr lang="en-US" sz="1300" dirty="0" err="1"/>
               <a:t>Gradle</a:t>
             </a:r>
             <a:r>
-              <a:rPr lang="en-US" sz="1200" kern="1200" baseline="0" dirty="0" smtClean="0">
-                <a:solidFill>
-                  <a:schemeClr val="tx1"/>
-                </a:solidFill>
-                <a:latin typeface="+mn-lt"/>
-                <a:ea typeface="+mn-ea"/>
-                <a:cs typeface="+mn-cs"/>
-              </a:rPr>
+              <a:rPr lang="en-US" sz="1300" dirty="0"/>
               <a:t> properly sets up the references for just your benchmark code, NOT your application code.</a:t>
             </a:r>
-            <a:endParaRPr lang="en-US" sz="1200" kern="1200" dirty="0" smtClean="0">
-              <a:solidFill>
-                <a:schemeClr val="tx1"/>
-              </a:solidFill>
-              <a:latin typeface="+mn-lt"/>
-              <a:ea typeface="+mn-ea"/>
-              <a:cs typeface="+mn-cs"/>
-            </a:endParaRPr>
-          </a:p>
-          <a:p>
-            <a:endParaRPr lang="en-US" sz="1200" kern="1200" baseline="0" dirty="0" smtClean="0">
-              <a:solidFill>
-                <a:schemeClr val="tx1"/>
-              </a:solidFill>
-              <a:latin typeface="+mn-lt"/>
-              <a:ea typeface="+mn-ea"/>
-              <a:cs typeface="+mn-cs"/>
-            </a:endParaRPr>
-          </a:p>
-          <a:p>
-            <a:r>
-              <a:rPr lang="en-US" sz="1200" kern="1200" dirty="0" smtClean="0">
-                <a:solidFill>
-                  <a:schemeClr val="tx1"/>
-                </a:solidFill>
-                <a:latin typeface="+mn-lt"/>
-                <a:ea typeface="+mn-ea"/>
-                <a:cs typeface="+mn-cs"/>
-              </a:rPr>
-              <a:t>You</a:t>
-            </a:r>
-            <a:r>
-              <a:rPr lang="en-US" sz="1200" kern="1200" baseline="0" dirty="0" smtClean="0">
-                <a:solidFill>
-                  <a:schemeClr val="tx1"/>
-                </a:solidFill>
-                <a:latin typeface="+mn-lt"/>
-                <a:ea typeface="+mn-ea"/>
-                <a:cs typeface="+mn-cs"/>
-              </a:rPr>
-              <a:t> could just run it via this main setup, as JMH does provide a programmatic way to launch it…but that comes with a lot of caveats and produces definitely very skewed results.</a:t>
-            </a:r>
-          </a:p>
-          <a:p>
-            <a:endParaRPr lang="en-US" sz="1200" kern="1200" baseline="0" dirty="0" smtClean="0">
-              <a:solidFill>
-                <a:schemeClr val="tx1"/>
-              </a:solidFill>
-              <a:latin typeface="+mn-lt"/>
-              <a:ea typeface="+mn-ea"/>
-              <a:cs typeface="+mn-cs"/>
-            </a:endParaRPr>
-          </a:p>
-          <a:p>
-            <a:r>
-              <a:rPr lang="en-US" sz="1200" kern="1200" dirty="0" smtClean="0">
-                <a:solidFill>
-                  <a:schemeClr val="tx1"/>
-                </a:solidFill>
-                <a:latin typeface="+mn-lt"/>
-                <a:ea typeface="+mn-ea"/>
-                <a:cs typeface="+mn-cs"/>
-              </a:rPr>
+          </a:p>
+          <a:p>
+            <a:endParaRPr lang="en-US" sz="1300" dirty="0"/>
+          </a:p>
+          <a:p>
+            <a:r>
+              <a:rPr lang="en-US" sz="1300" dirty="0"/>
+              <a:t>You could just run it via this main setup, as JMH does provide a programmatic way to launch it…but that comes with a lot of caveats and produces definitely very skewed results.</a:t>
+            </a:r>
+          </a:p>
+          <a:p>
+            <a:endParaRPr lang="en-US" sz="1300" dirty="0"/>
+          </a:p>
+          <a:p>
+            <a:r>
+              <a:rPr lang="en-US" sz="1300" dirty="0"/>
               <a:t>From / “</a:t>
             </a:r>
             <a:r>
-              <a:rPr lang="en-US" sz="1200" kern="1200" dirty="0" err="1" smtClean="0">
-                <a:solidFill>
-                  <a:schemeClr val="tx1"/>
-                </a:solidFill>
-                <a:latin typeface="+mn-lt"/>
-                <a:ea typeface="+mn-ea"/>
-                <a:cs typeface="+mn-cs"/>
-              </a:rPr>
+              <a:rPr lang="en-US" sz="1300" dirty="0" err="1"/>
               <a:t>gradlew</a:t>
             </a:r>
             <a:r>
-              <a:rPr lang="en-US" sz="1200" kern="1200" dirty="0" smtClean="0">
-                <a:solidFill>
-                  <a:schemeClr val="tx1"/>
-                </a:solidFill>
-                <a:latin typeface="+mn-lt"/>
-                <a:ea typeface="+mn-ea"/>
-                <a:cs typeface="+mn-cs"/>
-              </a:rPr>
+              <a:rPr lang="en-US" sz="1300" dirty="0"/>
               <a:t> :</a:t>
             </a:r>
             <a:r>
-              <a:rPr lang="en-US" sz="1200" kern="1200" dirty="0" err="1" smtClean="0">
-                <a:solidFill>
-                  <a:schemeClr val="tx1"/>
-                </a:solidFill>
-                <a:latin typeface="+mn-lt"/>
-                <a:ea typeface="+mn-ea"/>
-                <a:cs typeface="+mn-cs"/>
-              </a:rPr>
+              <a:rPr lang="en-US" sz="1300" dirty="0" err="1"/>
               <a:t>jmh-samples:plot</a:t>
             </a:r>
             <a:r>
-              <a:rPr lang="en-US" sz="1200" kern="1200" dirty="0" smtClean="0">
-                <a:solidFill>
-                  <a:schemeClr val="tx1"/>
-                </a:solidFill>
-                <a:latin typeface="+mn-lt"/>
-                <a:ea typeface="+mn-ea"/>
-                <a:cs typeface="+mn-cs"/>
-              </a:rPr>
+              <a:rPr lang="en-US" sz="1300" dirty="0"/>
               <a:t> -</a:t>
             </a:r>
             <a:r>
-              <a:rPr lang="en-US" sz="1200" kern="1200" dirty="0" err="1" smtClean="0">
-                <a:solidFill>
-                  <a:schemeClr val="tx1"/>
-                </a:solidFill>
-                <a:latin typeface="+mn-lt"/>
-                <a:ea typeface="+mn-ea"/>
-                <a:cs typeface="+mn-cs"/>
-              </a:rPr>
+              <a:rPr lang="en-US" sz="1300" dirty="0" err="1"/>
               <a:t>PjmhClass</a:t>
             </a:r>
             <a:r>
-              <a:rPr lang="en-US" sz="1200" kern="1200" dirty="0" smtClean="0">
-                <a:solidFill>
-                  <a:schemeClr val="tx1"/>
-                </a:solidFill>
-                <a:latin typeface="+mn-lt"/>
-                <a:ea typeface="+mn-ea"/>
-                <a:cs typeface="+mn-cs"/>
-              </a:rPr>
+              <a:rPr lang="en-US" sz="1300" dirty="0"/>
               <a:t>=JMHSample_01_HelloWorld --daemon"</a:t>
             </a:r>
           </a:p>
           <a:p>
-            <a:endParaRPr lang="en-US" sz="1200" kern="1200" baseline="0" dirty="0" smtClean="0">
-              <a:solidFill>
-                <a:schemeClr val="tx1"/>
-              </a:solidFill>
-              <a:latin typeface="+mn-lt"/>
-              <a:ea typeface="+mn-ea"/>
-              <a:cs typeface="+mn-cs"/>
-            </a:endParaRPr>
-          </a:p>
-          <a:p>
-            <a:r>
-              <a:rPr lang="en-US" sz="1200" kern="1200" baseline="0" dirty="0" smtClean="0">
-                <a:solidFill>
-                  <a:schemeClr val="tx1"/>
-                </a:solidFill>
-                <a:latin typeface="+mn-lt"/>
-                <a:ea typeface="+mn-ea"/>
-                <a:cs typeface="+mn-cs"/>
-              </a:rPr>
+            <a:endParaRPr lang="en-US" sz="1300" dirty="0"/>
+          </a:p>
+          <a:p>
+            <a:r>
+              <a:rPr lang="en-US" sz="1300" dirty="0"/>
               <a:t>Output in /</a:t>
             </a:r>
             <a:r>
-              <a:rPr lang="en-US" sz="1200" kern="1200" baseline="0" dirty="0" err="1" smtClean="0">
-                <a:solidFill>
-                  <a:schemeClr val="tx1"/>
-                </a:solidFill>
-                <a:latin typeface="+mn-lt"/>
-                <a:ea typeface="+mn-ea"/>
-                <a:cs typeface="+mn-cs"/>
-              </a:rPr>
+              <a:rPr lang="en-US" sz="1300" dirty="0" err="1"/>
               <a:t>jmh</a:t>
             </a:r>
             <a:r>
-              <a:rPr lang="en-US" sz="1200" kern="1200" baseline="0" dirty="0" smtClean="0">
-                <a:solidFill>
-                  <a:schemeClr val="tx1"/>
-                </a:solidFill>
-                <a:latin typeface="+mn-lt"/>
-                <a:ea typeface="+mn-ea"/>
-                <a:cs typeface="+mn-cs"/>
-              </a:rPr>
+              <a:rPr lang="en-US" sz="1300" dirty="0"/>
               <a:t>-samples/build/reports/</a:t>
             </a:r>
             <a:r>
-              <a:rPr lang="en-US" sz="1200" kern="1200" baseline="0" dirty="0" err="1" smtClean="0">
-                <a:solidFill>
-                  <a:schemeClr val="tx1"/>
-                </a:solidFill>
-                <a:latin typeface="+mn-lt"/>
-                <a:ea typeface="+mn-ea"/>
-                <a:cs typeface="+mn-cs"/>
-              </a:rPr>
+              <a:rPr lang="en-US" sz="1300" dirty="0" err="1"/>
               <a:t>jmh</a:t>
             </a:r>
-            <a:endParaRPr lang="en-US" sz="1200" kern="1200" baseline="0" dirty="0" smtClean="0">
-              <a:solidFill>
-                <a:schemeClr val="tx1"/>
-              </a:solidFill>
-              <a:latin typeface="+mn-lt"/>
-              <a:ea typeface="+mn-ea"/>
-              <a:cs typeface="+mn-cs"/>
-            </a:endParaRPr>
-          </a:p>
-          <a:p>
-            <a:endParaRPr lang="en-US" sz="1200" kern="1200" baseline="0" dirty="0" smtClean="0">
-              <a:solidFill>
-                <a:schemeClr val="tx1"/>
-              </a:solidFill>
-              <a:latin typeface="+mn-lt"/>
-              <a:ea typeface="+mn-ea"/>
-              <a:cs typeface="+mn-cs"/>
-            </a:endParaRPr>
-          </a:p>
-          <a:p>
-            <a:pPr marL="0" marR="0" indent="0" algn="l" defTabSz="914400" rtl="0" eaLnBrk="1" fontAlgn="auto" latinLnBrk="0" hangingPunct="1">
-              <a:lnSpc>
-                <a:spcPct val="100000"/>
-              </a:lnSpc>
-              <a:spcBef>
-                <a:spcPts val="0"/>
-              </a:spcBef>
-              <a:spcAft>
-                <a:spcPts val="0"/>
-              </a:spcAft>
-              <a:buClrTx/>
-              <a:buSzTx/>
-              <a:buFontTx/>
-              <a:buNone/>
-              <a:tabLst/>
+            <a:endParaRPr lang="en-US" sz="1300" dirty="0"/>
+          </a:p>
+          <a:p>
+            <a:endParaRPr lang="en-US" sz="1300" dirty="0"/>
+          </a:p>
+          <a:p>
+            <a:pPr defTabSz="966612">
               <a:defRPr/>
             </a:pPr>
             <a:r>
@@ -5987,90 +5662,34 @@
             </a:r>
           </a:p>
           <a:p>
-            <a:pPr marL="0" marR="0" indent="0" algn="l" defTabSz="914400" rtl="0" eaLnBrk="1" fontAlgn="auto" latinLnBrk="0" hangingPunct="1">
-              <a:lnSpc>
-                <a:spcPct val="100000"/>
-              </a:lnSpc>
-              <a:spcBef>
-                <a:spcPts val="0"/>
-              </a:spcBef>
-              <a:spcAft>
-                <a:spcPts val="0"/>
-              </a:spcAft>
-              <a:buClrTx/>
-              <a:buSzTx/>
-              <a:buFontTx/>
-              <a:buNone/>
-              <a:tabLst/>
+            <a:pPr defTabSz="966612">
               <a:defRPr/>
             </a:pPr>
-            <a:endParaRPr lang="en-US" sz="1200" kern="1200" baseline="0" dirty="0" smtClean="0">
-              <a:solidFill>
-                <a:schemeClr val="tx1"/>
-              </a:solidFill>
-              <a:latin typeface="+mn-lt"/>
-              <a:ea typeface="+mn-ea"/>
-              <a:cs typeface="+mn-cs"/>
-            </a:endParaRPr>
-          </a:p>
-          <a:p>
-            <a:r>
-              <a:rPr lang="en-US" sz="1200" kern="1200" baseline="0" dirty="0" smtClean="0">
-                <a:solidFill>
-                  <a:schemeClr val="tx1"/>
-                </a:solidFill>
-                <a:latin typeface="+mn-lt"/>
-                <a:ea typeface="+mn-ea"/>
-                <a:cs typeface="+mn-cs"/>
-              </a:rPr>
+            <a:endParaRPr lang="en-US" sz="1300" dirty="0"/>
+          </a:p>
+          <a:p>
+            <a:r>
+              <a:rPr lang="en-US" sz="1300" dirty="0"/>
               <a:t>Show human.txt</a:t>
             </a:r>
           </a:p>
           <a:p>
             <a:r>
-              <a:rPr lang="en-US" sz="1200" kern="1200" baseline="0" dirty="0" smtClean="0">
-                <a:solidFill>
-                  <a:schemeClr val="tx1"/>
-                </a:solidFill>
-                <a:latin typeface="+mn-lt"/>
-                <a:ea typeface="+mn-ea"/>
-                <a:cs typeface="+mn-cs"/>
-              </a:rPr>
+              <a:rPr lang="en-US" sz="1300" dirty="0"/>
               <a:t>-Info looks similar to </a:t>
             </a:r>
             <a:r>
-              <a:rPr lang="en-US" sz="1200" kern="1200" baseline="0" dirty="0" err="1" smtClean="0">
-                <a:solidFill>
-                  <a:schemeClr val="tx1"/>
-                </a:solidFill>
-                <a:latin typeface="+mn-lt"/>
-                <a:ea typeface="+mn-ea"/>
-                <a:cs typeface="+mn-cs"/>
-              </a:rPr>
+              <a:rPr lang="en-US" sz="1300" dirty="0" err="1"/>
               <a:t>SimpleBenchmarker</a:t>
             </a:r>
             <a:r>
-              <a:rPr lang="en-US" sz="1200" kern="1200" baseline="0" dirty="0" smtClean="0">
-                <a:solidFill>
-                  <a:schemeClr val="tx1"/>
-                </a:solidFill>
-                <a:latin typeface="+mn-lt"/>
-                <a:ea typeface="+mn-ea"/>
-                <a:cs typeface="+mn-cs"/>
-              </a:rPr>
+              <a:rPr lang="en-US" sz="1300" dirty="0"/>
               <a:t>, that’s no accident, run X warmups, then Y tests, limit each iteration by time</a:t>
             </a:r>
           </a:p>
           <a:p>
             <a:r>
-              <a:rPr lang="en-US" sz="1200" kern="1200" baseline="0" dirty="0" smtClean="0">
-                <a:solidFill>
-                  <a:schemeClr val="tx1"/>
-                </a:solidFill>
-                <a:latin typeface="+mn-lt"/>
-                <a:ea typeface="+mn-ea"/>
-                <a:cs typeface="+mn-cs"/>
-              </a:rPr>
+              <a:rPr lang="en-US" sz="1300" dirty="0"/>
               <a:t>-</a:t>
             </a:r>
             <a:r>
@@ -6079,475 +5698,177 @@
             </a:r>
           </a:p>
           <a:p>
-            <a:endParaRPr lang="en-US" sz="1200" kern="1200" baseline="0" dirty="0" smtClean="0">
-              <a:solidFill>
-                <a:schemeClr val="tx1"/>
-              </a:solidFill>
-              <a:latin typeface="+mn-lt"/>
-              <a:ea typeface="+mn-ea"/>
-              <a:cs typeface="+mn-cs"/>
-            </a:endParaRPr>
-          </a:p>
-          <a:p>
-            <a:r>
-              <a:rPr lang="en-US" sz="1200" kern="1200" baseline="0" dirty="0" smtClean="0">
-                <a:solidFill>
-                  <a:schemeClr val="tx1"/>
-                </a:solidFill>
-                <a:latin typeface="+mn-lt"/>
-                <a:ea typeface="+mn-ea"/>
-                <a:cs typeface="+mn-cs"/>
-              </a:rPr>
+            <a:endParaRPr lang="en-US" sz="1300" dirty="0"/>
+          </a:p>
+          <a:p>
+            <a:r>
+              <a:rPr lang="en-US" sz="1300" dirty="0"/>
               <a:t>Show results.csv</a:t>
             </a:r>
           </a:p>
           <a:p>
             <a:r>
-              <a:rPr lang="en-US" sz="1200" kern="1200" baseline="0" dirty="0" smtClean="0">
-                <a:solidFill>
-                  <a:schemeClr val="tx1"/>
-                </a:solidFill>
-                <a:latin typeface="+mn-lt"/>
-                <a:ea typeface="+mn-ea"/>
-                <a:cs typeface="+mn-cs"/>
-              </a:rPr>
+              <a:rPr lang="en-US" sz="1300" dirty="0"/>
               <a:t>-CPU results per-test</a:t>
             </a:r>
             <a:endParaRPr lang="en-US" dirty="0" smtClean="0"/>
           </a:p>
           <a:p>
-            <a:endParaRPr lang="en-US" sz="1200" kern="1200" dirty="0" smtClean="0">
-              <a:solidFill>
-                <a:schemeClr val="tx1"/>
-              </a:solidFill>
-              <a:latin typeface="+mn-lt"/>
-              <a:ea typeface="+mn-ea"/>
-              <a:cs typeface="+mn-cs"/>
-            </a:endParaRPr>
-          </a:p>
-          <a:p>
-            <a:r>
-              <a:rPr lang="en-US" sz="1200" kern="1200" dirty="0" smtClean="0">
-                <a:solidFill>
-                  <a:schemeClr val="tx1"/>
-                </a:solidFill>
-                <a:latin typeface="+mn-lt"/>
-                <a:ea typeface="+mn-ea"/>
-                <a:cs typeface="+mn-cs"/>
-              </a:rPr>
+            <a:endParaRPr lang="en-US" sz="1300" dirty="0"/>
+          </a:p>
+          <a:p>
+            <a:r>
+              <a:rPr lang="en-US" sz="1300" dirty="0"/>
               <a:t>Show </a:t>
             </a:r>
             <a:r>
-              <a:rPr lang="en-US" sz="1200" kern="1200" dirty="0" err="1" smtClean="0">
-                <a:solidFill>
-                  <a:schemeClr val="tx1"/>
-                </a:solidFill>
-                <a:latin typeface="+mn-lt"/>
-                <a:ea typeface="+mn-ea"/>
-                <a:cs typeface="+mn-cs"/>
-              </a:rPr>
+              <a:rPr lang="en-US" sz="1300" dirty="0" err="1"/>
               <a:t>jmhrunner</a:t>
             </a:r>
             <a:r>
-              <a:rPr lang="en-US" sz="1200" kern="1200" dirty="0" smtClean="0">
-                <a:solidFill>
-                  <a:schemeClr val="tx1"/>
-                </a:solidFill>
-                <a:latin typeface="+mn-lt"/>
-                <a:ea typeface="+mn-ea"/>
-                <a:cs typeface="+mn-cs"/>
-              </a:rPr>
-              <a:t> setup</a:t>
-            </a:r>
-            <a:r>
-              <a:rPr lang="en-US" sz="1200" kern="1200" baseline="0" dirty="0" smtClean="0">
-                <a:solidFill>
-                  <a:schemeClr val="tx1"/>
-                </a:solidFill>
-                <a:latin typeface="+mn-lt"/>
-                <a:ea typeface="+mn-ea"/>
-                <a:cs typeface="+mn-cs"/>
-              </a:rPr>
-              <a:t> </a:t>
-            </a:r>
-            <a:r>
-              <a:rPr lang="en-US" sz="1200" kern="1200" baseline="0" dirty="0" err="1" smtClean="0">
-                <a:solidFill>
-                  <a:schemeClr val="tx1"/>
-                </a:solidFill>
-                <a:latin typeface="+mn-lt"/>
-                <a:ea typeface="+mn-ea"/>
-                <a:cs typeface="+mn-cs"/>
-              </a:rPr>
+              <a:rPr lang="en-US" sz="1300" dirty="0"/>
+              <a:t> setup </a:t>
+            </a:r>
+            <a:r>
+              <a:rPr lang="en-US" sz="1300" dirty="0" err="1"/>
               <a:t>src</a:t>
             </a:r>
             <a:r>
-              <a:rPr lang="en-US" sz="1200" kern="1200" baseline="0" dirty="0" smtClean="0">
-                <a:solidFill>
-                  <a:schemeClr val="tx1"/>
-                </a:solidFill>
-                <a:latin typeface="+mn-lt"/>
-                <a:ea typeface="+mn-ea"/>
-                <a:cs typeface="+mn-cs"/>
-              </a:rPr>
+              <a:rPr lang="en-US" sz="1300" dirty="0"/>
               <a:t>/main/java vs </a:t>
             </a:r>
             <a:r>
-              <a:rPr lang="en-US" sz="1200" kern="1200" baseline="0" dirty="0" err="1" smtClean="0">
-                <a:solidFill>
-                  <a:schemeClr val="tx1"/>
-                </a:solidFill>
-                <a:latin typeface="+mn-lt"/>
-                <a:ea typeface="+mn-ea"/>
-                <a:cs typeface="+mn-cs"/>
-              </a:rPr>
+              <a:rPr lang="en-US" sz="1300" dirty="0" err="1"/>
               <a:t>src</a:t>
             </a:r>
             <a:r>
-              <a:rPr lang="en-US" sz="1200" kern="1200" baseline="0" dirty="0" smtClean="0">
-                <a:solidFill>
-                  <a:schemeClr val="tx1"/>
-                </a:solidFill>
-                <a:latin typeface="+mn-lt"/>
-                <a:ea typeface="+mn-ea"/>
-                <a:cs typeface="+mn-cs"/>
-              </a:rPr>
+              <a:rPr lang="en-US" sz="1300" dirty="0"/>
               <a:t>/</a:t>
             </a:r>
             <a:r>
-              <a:rPr lang="en-US" sz="1200" kern="1200" baseline="0" dirty="0" err="1" smtClean="0">
-                <a:solidFill>
-                  <a:schemeClr val="tx1"/>
-                </a:solidFill>
-                <a:latin typeface="+mn-lt"/>
-                <a:ea typeface="+mn-ea"/>
-                <a:cs typeface="+mn-cs"/>
-              </a:rPr>
+              <a:rPr lang="en-US" sz="1300" dirty="0" err="1"/>
               <a:t>jmh</a:t>
             </a:r>
             <a:r>
-              <a:rPr lang="en-US" sz="1200" kern="1200" baseline="0" dirty="0" smtClean="0">
-                <a:solidFill>
-                  <a:schemeClr val="tx1"/>
-                </a:solidFill>
-                <a:latin typeface="+mn-lt"/>
-                <a:ea typeface="+mn-ea"/>
-                <a:cs typeface="+mn-cs"/>
-              </a:rPr>
+              <a:rPr lang="en-US" sz="1300" dirty="0"/>
               <a:t>/java</a:t>
             </a:r>
           </a:p>
           <a:p>
             <a:r>
-              <a:rPr lang="en-US" sz="1200" kern="1200" baseline="0" dirty="0" smtClean="0">
-                <a:solidFill>
-                  <a:schemeClr val="tx1"/>
-                </a:solidFill>
-                <a:latin typeface="+mn-lt"/>
-                <a:ea typeface="+mn-ea"/>
-                <a:cs typeface="+mn-cs"/>
-              </a:rPr>
+              <a:rPr lang="en-US" sz="1300" dirty="0"/>
               <a:t>Here’s a *slightly* more complex example, using that same Calculator distance method you’re all sick of by now.  At least it actually tests something.</a:t>
             </a:r>
           </a:p>
           <a:p>
-            <a:endParaRPr lang="en-US" sz="1200" kern="1200" baseline="0" dirty="0" smtClean="0">
-              <a:solidFill>
-                <a:schemeClr val="tx1"/>
-              </a:solidFill>
-              <a:latin typeface="+mn-lt"/>
-              <a:ea typeface="+mn-ea"/>
-              <a:cs typeface="+mn-cs"/>
-            </a:endParaRPr>
-          </a:p>
-          <a:p>
-            <a:r>
-              <a:rPr lang="en-US" sz="1200" kern="1200" baseline="0" dirty="0" smtClean="0">
-                <a:solidFill>
-                  <a:schemeClr val="tx1"/>
-                </a:solidFill>
-                <a:latin typeface="+mn-lt"/>
-                <a:ea typeface="+mn-ea"/>
-                <a:cs typeface="+mn-cs"/>
-              </a:rPr>
+            <a:endParaRPr lang="en-US" sz="1300" dirty="0"/>
+          </a:p>
+          <a:p>
+            <a:r>
+              <a:rPr lang="en-US" sz="1300" dirty="0"/>
               <a:t>From /</a:t>
             </a:r>
             <a:r>
-              <a:rPr lang="en-US" sz="1200" kern="1200" baseline="0" dirty="0" err="1" smtClean="0">
-                <a:solidFill>
-                  <a:schemeClr val="tx1"/>
-                </a:solidFill>
-                <a:latin typeface="+mn-lt"/>
-                <a:ea typeface="+mn-ea"/>
-                <a:cs typeface="+mn-cs"/>
-              </a:rPr>
+              <a:rPr lang="en-US" sz="1300" dirty="0" err="1"/>
               <a:t>jmhrunner</a:t>
             </a:r>
             <a:r>
-              <a:rPr lang="en-US" sz="1200" kern="1200" baseline="0" dirty="0" smtClean="0">
-                <a:solidFill>
-                  <a:schemeClr val="tx1"/>
-                </a:solidFill>
-                <a:latin typeface="+mn-lt"/>
-                <a:ea typeface="+mn-ea"/>
-                <a:cs typeface="+mn-cs"/>
-              </a:rPr>
+              <a:rPr lang="en-US" sz="1300" dirty="0"/>
               <a:t> “</a:t>
             </a:r>
             <a:r>
-              <a:rPr lang="en-US" sz="1200" kern="1200" baseline="0" dirty="0" err="1" smtClean="0">
-                <a:solidFill>
-                  <a:schemeClr val="tx1"/>
-                </a:solidFill>
-                <a:latin typeface="+mn-lt"/>
-                <a:ea typeface="+mn-ea"/>
-                <a:cs typeface="+mn-cs"/>
-              </a:rPr>
+              <a:rPr lang="en-US" sz="1300" dirty="0" err="1"/>
               <a:t>gradlew</a:t>
             </a:r>
             <a:r>
-              <a:rPr lang="en-US" sz="1200" kern="1200" baseline="0" dirty="0" smtClean="0">
-                <a:solidFill>
-                  <a:schemeClr val="tx1"/>
-                </a:solidFill>
-                <a:latin typeface="+mn-lt"/>
-                <a:ea typeface="+mn-ea"/>
-                <a:cs typeface="+mn-cs"/>
-              </a:rPr>
+              <a:rPr lang="en-US" sz="1300" dirty="0"/>
               <a:t> plot --daemon”</a:t>
             </a:r>
           </a:p>
           <a:p>
-            <a:endParaRPr lang="en-US" sz="1200" kern="1200" baseline="0" dirty="0" smtClean="0">
-              <a:solidFill>
-                <a:schemeClr val="tx1"/>
-              </a:solidFill>
-              <a:latin typeface="+mn-lt"/>
-              <a:ea typeface="+mn-ea"/>
-              <a:cs typeface="+mn-cs"/>
-            </a:endParaRPr>
-          </a:p>
-          <a:p>
-            <a:r>
-              <a:rPr lang="en-US" sz="1200" kern="1200" baseline="0" dirty="0" smtClean="0">
-                <a:solidFill>
-                  <a:schemeClr val="tx1"/>
-                </a:solidFill>
-                <a:latin typeface="+mn-lt"/>
-                <a:ea typeface="+mn-ea"/>
-                <a:cs typeface="+mn-cs"/>
-              </a:rPr>
+            <a:endParaRPr lang="en-US" sz="1300" dirty="0"/>
+          </a:p>
+          <a:p>
+            <a:r>
+              <a:rPr lang="en-US" sz="1300" dirty="0"/>
               <a:t>Output in /</a:t>
             </a:r>
             <a:r>
-              <a:rPr lang="en-US" sz="1200" kern="1200" baseline="0" dirty="0" err="1" smtClean="0">
-                <a:solidFill>
-                  <a:schemeClr val="tx1"/>
-                </a:solidFill>
-                <a:latin typeface="+mn-lt"/>
-                <a:ea typeface="+mn-ea"/>
-                <a:cs typeface="+mn-cs"/>
-              </a:rPr>
+              <a:rPr lang="en-US" sz="1300" dirty="0" err="1"/>
               <a:t>jmhrunner</a:t>
             </a:r>
             <a:r>
-              <a:rPr lang="en-US" sz="1200" kern="1200" baseline="0" dirty="0" smtClean="0">
-                <a:solidFill>
-                  <a:schemeClr val="tx1"/>
-                </a:solidFill>
-                <a:latin typeface="+mn-lt"/>
-                <a:ea typeface="+mn-ea"/>
-                <a:cs typeface="+mn-cs"/>
-              </a:rPr>
+              <a:rPr lang="en-US" sz="1300" dirty="0"/>
               <a:t>/build/reports/</a:t>
             </a:r>
             <a:r>
-              <a:rPr lang="en-US" sz="1200" kern="1200" baseline="0" dirty="0" err="1" smtClean="0">
-                <a:solidFill>
-                  <a:schemeClr val="tx1"/>
-                </a:solidFill>
-                <a:latin typeface="+mn-lt"/>
-                <a:ea typeface="+mn-ea"/>
-                <a:cs typeface="+mn-cs"/>
-              </a:rPr>
+              <a:rPr lang="en-US" sz="1300" dirty="0" err="1"/>
               <a:t>jmh</a:t>
             </a:r>
-            <a:endParaRPr lang="en-US" sz="1200" kern="1200" baseline="0" dirty="0" smtClean="0">
-              <a:solidFill>
-                <a:schemeClr val="tx1"/>
-              </a:solidFill>
-              <a:latin typeface="+mn-lt"/>
-              <a:ea typeface="+mn-ea"/>
-              <a:cs typeface="+mn-cs"/>
-            </a:endParaRPr>
-          </a:p>
-          <a:p>
-            <a:endParaRPr lang="en-US" sz="1200" kern="1200" baseline="0" dirty="0" smtClean="0">
-              <a:solidFill>
-                <a:schemeClr val="tx1"/>
-              </a:solidFill>
-              <a:latin typeface="+mn-lt"/>
-              <a:ea typeface="+mn-ea"/>
-              <a:cs typeface="+mn-cs"/>
-            </a:endParaRPr>
-          </a:p>
-          <a:p>
-            <a:r>
-              <a:rPr lang="en-US" sz="1200" kern="1200" baseline="0" dirty="0" smtClean="0">
-                <a:solidFill>
-                  <a:schemeClr val="tx1"/>
-                </a:solidFill>
-                <a:latin typeface="+mn-lt"/>
-                <a:ea typeface="+mn-ea"/>
-                <a:cs typeface="+mn-cs"/>
-              </a:rPr>
+            <a:endParaRPr lang="en-US" sz="1300" dirty="0"/>
+          </a:p>
+          <a:p>
+            <a:endParaRPr lang="en-US" sz="1300" dirty="0"/>
+          </a:p>
+          <a:p>
+            <a:r>
+              <a:rPr lang="en-US" sz="1300" dirty="0"/>
               <a:t>Show human.txt</a:t>
             </a:r>
           </a:p>
           <a:p>
             <a:r>
-              <a:rPr lang="en-US" sz="1200" kern="1200" baseline="0" dirty="0" smtClean="0">
-                <a:solidFill>
-                  <a:schemeClr val="tx1"/>
-                </a:solidFill>
-                <a:latin typeface="+mn-lt"/>
-                <a:ea typeface="+mn-ea"/>
-                <a:cs typeface="+mn-cs"/>
-              </a:rPr>
+              <a:rPr lang="en-US" sz="1300" dirty="0"/>
               <a:t>Show plot.png</a:t>
             </a:r>
           </a:p>
           <a:p>
-            <a:endParaRPr lang="en-US" sz="1200" kern="1200" baseline="0" dirty="0" smtClean="0">
-              <a:solidFill>
-                <a:schemeClr val="tx1"/>
-              </a:solidFill>
-              <a:latin typeface="+mn-lt"/>
-              <a:ea typeface="+mn-ea"/>
-              <a:cs typeface="+mn-cs"/>
-            </a:endParaRPr>
-          </a:p>
-          <a:p>
-            <a:r>
-              <a:rPr lang="en-US" sz="1200" kern="1200" baseline="0" dirty="0" smtClean="0">
-                <a:solidFill>
-                  <a:schemeClr val="tx1"/>
-                </a:solidFill>
-                <a:latin typeface="+mn-lt"/>
-                <a:ea typeface="+mn-ea"/>
-                <a:cs typeface="+mn-cs"/>
-              </a:rPr>
+            <a:endParaRPr lang="en-US" sz="1300" dirty="0"/>
+          </a:p>
+          <a:p>
+            <a:r>
+              <a:rPr lang="en-US" sz="1300" dirty="0"/>
               <a:t>Show /</a:t>
             </a:r>
             <a:r>
-              <a:rPr lang="en-US" sz="1200" kern="1200" baseline="0" dirty="0" err="1" smtClean="0">
-                <a:solidFill>
-                  <a:schemeClr val="tx1"/>
-                </a:solidFill>
-                <a:latin typeface="+mn-lt"/>
-                <a:ea typeface="+mn-ea"/>
-                <a:cs typeface="+mn-cs"/>
-              </a:rPr>
+              <a:rPr lang="en-US" sz="1300" dirty="0" err="1"/>
               <a:t>jmhrunner</a:t>
             </a:r>
             <a:r>
-              <a:rPr lang="en-US" sz="1200" kern="1200" baseline="0" dirty="0" smtClean="0">
-                <a:solidFill>
-                  <a:schemeClr val="tx1"/>
-                </a:solidFill>
-                <a:latin typeface="+mn-lt"/>
-                <a:ea typeface="+mn-ea"/>
-                <a:cs typeface="+mn-cs"/>
-              </a:rPr>
+              <a:rPr lang="en-US" sz="1300" dirty="0"/>
               <a:t>/</a:t>
             </a:r>
             <a:r>
-              <a:rPr lang="en-US" sz="1200" kern="1200" baseline="0" dirty="0" err="1" smtClean="0">
-                <a:solidFill>
-                  <a:schemeClr val="tx1"/>
-                </a:solidFill>
-                <a:latin typeface="+mn-lt"/>
-                <a:ea typeface="+mn-ea"/>
-                <a:cs typeface="+mn-cs"/>
-              </a:rPr>
+              <a:rPr lang="en-US" sz="1300" dirty="0" err="1"/>
               <a:t>build.gradle</a:t>
             </a:r>
-            <a:endParaRPr lang="en-US" sz="1200" kern="1200" baseline="0" dirty="0" smtClean="0">
-              <a:solidFill>
-                <a:schemeClr val="tx1"/>
-              </a:solidFill>
-              <a:latin typeface="+mn-lt"/>
-              <a:ea typeface="+mn-ea"/>
-              <a:cs typeface="+mn-cs"/>
-            </a:endParaRPr>
-          </a:p>
-          <a:p>
-            <a:r>
-              <a:rPr lang="en-US" sz="1200" kern="1200" baseline="0" dirty="0" smtClean="0">
-                <a:solidFill>
-                  <a:schemeClr val="tx1"/>
-                </a:solidFill>
-                <a:latin typeface="+mn-lt"/>
-                <a:ea typeface="+mn-ea"/>
-                <a:cs typeface="+mn-cs"/>
-              </a:rPr>
+            <a:endParaRPr lang="en-US" sz="1300" dirty="0"/>
+          </a:p>
+          <a:p>
+            <a:r>
+              <a:rPr lang="en-US" sz="1300" dirty="0"/>
               <a:t>Focus on </a:t>
             </a:r>
             <a:r>
-              <a:rPr lang="en-US" sz="1200" kern="1200" baseline="0" dirty="0" err="1" smtClean="0">
-                <a:solidFill>
-                  <a:schemeClr val="tx1"/>
-                </a:solidFill>
-                <a:latin typeface="+mn-lt"/>
-                <a:ea typeface="+mn-ea"/>
-                <a:cs typeface="+mn-cs"/>
-              </a:rPr>
+              <a:rPr lang="en-US" sz="1300" dirty="0" err="1"/>
               <a:t>jmh</a:t>
             </a:r>
             <a:r>
-              <a:rPr lang="en-US" sz="1200" kern="1200" baseline="0" dirty="0" smtClean="0">
-                <a:solidFill>
-                  <a:schemeClr val="tx1"/>
-                </a:solidFill>
-                <a:latin typeface="+mn-lt"/>
-                <a:ea typeface="+mn-ea"/>
-                <a:cs typeface="+mn-cs"/>
-              </a:rPr>
+              <a:rPr lang="en-US" sz="1300" dirty="0"/>
               <a:t> block {} – explain defaults</a:t>
             </a:r>
           </a:p>
           <a:p>
             <a:r>
-              <a:rPr lang="en-US" sz="1200" kern="1200" baseline="0" dirty="0" smtClean="0">
-                <a:solidFill>
-                  <a:schemeClr val="tx1"/>
-                </a:solidFill>
-                <a:latin typeface="+mn-lt"/>
-                <a:ea typeface="+mn-ea"/>
-                <a:cs typeface="+mn-cs"/>
-              </a:rPr>
+              <a:rPr lang="en-US" sz="1300" dirty="0"/>
               <a:t>You can control just about everything about how the benchmark runs from </a:t>
             </a:r>
             <a:r>
-              <a:rPr lang="en-US" sz="1200" kern="1200" baseline="0" dirty="0" err="1" smtClean="0">
-                <a:solidFill>
-                  <a:schemeClr val="tx1"/>
-                </a:solidFill>
-                <a:latin typeface="+mn-lt"/>
-                <a:ea typeface="+mn-ea"/>
-                <a:cs typeface="+mn-cs"/>
-              </a:rPr>
+              <a:rPr lang="en-US" sz="1300" dirty="0" err="1"/>
               <a:t>Gradle</a:t>
             </a:r>
             <a:r>
-              <a:rPr lang="en-US" sz="1200" kern="1200" baseline="0" dirty="0" smtClean="0">
-                <a:solidFill>
-                  <a:schemeClr val="tx1"/>
-                </a:solidFill>
-                <a:latin typeface="+mn-lt"/>
-                <a:ea typeface="+mn-ea"/>
-                <a:cs typeface="+mn-cs"/>
-              </a:rPr>
+              <a:rPr lang="en-US" sz="1300" dirty="0"/>
               <a:t> – or provide</a:t>
             </a:r>
             <a:endParaRPr lang="en-US" dirty="0"/>
@@ -6642,7 +5963,32 @@
             </a:r>
             <a:r>
               <a:rPr lang="en-US" dirty="0" smtClean="0"/>
-              <a:t> demarcates the benchmark payload, and JMH treats it specifically as the wrapper which contains the benchmark code.</a:t>
+              <a:t> demarcates the benchmark payload, and JMH treats it specifically as the wrapper which contains the benchmark code</a:t>
+            </a:r>
+            <a:r>
+              <a:rPr lang="en-US" dirty="0" smtClean="0"/>
+              <a:t>.</a:t>
+            </a:r>
+          </a:p>
+          <a:p>
+            <a:endParaRPr lang="en-US" dirty="0" smtClean="0"/>
+          </a:p>
+          <a:p>
+            <a:r>
+              <a:rPr lang="en-US" dirty="0" smtClean="0"/>
+              <a:t>What all</a:t>
+            </a:r>
+            <a:r>
+              <a:rPr lang="en-US" baseline="0" dirty="0" smtClean="0"/>
+              <a:t> this means is that you get a separate class, with a main method, contained in the </a:t>
+            </a:r>
+            <a:r>
+              <a:rPr lang="en-US" baseline="0" dirty="0" err="1" smtClean="0"/>
+              <a:t>jmh</a:t>
+            </a:r>
+            <a:r>
+              <a:rPr lang="en-US" baseline="0" dirty="0" smtClean="0"/>
+              <a:t>-produces jar for each @Benchmark, which it can invoke separately, which contains everything needed to measure your code.</a:t>
             </a:r>
             <a:endParaRPr lang="en-US" dirty="0"/>
           </a:p>
@@ -6763,21 +6109,7 @@
             <a:endParaRPr lang="en-US" baseline="0" dirty="0" smtClean="0"/>
           </a:p>
           <a:p>
-            <a:pPr marL="0" marR="0" indent="0" algn="l" defTabSz="914400" rtl="0" eaLnBrk="1" fontAlgn="auto" latinLnBrk="0" hangingPunct="1">
-              <a:lnSpc>
-                <a:spcPct val="100000"/>
-              </a:lnSpc>
-              <a:spcBef>
-                <a:spcPts val="0"/>
-              </a:spcBef>
-              <a:spcAft>
-                <a:spcPts val="0"/>
-              </a:spcAft>
-              <a:buClrTx/>
-              <a:buSzTx/>
-              <a:buFontTx/>
-              <a:buNone/>
-              <a:tabLst/>
+            <a:pPr defTabSz="966612">
               <a:defRPr/>
             </a:pPr>
             <a:r>
@@ -6877,7 +6209,11 @@
             </a:r>
             <a:r>
               <a:rPr lang="en-US" baseline="0" dirty="0" smtClean="0"/>
-              <a:t> on a process which takes several milliseconds, no matter how many runs you do, you are not going to get more precise answers – but as I’ve played with JMH, I’ve found the defaults to be too precise</a:t>
+              <a:t> on a process which takes several milliseconds, no matter how many runs you do, you are not going to get more precise </a:t>
+            </a:r>
+            <a:r>
+              <a:rPr lang="en-US" baseline="0" dirty="0" smtClean="0"/>
+              <a:t>answers.</a:t>
             </a:r>
             <a:endParaRPr lang="en-US" dirty="0"/>
           </a:p>
@@ -7282,14 +6618,7 @@
               <a:t>Show </a:t>
             </a:r>
             <a:r>
-              <a:rPr lang="en-US" sz="1200" kern="1200" dirty="0" err="1" smtClean="0">
-                <a:solidFill>
-                  <a:schemeClr val="tx1"/>
-                </a:solidFill>
-                <a:latin typeface="+mn-lt"/>
-                <a:ea typeface="+mn-ea"/>
-                <a:cs typeface="+mn-cs"/>
-              </a:rPr>
+              <a:rPr lang="en-US" sz="1300" dirty="0" err="1"/>
               <a:t>AdditionBenchmark</a:t>
             </a:r>
             <a:endParaRPr lang="en-US" dirty="0" smtClean="0"/>
@@ -7530,19 +6859,14 @@
               <a:rPr lang="en-US" dirty="0" smtClean="0"/>
               <a:t>IDEs will say "Oh, you can convert this field to local variable“, or “Look, it could be final”. Don't. Trust. Them. </a:t>
             </a:r>
+          </a:p>
+          <a:p>
             <a:endParaRPr lang="en-US" dirty="0" smtClean="0"/>
           </a:p>
           <a:p>
-            <a:endParaRPr lang="en-US" dirty="0" smtClean="0"/>
-          </a:p>
-          <a:p>
-            <a:r>
-              <a:rPr lang="en-US" dirty="0" smtClean="0"/>
-              <a:t>Besides </a:t>
-            </a:r>
-            <a:r>
-              <a:rPr lang="en-US" dirty="0" smtClean="0"/>
-              <a:t>marking a separate class as a @State, you can also mark your own benchmark class as @State.</a:t>
+            <a:r>
+              <a:rPr lang="en-US" dirty="0" smtClean="0"/>
+              <a:t>Besides marking a separate class as a @State, you can also mark your own benchmark class as @State.</a:t>
             </a:r>
           </a:p>
           <a:p>
@@ -7886,92 +7210,7 @@
           <a:bodyPr/>
           <a:lstStyle/>
           <a:p>
-            <a:r>
-              <a:rPr lang="en-US" dirty="0" smtClean="0"/>
-              <a:t>This</a:t>
-            </a:r>
-            <a:r>
-              <a:rPr lang="en-US" baseline="0" dirty="0" smtClean="0"/>
-              <a:t> is the attempt by the makers of JMH (the same people who work on the JIT) to tell the JVM in no uncertain terms to avoid optimizing away the very thing you are trying to benchmark</a:t>
-            </a:r>
-            <a:r>
-              <a:rPr lang="en-US" baseline="0" dirty="0" smtClean="0"/>
-              <a:t>.</a:t>
-            </a:r>
-          </a:p>
-          <a:p>
-            <a:endParaRPr lang="en-US" baseline="0" dirty="0" smtClean="0"/>
-          </a:p>
-          <a:p>
-            <a:r>
-              <a:rPr lang="en-US" dirty="0" smtClean="0"/>
-              <a:t>The downfall of many benchmarks is Dead-Code Elimination (DCE): compilers * are smart enough to deduce some computations are redundant and eliminate * them completely. If the eliminated part was our benchmarked code, we are * in trouble. </a:t>
-            </a:r>
-            <a:endParaRPr lang="en-US" baseline="0" dirty="0" smtClean="0"/>
-          </a:p>
-          <a:p>
-            <a:endParaRPr lang="en-US" baseline="0" dirty="0" smtClean="0"/>
-          </a:p>
-          <a:p>
-            <a:r>
-              <a:rPr lang="en-US" dirty="0" smtClean="0"/>
-              <a:t>I have no clue what</a:t>
-            </a:r>
-            <a:r>
-              <a:rPr lang="en-US" baseline="0" dirty="0" smtClean="0"/>
-              <a:t> this class is doing or why it is doing it.  Looking at the internals – it’s all just voodoo to me.  But the JMH guys, who are the JIT guys, say this is the best way to avoid your code getting optimized away – and its very easy to use.</a:t>
-            </a:r>
-          </a:p>
-          <a:p>
-            <a:endParaRPr lang="en-US" baseline="0" dirty="0" smtClean="0"/>
-          </a:p>
-          <a:p>
-            <a:r>
-              <a:rPr lang="en-US" baseline="0" dirty="0" smtClean="0"/>
-              <a:t>Also helpful i</a:t>
-            </a:r>
-            <a:r>
-              <a:rPr lang="en-US" dirty="0" smtClean="0"/>
-              <a:t>f you need to return more than one value from your @Benchmark , or you want to have your @Benchmark methods be</a:t>
-            </a:r>
-            <a:r>
-              <a:rPr lang="en-US" baseline="0" dirty="0" smtClean="0"/>
-              <a:t> void methods, etc</a:t>
-            </a:r>
-            <a:r>
-              <a:rPr lang="en-US" baseline="0" dirty="0" smtClean="0"/>
-              <a:t>.</a:t>
-            </a:r>
-          </a:p>
-          <a:p>
-            <a:endParaRPr lang="en-US" baseline="0" dirty="0" smtClean="0"/>
-          </a:p>
-          <a:p>
-            <a:r>
-              <a:rPr lang="en-US" dirty="0" smtClean="0"/>
-              <a:t>option 2 – You might think: I’ll just Merge multiple results into one and return it (hash/multiply/etc. or </a:t>
-            </a:r>
-            <a:r>
-              <a:rPr lang="en-US" dirty="0" err="1" smtClean="0"/>
-              <a:t>encapsule</a:t>
-            </a:r>
-            <a:r>
-              <a:rPr lang="en-US" dirty="0" smtClean="0"/>
-              <a:t> into returned object). * This is OK when is computation is relatively heavyweight, and merging * the results does not offset the results much.   But the </a:t>
-            </a:r>
-            <a:r>
-              <a:rPr lang="en-US" dirty="0" err="1" smtClean="0"/>
-              <a:t>blackhole</a:t>
-            </a:r>
-            <a:r>
-              <a:rPr lang="en-US" dirty="0" smtClean="0"/>
-              <a:t> is probably easily</a:t>
-            </a:r>
-            <a:r>
-              <a:rPr lang="en-US" baseline="0" dirty="0" smtClean="0"/>
-              <a:t> and will affect the timings less.</a:t>
-            </a:r>
-            <a:endParaRPr lang="en-US" dirty="0"/>
+            <a:endParaRPr lang="en-US"/>
           </a:p>
         </p:txBody>
       </p:sp>
@@ -7992,7 +7231,7 @@
           <a:p>
             <a:fld id="{CFAD290B-5269-4E99-8A8A-8691B1EB0AE9}" type="slidenum">
               <a:rPr lang="en-US" smtClean="0"/>
-              <a:t>31</a:t>
+              <a:t>30</a:t>
             </a:fld>
             <a:endParaRPr lang="en-US"/>
           </a:p>
@@ -8001,7 +7240,7 @@
     </p:spTree>
     <p:extLst>
       <p:ext uri="{BB962C8B-B14F-4D97-AF65-F5344CB8AC3E}">
-        <p14:creationId xmlns:p14="http://schemas.microsoft.com/office/powerpoint/2010/main" val="3515685751"/>
+        <p14:creationId xmlns:p14="http://schemas.microsoft.com/office/powerpoint/2010/main" val="837300769"/>
       </p:ext>
     </p:extLst>
   </p:cSld>
@@ -8055,6 +7294,83 @@
           <a:bodyPr/>
           <a:lstStyle/>
           <a:p>
+            <a:r>
+              <a:rPr lang="en-US" dirty="0" smtClean="0"/>
+              <a:t>This</a:t>
+            </a:r>
+            <a:r>
+              <a:rPr lang="en-US" baseline="0" dirty="0" smtClean="0"/>
+              <a:t> is the attempt by the makers of JMH (the same people who work on the JIT) to tell the JVM in no uncertain terms to avoid optimizing away the very thing you are trying to benchmark.</a:t>
+            </a:r>
+          </a:p>
+          <a:p>
+            <a:endParaRPr lang="en-US" baseline="0" dirty="0" smtClean="0"/>
+          </a:p>
+          <a:p>
+            <a:r>
+              <a:rPr lang="en-US" dirty="0" smtClean="0"/>
+              <a:t>The downfall of many benchmarks is Dead-Code Elimination (DCE): compilers * are smart enough to deduce some computations are redundant and eliminate * them completely. If the eliminated part was our benchmarked code, we are * in trouble. </a:t>
+            </a:r>
+            <a:endParaRPr lang="en-US" baseline="0" dirty="0" smtClean="0"/>
+          </a:p>
+          <a:p>
+            <a:endParaRPr lang="en-US" baseline="0" dirty="0" smtClean="0"/>
+          </a:p>
+          <a:p>
+            <a:r>
+              <a:rPr lang="en-US" dirty="0" smtClean="0"/>
+              <a:t>I have no clue what</a:t>
+            </a:r>
+            <a:r>
+              <a:rPr lang="en-US" baseline="0" dirty="0" smtClean="0"/>
+              <a:t> this class is doing or why it is doing it.  Looking at the internals – it’s all just voodoo to me.  But the JMH guys, who are the JIT guys, say this is the best way to avoid your code getting optimized away – and its very easy to use.</a:t>
+            </a:r>
+          </a:p>
+          <a:p>
+            <a:endParaRPr lang="en-US" baseline="0" dirty="0" smtClean="0"/>
+          </a:p>
+          <a:p>
+            <a:r>
+              <a:rPr lang="en-US" baseline="0" dirty="0" smtClean="0"/>
+              <a:t>Also helpful i</a:t>
+            </a:r>
+            <a:r>
+              <a:rPr lang="en-US" dirty="0" smtClean="0"/>
+              <a:t>f you need to return more than one value from your @Benchmark , or you want to have your @Benchmark methods be</a:t>
+            </a:r>
+            <a:r>
+              <a:rPr lang="en-US" baseline="0" dirty="0" smtClean="0"/>
+              <a:t> void methods, etc.</a:t>
+            </a:r>
+          </a:p>
+          <a:p>
+            <a:endParaRPr lang="en-US" baseline="0" dirty="0" smtClean="0"/>
+          </a:p>
+          <a:p>
+            <a:r>
+              <a:rPr lang="en-US" dirty="0" smtClean="0"/>
+              <a:t>option 2 – You might think: I’ll just Merge multiple results into one and return it (hash/multiply/etc. or </a:t>
+            </a:r>
+            <a:r>
+              <a:rPr lang="en-US" dirty="0" err="1" smtClean="0"/>
+              <a:t>encapsule</a:t>
+            </a:r>
+            <a:r>
+              <a:rPr lang="en-US" dirty="0" smtClean="0"/>
+              <a:t> into returned object). * This is OK when is computation is relatively heavyweight, and merging * the results does not offset the results much.   But the </a:t>
+            </a:r>
+            <a:r>
+              <a:rPr lang="en-US" dirty="0" err="1" smtClean="0"/>
+              <a:t>blackhole</a:t>
+            </a:r>
+            <a:r>
+              <a:rPr lang="en-US" dirty="0" smtClean="0"/>
+              <a:t> is probably easily</a:t>
+            </a:r>
+            <a:r>
+              <a:rPr lang="en-US" baseline="0" dirty="0" smtClean="0"/>
+              <a:t> and will affect the timings less.</a:t>
+            </a:r>
             <a:endParaRPr lang="en-US" dirty="0"/>
           </a:p>
         </p:txBody>
@@ -8076,7 +7392,7 @@
           <a:p>
             <a:fld id="{CFAD290B-5269-4E99-8A8A-8691B1EB0AE9}" type="slidenum">
               <a:rPr lang="en-US" smtClean="0"/>
-              <a:t>32</a:t>
+              <a:t>31</a:t>
             </a:fld>
             <a:endParaRPr lang="en-US"/>
           </a:p>
@@ -8085,7 +7401,7 @@
     </p:spTree>
     <p:extLst>
       <p:ext uri="{BB962C8B-B14F-4D97-AF65-F5344CB8AC3E}">
-        <p14:creationId xmlns:p14="http://schemas.microsoft.com/office/powerpoint/2010/main" val="1383870499"/>
+        <p14:creationId xmlns:p14="http://schemas.microsoft.com/office/powerpoint/2010/main" val="3515685751"/>
       </p:ext>
     </p:extLst>
   </p:cSld>
@@ -8139,22 +7455,6 @@
           <a:bodyPr/>
           <a:lstStyle/>
           <a:p>
-            <a:r>
-              <a:rPr lang="en-US" dirty="0" smtClean="0"/>
-              <a:t>We saw</a:t>
-            </a:r>
-            <a:r>
-              <a:rPr lang="en-US" baseline="0" dirty="0" smtClean="0"/>
-              <a:t> how the type of method call we make can have a huge effect on timings in the </a:t>
-            </a:r>
-            <a:r>
-              <a:rPr lang="en-US" baseline="0" dirty="0" err="1" smtClean="0"/>
-              <a:t>SimpleBenchmarker</a:t>
-            </a:r>
-            <a:r>
-              <a:rPr lang="en-US" baseline="0" dirty="0" smtClean="0"/>
-              <a:t> demo.</a:t>
-            </a:r>
             <a:endParaRPr lang="en-US" dirty="0"/>
           </a:p>
         </p:txBody>
@@ -8176,7 +7476,7 @@
           <a:p>
             <a:fld id="{CFAD290B-5269-4E99-8A8A-8691B1EB0AE9}" type="slidenum">
               <a:rPr lang="en-US" smtClean="0"/>
-              <a:t>33</a:t>
+              <a:t>32</a:t>
             </a:fld>
             <a:endParaRPr lang="en-US"/>
           </a:p>
@@ -8185,7 +7485,7 @@
     </p:spTree>
     <p:extLst>
       <p:ext uri="{BB962C8B-B14F-4D97-AF65-F5344CB8AC3E}">
-        <p14:creationId xmlns:p14="http://schemas.microsoft.com/office/powerpoint/2010/main" val="1954616917"/>
+        <p14:creationId xmlns:p14="http://schemas.microsoft.com/office/powerpoint/2010/main" val="1383870499"/>
       </p:ext>
     </p:extLst>
   </p:cSld>
@@ -8241,16 +7541,19 @@
           <a:p>
             <a:r>
               <a:rPr lang="en-US" dirty="0" smtClean="0"/>
-              <a:t>By default JHM forks a new java process for each trial (set of iterations). This is required to defend the test from previously collected “profiles” – information about other loaded classes and their execution information. For example, if you have 2 classes implementing the same interface and test the performance of both of them, then the first implementation (in order of testing) is likely to be faster than the second one (in the same JVM), because JIT replaces direct method calls to the first implementation with interface method calls after discovering the second implementation. </a:t>
-            </a:r>
-          </a:p>
-          <a:p>
-            <a:endParaRPr lang="en-US" dirty="0" smtClean="0"/>
-          </a:p>
-          <a:p>
-            <a:r>
-              <a:rPr lang="en-US" dirty="0" smtClean="0"/>
-              <a:t>One class per method = similar to how Junit works.</a:t>
+              <a:t>We saw</a:t>
+            </a:r>
+            <a:r>
+              <a:rPr lang="en-US" baseline="0" dirty="0" smtClean="0"/>
+              <a:t> how the type of method call we make can have a huge effect on timings in the </a:t>
+            </a:r>
+            <a:r>
+              <a:rPr lang="en-US" baseline="0" dirty="0" err="1" smtClean="0"/>
+              <a:t>SimpleBenchmarker</a:t>
+            </a:r>
+            <a:r>
+              <a:rPr lang="en-US" baseline="0" dirty="0" smtClean="0"/>
+              <a:t> demo.</a:t>
             </a:r>
             <a:endParaRPr lang="en-US" dirty="0"/>
           </a:p>
@@ -8273,7 +7576,7 @@
           <a:p>
             <a:fld id="{CFAD290B-5269-4E99-8A8A-8691B1EB0AE9}" type="slidenum">
               <a:rPr lang="en-US" smtClean="0"/>
-              <a:t>34</a:t>
+              <a:t>33</a:t>
             </a:fld>
             <a:endParaRPr lang="en-US"/>
           </a:p>
@@ -8282,7 +7585,7 @@
     </p:spTree>
     <p:extLst>
       <p:ext uri="{BB962C8B-B14F-4D97-AF65-F5344CB8AC3E}">
-        <p14:creationId xmlns:p14="http://schemas.microsoft.com/office/powerpoint/2010/main" val="89694323"/>
+        <p14:creationId xmlns:p14="http://schemas.microsoft.com/office/powerpoint/2010/main" val="1954616917"/>
       </p:ext>
     </p:extLst>
   </p:cSld>
@@ -8338,7 +7641,16 @@
           <a:p>
             <a:r>
               <a:rPr lang="en-US" dirty="0" smtClean="0"/>
-              <a:t>You can give the JIT a hint how to use any method in your test program. By “any method” I mean any method – not just those annotated by @Benchmark. </a:t>
+              <a:t>By default JHM forks a new java process for each trial (set of iterations). This is required to defend the test from previously collected “profiles” – information about other loaded classes and their execution information. For example, if you have 2 classes implementing the same interface and test the performance of both of them, then the first implementation (in order of testing) is likely to be faster than the second one (in the same JVM), because JIT replaces direct method calls to the first implementation with interface method calls after discovering the second implementation. </a:t>
+            </a:r>
+          </a:p>
+          <a:p>
+            <a:endParaRPr lang="en-US" dirty="0" smtClean="0"/>
+          </a:p>
+          <a:p>
+            <a:r>
+              <a:rPr lang="en-US" dirty="0" smtClean="0"/>
+              <a:t>One class per method = similar to how Junit works.</a:t>
             </a:r>
             <a:endParaRPr lang="en-US" dirty="0"/>
           </a:p>
@@ -8361,7 +7673,7 @@
           <a:p>
             <a:fld id="{CFAD290B-5269-4E99-8A8A-8691B1EB0AE9}" type="slidenum">
               <a:rPr lang="en-US" smtClean="0"/>
-              <a:t>37</a:t>
+              <a:t>34</a:t>
             </a:fld>
             <a:endParaRPr lang="en-US"/>
           </a:p>
@@ -8370,7 +7682,7 @@
     </p:spTree>
     <p:extLst>
       <p:ext uri="{BB962C8B-B14F-4D97-AF65-F5344CB8AC3E}">
-        <p14:creationId xmlns:p14="http://schemas.microsoft.com/office/powerpoint/2010/main" val="3644895917"/>
+        <p14:creationId xmlns:p14="http://schemas.microsoft.com/office/powerpoint/2010/main" val="89694323"/>
       </p:ext>
     </p:extLst>
   </p:cSld>
@@ -8424,30 +7736,7 @@
           <a:bodyPr/>
           <a:lstStyle/>
           <a:p>
-            <a:pPr marL="0" marR="0" indent="0" algn="l" defTabSz="914400" rtl="0" eaLnBrk="1" fontAlgn="auto" latinLnBrk="0" hangingPunct="1">
-              <a:lnSpc>
-                <a:spcPct val="100000"/>
-              </a:lnSpc>
-              <a:spcBef>
-                <a:spcPts val="0"/>
-              </a:spcBef>
-              <a:spcAft>
-                <a:spcPts val="0"/>
-              </a:spcAft>
-              <a:buClrTx/>
-              <a:buSzTx/>
-              <a:buFontTx/>
-              <a:buNone/>
-              <a:tabLst/>
-              <a:defRPr/>
-            </a:pPr>
-            <a:r>
-              <a:rPr lang="en-US" b="0" dirty="0" smtClean="0"/>
-              <a:t>JIT is too smart and often does magic tricks with loops. Test the actual calculation and let JMH to take care of the rest.</a:t>
-            </a:r>
-          </a:p>
-          <a:p>
-            <a:endParaRPr lang="en-US" dirty="0"/>
+            <a:endParaRPr lang="en-US"/>
           </a:p>
         </p:txBody>
       </p:sp>
@@ -8468,7 +7757,7 @@
           <a:p>
             <a:fld id="{CFAD290B-5269-4E99-8A8A-8691B1EB0AE9}" type="slidenum">
               <a:rPr lang="en-US" smtClean="0"/>
-              <a:t>39</a:t>
+              <a:t>35</a:t>
             </a:fld>
             <a:endParaRPr lang="en-US"/>
           </a:p>
@@ -8477,7 +7766,7 @@
     </p:spTree>
     <p:extLst>
       <p:ext uri="{BB962C8B-B14F-4D97-AF65-F5344CB8AC3E}">
-        <p14:creationId xmlns:p14="http://schemas.microsoft.com/office/powerpoint/2010/main" val="731637426"/>
+        <p14:creationId xmlns:p14="http://schemas.microsoft.com/office/powerpoint/2010/main" val="1154119128"/>
       </p:ext>
     </p:extLst>
   </p:cSld>
@@ -8531,7 +7820,7 @@
           <a:bodyPr/>
           <a:lstStyle/>
           <a:p>
-            <a:endParaRPr lang="en-US" dirty="0"/>
+            <a:endParaRPr lang="en-US"/>
           </a:p>
         </p:txBody>
       </p:sp>
@@ -8552,7 +7841,7 @@
           <a:p>
             <a:fld id="{CFAD290B-5269-4E99-8A8A-8691B1EB0AE9}" type="slidenum">
               <a:rPr lang="en-US" smtClean="0"/>
-              <a:t>41</a:t>
+              <a:t>36</a:t>
             </a:fld>
             <a:endParaRPr lang="en-US"/>
           </a:p>
@@ -8561,7 +7850,7 @@
     </p:spTree>
     <p:extLst>
       <p:ext uri="{BB962C8B-B14F-4D97-AF65-F5344CB8AC3E}">
-        <p14:creationId xmlns:p14="http://schemas.microsoft.com/office/powerpoint/2010/main" val="2357033445"/>
+        <p14:creationId xmlns:p14="http://schemas.microsoft.com/office/powerpoint/2010/main" val="2786664103"/>
       </p:ext>
     </p:extLst>
   </p:cSld>
@@ -8615,6 +7904,10 @@
           <a:bodyPr/>
           <a:lstStyle/>
           <a:p>
+            <a:r>
+              <a:rPr lang="en-US" dirty="0" smtClean="0"/>
+              <a:t>You can give the JIT a hint how to use any method in your test program. By “any method” I mean any method – not just those annotated by @Benchmark. </a:t>
+            </a:r>
             <a:endParaRPr lang="en-US" dirty="0"/>
           </a:p>
         </p:txBody>
@@ -8636,7 +7929,7 @@
           <a:p>
             <a:fld id="{CFAD290B-5269-4E99-8A8A-8691B1EB0AE9}" type="slidenum">
               <a:rPr lang="en-US" smtClean="0"/>
-              <a:t>43</a:t>
+              <a:t>37</a:t>
             </a:fld>
             <a:endParaRPr lang="en-US"/>
           </a:p>
@@ -8645,7 +7938,7 @@
     </p:spTree>
     <p:extLst>
       <p:ext uri="{BB962C8B-B14F-4D97-AF65-F5344CB8AC3E}">
-        <p14:creationId xmlns:p14="http://schemas.microsoft.com/office/powerpoint/2010/main" val="1887771390"/>
+        <p14:creationId xmlns:p14="http://schemas.microsoft.com/office/powerpoint/2010/main" val="3644895917"/>
       </p:ext>
     </p:extLst>
   </p:cSld>
@@ -8699,7 +7992,7 @@
           <a:bodyPr/>
           <a:lstStyle/>
           <a:p>
-            <a:endParaRPr lang="en-US" dirty="0"/>
+            <a:endParaRPr lang="en-US"/>
           </a:p>
         </p:txBody>
       </p:sp>
@@ -8720,7 +8013,7 @@
           <a:p>
             <a:fld id="{CFAD290B-5269-4E99-8A8A-8691B1EB0AE9}" type="slidenum">
               <a:rPr lang="en-US" smtClean="0"/>
-              <a:t>45</a:t>
+              <a:t>38</a:t>
             </a:fld>
             <a:endParaRPr lang="en-US"/>
           </a:p>
@@ -8729,7 +8022,111 @@
     </p:spTree>
     <p:extLst>
       <p:ext uri="{BB962C8B-B14F-4D97-AF65-F5344CB8AC3E}">
-        <p14:creationId xmlns:p14="http://schemas.microsoft.com/office/powerpoint/2010/main" val="4285779939"/>
+        <p14:creationId xmlns:p14="http://schemas.microsoft.com/office/powerpoint/2010/main" val="1047742374"/>
+      </p:ext>
+    </p:extLst>
+  </p:cSld>
+  <p:clrMapOvr>
+    <a:masterClrMapping/>
+  </p:clrMapOvr>
+</p:notes>
+</file>
+
+<file path=ppt/notesSlides/notesSlide39.xml><?xml version="1.0" encoding="utf-8"?>
+<p:notes xmlns:a="http://schemas.openxmlformats.org/drawingml/2006/main" xmlns:r="http://schemas.openxmlformats.org/officeDocument/2006/relationships" xmlns:p="http://schemas.openxmlformats.org/presentationml/2006/main">
+  <p:cSld>
+    <p:spTree>
+      <p:nvGrpSpPr>
+        <p:cNvPr id="1" name=""/>
+        <p:cNvGrpSpPr/>
+        <p:nvPr/>
+      </p:nvGrpSpPr>
+      <p:grpSpPr>
+        <a:xfrm>
+          <a:off x="0" y="0"/>
+          <a:ext cx="0" cy="0"/>
+          <a:chOff x="0" y="0"/>
+          <a:chExt cx="0" cy="0"/>
+        </a:xfrm>
+      </p:grpSpPr>
+      <p:sp>
+        <p:nvSpPr>
+          <p:cNvPr id="2" name="Slide Image Placeholder 1"/>
+          <p:cNvSpPr>
+            <a:spLocks noGrp="1" noRot="1" noChangeAspect="1"/>
+          </p:cNvSpPr>
+          <p:nvPr>
+            <p:ph type="sldImg"/>
+          </p:nvPr>
+        </p:nvSpPr>
+        <p:spPr/>
+      </p:sp>
+      <p:sp>
+        <p:nvSpPr>
+          <p:cNvPr id="3" name="Notes Placeholder 2"/>
+          <p:cNvSpPr>
+            <a:spLocks noGrp="1"/>
+          </p:cNvSpPr>
+          <p:nvPr>
+            <p:ph type="body" idx="1"/>
+          </p:nvPr>
+        </p:nvSpPr>
+        <p:spPr/>
+        <p:txBody>
+          <a:bodyPr/>
+          <a:lstStyle/>
+          <a:p>
+            <a:pPr defTabSz="966612">
+              <a:defRPr/>
+            </a:pPr>
+            <a:r>
+              <a:rPr lang="en-US" b="0" dirty="0" smtClean="0"/>
+              <a:t>JIT is too smart and often does magic tricks with loops. Test the actual calculation and let JMH to take care of the rest.</a:t>
+            </a:r>
+          </a:p>
+          <a:p>
+            <a:endParaRPr lang="en-US" dirty="0" smtClean="0"/>
+          </a:p>
+          <a:p>
+            <a:r>
+              <a:rPr lang="en-US" dirty="0" smtClean="0"/>
+              <a:t>Annotations exist to</a:t>
+            </a:r>
+            <a:r>
+              <a:rPr lang="en-US" baseline="0" dirty="0" smtClean="0"/>
+              <a:t> tell JMH to loop code within @Benchmark methods.</a:t>
+            </a:r>
+            <a:endParaRPr lang="en-US" dirty="0"/>
+          </a:p>
+        </p:txBody>
+      </p:sp>
+      <p:sp>
+        <p:nvSpPr>
+          <p:cNvPr id="4" name="Slide Number Placeholder 3"/>
+          <p:cNvSpPr>
+            <a:spLocks noGrp="1"/>
+          </p:cNvSpPr>
+          <p:nvPr>
+            <p:ph type="sldNum" sz="quarter" idx="10"/>
+          </p:nvPr>
+        </p:nvSpPr>
+        <p:spPr/>
+        <p:txBody>
+          <a:bodyPr/>
+          <a:lstStyle/>
+          <a:p>
+            <a:fld id="{CFAD290B-5269-4E99-8A8A-8691B1EB0AE9}" type="slidenum">
+              <a:rPr lang="en-US" smtClean="0"/>
+              <a:t>39</a:t>
+            </a:fld>
+            <a:endParaRPr lang="en-US"/>
+          </a:p>
+        </p:txBody>
+      </p:sp>
+    </p:spTree>
+    <p:extLst>
+      <p:ext uri="{BB962C8B-B14F-4D97-AF65-F5344CB8AC3E}">
+        <p14:creationId xmlns:p14="http://schemas.microsoft.com/office/powerpoint/2010/main" val="731637426"/>
       </p:ext>
     </p:extLst>
   </p:cSld>
@@ -8969,445 +8366,6 @@
               <a:t>http://stackoverflow.com/questions/504103/how-do-i-write-a-correct-micro-benchmark-in-java#comment8131770_513259 </a:t>
             </a:r>
           </a:p>
-          <a:p>
-            <a:endParaRPr lang="en-US" dirty="0" smtClean="0"/>
-          </a:p>
-          <a:p>
-            <a:r>
-              <a:rPr lang="en-US" dirty="0" smtClean="0"/>
-              <a:t>Mitigating the Errors of Stopwatch bench marking</a:t>
-            </a:r>
-            <a:br>
-              <a:rPr lang="en-US" dirty="0" smtClean="0"/>
-            </a:br>
-            <a:endParaRPr lang="en-US" dirty="0" smtClean="0"/>
-          </a:p>
-          <a:p>
-            <a:pPr lvl="1"/>
-            <a:r>
-              <a:rPr lang="en-US" dirty="0" err="1" smtClean="0">
-                <a:effectLst/>
-              </a:rPr>
-              <a:t>prerunning</a:t>
-            </a:r>
-            <a:r>
-              <a:rPr lang="en-US" dirty="0" smtClean="0">
-                <a:effectLst/>
-              </a:rPr>
-              <a:t> the tested code to mitigate "warm-up" effects</a:t>
-            </a:r>
-          </a:p>
-          <a:p>
-            <a:pPr lvl="2"/>
-            <a:r>
-              <a:rPr lang="en-US" dirty="0" smtClean="0">
-                <a:effectLst/>
-              </a:rPr>
-              <a:t>run a "warm-up" cycle of *the same code*</a:t>
-            </a:r>
-          </a:p>
-          <a:p>
-            <a:pPr lvl="2"/>
-            <a:r>
-              <a:rPr lang="en-US" dirty="0" smtClean="0">
-                <a:effectLst/>
-              </a:rPr>
-              <a:t>don't load new classes out of the warn-up phase</a:t>
-            </a:r>
-          </a:p>
-          <a:p>
-            <a:pPr lvl="1"/>
-            <a:r>
-              <a:rPr lang="en-US" dirty="0" smtClean="0">
-                <a:effectLst/>
-              </a:rPr>
-              <a:t>long runs minimize error percentage</a:t>
-            </a:r>
-          </a:p>
-          <a:p>
-            <a:pPr lvl="2"/>
-            <a:r>
-              <a:rPr lang="en-US" dirty="0" smtClean="0">
-                <a:effectLst/>
-              </a:rPr>
-              <a:t>Make sure you run it for long enough to be able to measure the results in seconds or (better) tens of seconds</a:t>
-            </a:r>
-          </a:p>
-          <a:p>
-            <a:pPr lvl="1"/>
-            <a:r>
-              <a:rPr lang="en-US" dirty="0" smtClean="0">
-                <a:effectLst/>
-              </a:rPr>
-              <a:t>many runs minimize error percentage</a:t>
-            </a:r>
-          </a:p>
-          <a:p>
-            <a:pPr lvl="2"/>
-            <a:r>
-              <a:rPr lang="en-US" dirty="0" smtClean="0">
-                <a:effectLst/>
-              </a:rPr>
-              <a:t>Timing a single lap versus averaging over multiple laps</a:t>
-            </a:r>
-          </a:p>
-          <a:p>
-            <a:pPr lvl="2"/>
-            <a:r>
-              <a:rPr lang="en-US" dirty="0" smtClean="0">
-                <a:effectLst/>
-              </a:rPr>
-              <a:t>At least be aware when the GC or JIT are affecting your code:</a:t>
-            </a:r>
-          </a:p>
-          <a:p>
-            <a:pPr lvl="2"/>
-            <a:r>
-              <a:rPr lang="en-US" dirty="0" smtClean="0">
-                <a:effectLst/>
-              </a:rPr>
-              <a:t>-XX:+</a:t>
-            </a:r>
-            <a:r>
-              <a:rPr lang="en-US" dirty="0" err="1" smtClean="0">
-                <a:effectLst/>
-              </a:rPr>
-              <a:t>PrintCompilation</a:t>
-            </a:r>
-            <a:r>
-              <a:rPr lang="en-US" dirty="0" smtClean="0">
-                <a:effectLst/>
-              </a:rPr>
-              <a:t>, -</a:t>
-            </a:r>
-            <a:r>
-              <a:rPr lang="en-US" dirty="0" err="1" smtClean="0">
-                <a:effectLst/>
-              </a:rPr>
-              <a:t>verbose:gc</a:t>
-            </a:r>
-            <a:r>
-              <a:rPr lang="en-US" dirty="0" smtClean="0">
-                <a:effectLst/>
-              </a:rPr>
-              <a:t>     </a:t>
-            </a:r>
-            <a:br>
-              <a:rPr lang="en-US" dirty="0" smtClean="0">
-                <a:effectLst/>
-              </a:rPr>
-            </a:br>
-            <a:endParaRPr lang="en-US" dirty="0" smtClean="0">
-              <a:effectLst/>
-            </a:endParaRPr>
-          </a:p>
-          <a:p>
-            <a:pPr lvl="1"/>
-            <a:r>
-              <a:rPr lang="en-US" sz="1200" kern="1200" dirty="0" err="1" smtClean="0">
-                <a:solidFill>
-                  <a:schemeClr val="tx1"/>
-                </a:solidFill>
-                <a:effectLst/>
-                <a:latin typeface="+mn-lt"/>
-                <a:ea typeface="+mn-ea"/>
-                <a:cs typeface="+mn-cs"/>
-              </a:rPr>
-              <a:t>Deoptimization</a:t>
-            </a:r>
-            <a:r>
-              <a:rPr lang="en-US" sz="1200" kern="1200" dirty="0" smtClean="0">
-                <a:solidFill>
-                  <a:schemeClr val="tx1"/>
-                </a:solidFill>
-                <a:effectLst/>
-                <a:latin typeface="+mn-lt"/>
-                <a:ea typeface="+mn-ea"/>
-                <a:cs typeface="+mn-cs"/>
-              </a:rPr>
-              <a:t>/recompilation effects must be mitigated</a:t>
-            </a:r>
-            <a:r>
-              <a:rPr lang="en-US" dirty="0" smtClean="0">
-                <a:effectLst/>
-              </a:rPr>
-              <a:t/>
-            </a:r>
-            <a:br>
-              <a:rPr lang="en-US" dirty="0" smtClean="0">
-                <a:effectLst/>
-              </a:rPr>
-            </a:br>
-            <a:endParaRPr lang="en-US" dirty="0" smtClean="0">
-              <a:effectLst/>
-            </a:endParaRPr>
-          </a:p>
-          <a:p>
-            <a:pPr lvl="2"/>
-            <a:r>
-              <a:rPr lang="en-US" sz="1200" kern="1200" dirty="0" smtClean="0">
-                <a:solidFill>
-                  <a:schemeClr val="tx1"/>
-                </a:solidFill>
-                <a:effectLst/>
-                <a:latin typeface="+mn-lt"/>
-                <a:ea typeface="+mn-ea"/>
-                <a:cs typeface="+mn-cs"/>
-              </a:rPr>
-              <a:t>"Do not take any code path for the first time in the "timing phase"</a:t>
-            </a:r>
-            <a:endParaRPr lang="en-US" dirty="0" smtClean="0">
-              <a:effectLst/>
-            </a:endParaRPr>
-          </a:p>
-          <a:p>
-            <a:pPr lvl="2"/>
-            <a:r>
-              <a:rPr lang="en-US" sz="1200" kern="1200" dirty="0" err="1" smtClean="0">
-                <a:solidFill>
-                  <a:schemeClr val="tx1"/>
-                </a:solidFill>
-                <a:effectLst/>
-                <a:latin typeface="+mn-lt"/>
-                <a:ea typeface="+mn-ea"/>
-                <a:cs typeface="+mn-cs"/>
-              </a:rPr>
-              <a:t>compilier</a:t>
-            </a:r>
-            <a:r>
-              <a:rPr lang="en-US" sz="1200" kern="1200" dirty="0" smtClean="0">
-                <a:solidFill>
-                  <a:schemeClr val="tx1"/>
-                </a:solidFill>
-                <a:effectLst/>
-                <a:latin typeface="+mn-lt"/>
-                <a:ea typeface="+mn-ea"/>
-                <a:cs typeface="+mn-cs"/>
-              </a:rPr>
-              <a:t> might "optimistically" assume a path will never/rarely be taken and anti-optimize it</a:t>
-            </a:r>
-            <a:endParaRPr lang="en-US" dirty="0" smtClean="0">
-              <a:effectLst/>
-            </a:endParaRPr>
-          </a:p>
-          <a:p>
-            <a:pPr lvl="1"/>
-            <a:r>
-              <a:rPr lang="en-US" sz="1200" kern="1200" dirty="0" smtClean="0">
-                <a:solidFill>
-                  <a:schemeClr val="tx1"/>
-                </a:solidFill>
-                <a:effectLst/>
-                <a:latin typeface="+mn-lt"/>
-                <a:ea typeface="+mn-ea"/>
-                <a:cs typeface="+mn-cs"/>
-              </a:rPr>
-              <a:t>Use -</a:t>
-            </a:r>
-            <a:r>
-              <a:rPr lang="en-US" sz="1200" kern="1200" dirty="0" err="1" smtClean="0">
-                <a:solidFill>
-                  <a:schemeClr val="tx1"/>
-                </a:solidFill>
-                <a:effectLst/>
-                <a:latin typeface="+mn-lt"/>
-                <a:ea typeface="+mn-ea"/>
-                <a:cs typeface="+mn-cs"/>
-              </a:rPr>
-              <a:t>Xbatch</a:t>
-            </a:r>
-            <a:r>
-              <a:rPr lang="en-US" sz="1200" kern="1200" dirty="0" smtClean="0">
-                <a:solidFill>
-                  <a:schemeClr val="tx1"/>
-                </a:solidFill>
-                <a:effectLst/>
-                <a:latin typeface="+mn-lt"/>
-                <a:ea typeface="+mn-ea"/>
-                <a:cs typeface="+mn-cs"/>
-              </a:rPr>
-              <a:t> to serialize the compiler with the application</a:t>
-            </a:r>
-            <a:br>
-              <a:rPr lang="en-US" sz="1200" kern="1200" dirty="0" smtClean="0">
-                <a:solidFill>
-                  <a:schemeClr val="tx1"/>
-                </a:solidFill>
-                <a:effectLst/>
-                <a:latin typeface="+mn-lt"/>
-                <a:ea typeface="+mn-ea"/>
-                <a:cs typeface="+mn-cs"/>
-              </a:rPr>
-            </a:br>
-            <a:r>
-              <a:rPr lang="en-US" dirty="0" smtClean="0">
-                <a:effectLst/>
-              </a:rPr>
-              <a:t>"Disables background compilation. Typically, the Java VM compiles the method as a background task, running the method in interpreter mode until the background compilation is finished. The -</a:t>
-            </a:r>
-            <a:r>
-              <a:rPr lang="en-US" dirty="0" err="1" smtClean="0">
-                <a:effectLst/>
-              </a:rPr>
-              <a:t>Xbatch</a:t>
-            </a:r>
-            <a:r>
-              <a:rPr lang="en-US" dirty="0" smtClean="0">
-                <a:effectLst/>
-              </a:rPr>
-              <a:t> flag disables background compilation so that compilation of all methods proceeds as a foreground task until completed."</a:t>
-            </a:r>
-          </a:p>
-          <a:p>
-            <a:pPr lvl="2"/>
-            <a:r>
-              <a:rPr lang="en-US" sz="1200" kern="1200" dirty="0" smtClean="0">
-                <a:solidFill>
-                  <a:schemeClr val="tx1"/>
-                </a:solidFill>
-                <a:effectLst/>
-                <a:latin typeface="+mn-lt"/>
-                <a:ea typeface="+mn-ea"/>
-                <a:cs typeface="+mn-cs"/>
-                <a:hlinkClick r:id="rId4"/>
-              </a:rPr>
-              <a:t>http://docs.oracle.com/javase/7/docs/technotes/tools/solaris/java.html</a:t>
-            </a:r>
-            <a:r>
-              <a:rPr lang="en-US" dirty="0" smtClean="0">
-                <a:effectLst/>
-              </a:rPr>
-              <a:t/>
-            </a:r>
-            <a:br>
-              <a:rPr lang="en-US" dirty="0" smtClean="0">
-                <a:effectLst/>
-              </a:rPr>
-            </a:br>
-            <a:endParaRPr lang="en-US" dirty="0" smtClean="0">
-              <a:effectLst/>
-            </a:endParaRPr>
-          </a:p>
-          <a:p>
-            <a:pPr lvl="1"/>
-            <a:r>
-              <a:rPr lang="en-US" sz="1200" kern="1200" dirty="0" smtClean="0">
-                <a:solidFill>
-                  <a:schemeClr val="tx1"/>
-                </a:solidFill>
-                <a:effectLst/>
-                <a:latin typeface="+mn-lt"/>
-                <a:ea typeface="+mn-ea"/>
-                <a:cs typeface="+mn-cs"/>
-              </a:rPr>
-              <a:t>-</a:t>
-            </a:r>
-            <a:r>
-              <a:rPr lang="en-US" sz="1200" kern="1200" dirty="0" err="1" smtClean="0">
-                <a:solidFill>
-                  <a:schemeClr val="tx1"/>
-                </a:solidFill>
-                <a:effectLst/>
-                <a:latin typeface="+mn-lt"/>
-                <a:ea typeface="+mn-ea"/>
-                <a:cs typeface="+mn-cs"/>
-              </a:rPr>
-              <a:t>Xcomp</a:t>
-            </a:r>
-            <a:r>
-              <a:rPr lang="en-US" dirty="0" err="1" smtClean="0">
-                <a:effectLst/>
-              </a:rPr>
-              <a:t>Forces</a:t>
-            </a:r>
-            <a:r>
-              <a:rPr lang="en-US" dirty="0" smtClean="0">
-                <a:effectLst/>
-              </a:rPr>
-              <a:t> compilation of methods on first invocation. By default, the Client VM (-client) performs 1,000 interpreted method invocations and the Server VM (-server) performs 10,000 interpreted method invocations to gather information for efficient compilation. Specifying the -</a:t>
-            </a:r>
-            <a:r>
-              <a:rPr lang="en-US" dirty="0" err="1" smtClean="0">
-                <a:effectLst/>
-              </a:rPr>
-              <a:t>Xcomp</a:t>
-            </a:r>
-            <a:r>
-              <a:rPr lang="en-US" dirty="0" smtClean="0">
-                <a:effectLst/>
-              </a:rPr>
-              <a:t> option disables interpreted method invocations to increase compilation performance at the expense of efficiency.</a:t>
-            </a:r>
-          </a:p>
-          <a:p>
-            <a:pPr lvl="1"/>
-            <a:r>
-              <a:rPr lang="en-US" dirty="0" smtClean="0">
-                <a:effectLst/>
-              </a:rPr>
-              <a:t>You can also change the number of interpreted method invocations before compilation using the -</a:t>
-            </a:r>
-            <a:r>
-              <a:rPr lang="en-US" dirty="0" err="1" smtClean="0">
-                <a:effectLst/>
-              </a:rPr>
-              <a:t>XX:CompileThreshold</a:t>
-            </a:r>
-            <a:r>
-              <a:rPr lang="en-US" dirty="0" smtClean="0">
-                <a:effectLst/>
-              </a:rPr>
-              <a:t> option.</a:t>
-            </a:r>
-          </a:p>
-          <a:p>
-            <a:pPr lvl="2"/>
-            <a:r>
-              <a:rPr lang="en-US" sz="1200" kern="1200" dirty="0" smtClean="0">
-                <a:solidFill>
-                  <a:schemeClr val="tx1"/>
-                </a:solidFill>
-                <a:effectLst/>
-                <a:latin typeface="+mn-lt"/>
-                <a:ea typeface="+mn-ea"/>
-                <a:cs typeface="+mn-cs"/>
-              </a:rPr>
-              <a:t>alternately, setting -</a:t>
-            </a:r>
-            <a:r>
-              <a:rPr lang="en-US" sz="1200" kern="1200" dirty="0" err="1" smtClean="0">
-                <a:solidFill>
-                  <a:schemeClr val="tx1"/>
-                </a:solidFill>
-                <a:effectLst/>
-                <a:latin typeface="+mn-lt"/>
-                <a:ea typeface="+mn-ea"/>
-                <a:cs typeface="+mn-cs"/>
-              </a:rPr>
-              <a:t>XX:CICompilerCount</a:t>
-            </a:r>
-            <a:r>
-              <a:rPr lang="en-US" sz="1200" kern="1200" dirty="0" smtClean="0">
-                <a:solidFill>
-                  <a:schemeClr val="tx1"/>
-                </a:solidFill>
-                <a:effectLst/>
-                <a:latin typeface="+mn-lt"/>
-                <a:ea typeface="+mn-ea"/>
-                <a:cs typeface="+mn-cs"/>
-              </a:rPr>
-              <a:t>=1 to prevent the compiler from running in parallel with itself.</a:t>
-            </a:r>
-            <a:endParaRPr lang="en-US" dirty="0" smtClean="0">
-              <a:effectLst/>
-            </a:endParaRPr>
-          </a:p>
-          <a:p>
-            <a:endParaRPr lang="en-US" dirty="0" smtClean="0"/>
-          </a:p>
-          <a:p>
-            <a:endParaRPr lang="en-US" dirty="0"/>
-          </a:p>
         </p:txBody>
       </p:sp>
       <p:sp>
@@ -9437,6 +8395,510 @@
     <p:extLst>
       <p:ext uri="{BB962C8B-B14F-4D97-AF65-F5344CB8AC3E}">
         <p14:creationId xmlns:p14="http://schemas.microsoft.com/office/powerpoint/2010/main" val="3925167144"/>
+      </p:ext>
+    </p:extLst>
+  </p:cSld>
+  <p:clrMapOvr>
+    <a:masterClrMapping/>
+  </p:clrMapOvr>
+</p:notes>
+</file>
+
+<file path=ppt/notesSlides/notesSlide40.xml><?xml version="1.0" encoding="utf-8"?>
+<p:notes xmlns:a="http://schemas.openxmlformats.org/drawingml/2006/main" xmlns:r="http://schemas.openxmlformats.org/officeDocument/2006/relationships" xmlns:p="http://schemas.openxmlformats.org/presentationml/2006/main">
+  <p:cSld>
+    <p:spTree>
+      <p:nvGrpSpPr>
+        <p:cNvPr id="1" name=""/>
+        <p:cNvGrpSpPr/>
+        <p:nvPr/>
+      </p:nvGrpSpPr>
+      <p:grpSpPr>
+        <a:xfrm>
+          <a:off x="0" y="0"/>
+          <a:ext cx="0" cy="0"/>
+          <a:chOff x="0" y="0"/>
+          <a:chExt cx="0" cy="0"/>
+        </a:xfrm>
+      </p:grpSpPr>
+      <p:sp>
+        <p:nvSpPr>
+          <p:cNvPr id="2" name="Slide Image Placeholder 1"/>
+          <p:cNvSpPr>
+            <a:spLocks noGrp="1" noRot="1" noChangeAspect="1"/>
+          </p:cNvSpPr>
+          <p:nvPr>
+            <p:ph type="sldImg"/>
+          </p:nvPr>
+        </p:nvSpPr>
+        <p:spPr/>
+      </p:sp>
+      <p:sp>
+        <p:nvSpPr>
+          <p:cNvPr id="3" name="Notes Placeholder 2"/>
+          <p:cNvSpPr>
+            <a:spLocks noGrp="1"/>
+          </p:cNvSpPr>
+          <p:nvPr>
+            <p:ph type="body" idx="1"/>
+          </p:nvPr>
+        </p:nvSpPr>
+        <p:spPr/>
+        <p:txBody>
+          <a:bodyPr/>
+          <a:lstStyle/>
+          <a:p>
+            <a:endParaRPr lang="en-US"/>
+          </a:p>
+        </p:txBody>
+      </p:sp>
+      <p:sp>
+        <p:nvSpPr>
+          <p:cNvPr id="4" name="Slide Number Placeholder 3"/>
+          <p:cNvSpPr>
+            <a:spLocks noGrp="1"/>
+          </p:cNvSpPr>
+          <p:nvPr>
+            <p:ph type="sldNum" sz="quarter" idx="10"/>
+          </p:nvPr>
+        </p:nvSpPr>
+        <p:spPr/>
+        <p:txBody>
+          <a:bodyPr/>
+          <a:lstStyle/>
+          <a:p>
+            <a:fld id="{CFAD290B-5269-4E99-8A8A-8691B1EB0AE9}" type="slidenum">
+              <a:rPr lang="en-US" smtClean="0"/>
+              <a:t>40</a:t>
+            </a:fld>
+            <a:endParaRPr lang="en-US"/>
+          </a:p>
+        </p:txBody>
+      </p:sp>
+    </p:spTree>
+    <p:extLst>
+      <p:ext uri="{BB962C8B-B14F-4D97-AF65-F5344CB8AC3E}">
+        <p14:creationId xmlns:p14="http://schemas.microsoft.com/office/powerpoint/2010/main" val="295799458"/>
+      </p:ext>
+    </p:extLst>
+  </p:cSld>
+  <p:clrMapOvr>
+    <a:masterClrMapping/>
+  </p:clrMapOvr>
+</p:notes>
+</file>
+
+<file path=ppt/notesSlides/notesSlide41.xml><?xml version="1.0" encoding="utf-8"?>
+<p:notes xmlns:a="http://schemas.openxmlformats.org/drawingml/2006/main" xmlns:r="http://schemas.openxmlformats.org/officeDocument/2006/relationships" xmlns:p="http://schemas.openxmlformats.org/presentationml/2006/main">
+  <p:cSld>
+    <p:spTree>
+      <p:nvGrpSpPr>
+        <p:cNvPr id="1" name=""/>
+        <p:cNvGrpSpPr/>
+        <p:nvPr/>
+      </p:nvGrpSpPr>
+      <p:grpSpPr>
+        <a:xfrm>
+          <a:off x="0" y="0"/>
+          <a:ext cx="0" cy="0"/>
+          <a:chOff x="0" y="0"/>
+          <a:chExt cx="0" cy="0"/>
+        </a:xfrm>
+      </p:grpSpPr>
+      <p:sp>
+        <p:nvSpPr>
+          <p:cNvPr id="2" name="Slide Image Placeholder 1"/>
+          <p:cNvSpPr>
+            <a:spLocks noGrp="1" noRot="1" noChangeAspect="1"/>
+          </p:cNvSpPr>
+          <p:nvPr>
+            <p:ph type="sldImg"/>
+          </p:nvPr>
+        </p:nvSpPr>
+        <p:spPr/>
+      </p:sp>
+      <p:sp>
+        <p:nvSpPr>
+          <p:cNvPr id="3" name="Notes Placeholder 2"/>
+          <p:cNvSpPr>
+            <a:spLocks noGrp="1"/>
+          </p:cNvSpPr>
+          <p:nvPr>
+            <p:ph type="body" idx="1"/>
+          </p:nvPr>
+        </p:nvSpPr>
+        <p:spPr/>
+        <p:txBody>
+          <a:bodyPr/>
+          <a:lstStyle/>
+          <a:p>
+            <a:endParaRPr lang="en-US" dirty="0"/>
+          </a:p>
+        </p:txBody>
+      </p:sp>
+      <p:sp>
+        <p:nvSpPr>
+          <p:cNvPr id="4" name="Slide Number Placeholder 3"/>
+          <p:cNvSpPr>
+            <a:spLocks noGrp="1"/>
+          </p:cNvSpPr>
+          <p:nvPr>
+            <p:ph type="sldNum" sz="quarter" idx="10"/>
+          </p:nvPr>
+        </p:nvSpPr>
+        <p:spPr/>
+        <p:txBody>
+          <a:bodyPr/>
+          <a:lstStyle/>
+          <a:p>
+            <a:fld id="{CFAD290B-5269-4E99-8A8A-8691B1EB0AE9}" type="slidenum">
+              <a:rPr lang="en-US" smtClean="0"/>
+              <a:t>41</a:t>
+            </a:fld>
+            <a:endParaRPr lang="en-US"/>
+          </a:p>
+        </p:txBody>
+      </p:sp>
+    </p:spTree>
+    <p:extLst>
+      <p:ext uri="{BB962C8B-B14F-4D97-AF65-F5344CB8AC3E}">
+        <p14:creationId xmlns:p14="http://schemas.microsoft.com/office/powerpoint/2010/main" val="2357033445"/>
+      </p:ext>
+    </p:extLst>
+  </p:cSld>
+  <p:clrMapOvr>
+    <a:masterClrMapping/>
+  </p:clrMapOvr>
+</p:notes>
+</file>
+
+<file path=ppt/notesSlides/notesSlide42.xml><?xml version="1.0" encoding="utf-8"?>
+<p:notes xmlns:a="http://schemas.openxmlformats.org/drawingml/2006/main" xmlns:r="http://schemas.openxmlformats.org/officeDocument/2006/relationships" xmlns:p="http://schemas.openxmlformats.org/presentationml/2006/main">
+  <p:cSld>
+    <p:spTree>
+      <p:nvGrpSpPr>
+        <p:cNvPr id="1" name=""/>
+        <p:cNvGrpSpPr/>
+        <p:nvPr/>
+      </p:nvGrpSpPr>
+      <p:grpSpPr>
+        <a:xfrm>
+          <a:off x="0" y="0"/>
+          <a:ext cx="0" cy="0"/>
+          <a:chOff x="0" y="0"/>
+          <a:chExt cx="0" cy="0"/>
+        </a:xfrm>
+      </p:grpSpPr>
+      <p:sp>
+        <p:nvSpPr>
+          <p:cNvPr id="2" name="Slide Image Placeholder 1"/>
+          <p:cNvSpPr>
+            <a:spLocks noGrp="1" noRot="1" noChangeAspect="1"/>
+          </p:cNvSpPr>
+          <p:nvPr>
+            <p:ph type="sldImg"/>
+          </p:nvPr>
+        </p:nvSpPr>
+        <p:spPr/>
+      </p:sp>
+      <p:sp>
+        <p:nvSpPr>
+          <p:cNvPr id="3" name="Notes Placeholder 2"/>
+          <p:cNvSpPr>
+            <a:spLocks noGrp="1"/>
+          </p:cNvSpPr>
+          <p:nvPr>
+            <p:ph type="body" idx="1"/>
+          </p:nvPr>
+        </p:nvSpPr>
+        <p:spPr/>
+        <p:txBody>
+          <a:bodyPr/>
+          <a:lstStyle/>
+          <a:p>
+            <a:endParaRPr lang="en-US"/>
+          </a:p>
+        </p:txBody>
+      </p:sp>
+      <p:sp>
+        <p:nvSpPr>
+          <p:cNvPr id="4" name="Slide Number Placeholder 3"/>
+          <p:cNvSpPr>
+            <a:spLocks noGrp="1"/>
+          </p:cNvSpPr>
+          <p:nvPr>
+            <p:ph type="sldNum" sz="quarter" idx="10"/>
+          </p:nvPr>
+        </p:nvSpPr>
+        <p:spPr/>
+        <p:txBody>
+          <a:bodyPr/>
+          <a:lstStyle/>
+          <a:p>
+            <a:fld id="{CFAD290B-5269-4E99-8A8A-8691B1EB0AE9}" type="slidenum">
+              <a:rPr lang="en-US" smtClean="0"/>
+              <a:t>42</a:t>
+            </a:fld>
+            <a:endParaRPr lang="en-US"/>
+          </a:p>
+        </p:txBody>
+      </p:sp>
+    </p:spTree>
+    <p:extLst>
+      <p:ext uri="{BB962C8B-B14F-4D97-AF65-F5344CB8AC3E}">
+        <p14:creationId xmlns:p14="http://schemas.microsoft.com/office/powerpoint/2010/main" val="2436705079"/>
+      </p:ext>
+    </p:extLst>
+  </p:cSld>
+  <p:clrMapOvr>
+    <a:masterClrMapping/>
+  </p:clrMapOvr>
+</p:notes>
+</file>
+
+<file path=ppt/notesSlides/notesSlide43.xml><?xml version="1.0" encoding="utf-8"?>
+<p:notes xmlns:a="http://schemas.openxmlformats.org/drawingml/2006/main" xmlns:r="http://schemas.openxmlformats.org/officeDocument/2006/relationships" xmlns:p="http://schemas.openxmlformats.org/presentationml/2006/main">
+  <p:cSld>
+    <p:spTree>
+      <p:nvGrpSpPr>
+        <p:cNvPr id="1" name=""/>
+        <p:cNvGrpSpPr/>
+        <p:nvPr/>
+      </p:nvGrpSpPr>
+      <p:grpSpPr>
+        <a:xfrm>
+          <a:off x="0" y="0"/>
+          <a:ext cx="0" cy="0"/>
+          <a:chOff x="0" y="0"/>
+          <a:chExt cx="0" cy="0"/>
+        </a:xfrm>
+      </p:grpSpPr>
+      <p:sp>
+        <p:nvSpPr>
+          <p:cNvPr id="2" name="Slide Image Placeholder 1"/>
+          <p:cNvSpPr>
+            <a:spLocks noGrp="1" noRot="1" noChangeAspect="1"/>
+          </p:cNvSpPr>
+          <p:nvPr>
+            <p:ph type="sldImg"/>
+          </p:nvPr>
+        </p:nvSpPr>
+        <p:spPr/>
+      </p:sp>
+      <p:sp>
+        <p:nvSpPr>
+          <p:cNvPr id="3" name="Notes Placeholder 2"/>
+          <p:cNvSpPr>
+            <a:spLocks noGrp="1"/>
+          </p:cNvSpPr>
+          <p:nvPr>
+            <p:ph type="body" idx="1"/>
+          </p:nvPr>
+        </p:nvSpPr>
+        <p:spPr/>
+        <p:txBody>
+          <a:bodyPr/>
+          <a:lstStyle/>
+          <a:p>
+            <a:endParaRPr lang="en-US" dirty="0"/>
+          </a:p>
+        </p:txBody>
+      </p:sp>
+      <p:sp>
+        <p:nvSpPr>
+          <p:cNvPr id="4" name="Slide Number Placeholder 3"/>
+          <p:cNvSpPr>
+            <a:spLocks noGrp="1"/>
+          </p:cNvSpPr>
+          <p:nvPr>
+            <p:ph type="sldNum" sz="quarter" idx="10"/>
+          </p:nvPr>
+        </p:nvSpPr>
+        <p:spPr/>
+        <p:txBody>
+          <a:bodyPr/>
+          <a:lstStyle/>
+          <a:p>
+            <a:fld id="{CFAD290B-5269-4E99-8A8A-8691B1EB0AE9}" type="slidenum">
+              <a:rPr lang="en-US" smtClean="0"/>
+              <a:t>43</a:t>
+            </a:fld>
+            <a:endParaRPr lang="en-US"/>
+          </a:p>
+        </p:txBody>
+      </p:sp>
+    </p:spTree>
+    <p:extLst>
+      <p:ext uri="{BB962C8B-B14F-4D97-AF65-F5344CB8AC3E}">
+        <p14:creationId xmlns:p14="http://schemas.microsoft.com/office/powerpoint/2010/main" val="1887771390"/>
+      </p:ext>
+    </p:extLst>
+  </p:cSld>
+  <p:clrMapOvr>
+    <a:masterClrMapping/>
+  </p:clrMapOvr>
+</p:notes>
+</file>
+
+<file path=ppt/notesSlides/notesSlide44.xml><?xml version="1.0" encoding="utf-8"?>
+<p:notes xmlns:a="http://schemas.openxmlformats.org/drawingml/2006/main" xmlns:r="http://schemas.openxmlformats.org/officeDocument/2006/relationships" xmlns:p="http://schemas.openxmlformats.org/presentationml/2006/main">
+  <p:cSld>
+    <p:spTree>
+      <p:nvGrpSpPr>
+        <p:cNvPr id="1" name=""/>
+        <p:cNvGrpSpPr/>
+        <p:nvPr/>
+      </p:nvGrpSpPr>
+      <p:grpSpPr>
+        <a:xfrm>
+          <a:off x="0" y="0"/>
+          <a:ext cx="0" cy="0"/>
+          <a:chOff x="0" y="0"/>
+          <a:chExt cx="0" cy="0"/>
+        </a:xfrm>
+      </p:grpSpPr>
+      <p:sp>
+        <p:nvSpPr>
+          <p:cNvPr id="2" name="Slide Image Placeholder 1"/>
+          <p:cNvSpPr>
+            <a:spLocks noGrp="1" noRot="1" noChangeAspect="1"/>
+          </p:cNvSpPr>
+          <p:nvPr>
+            <p:ph type="sldImg"/>
+          </p:nvPr>
+        </p:nvSpPr>
+        <p:spPr/>
+      </p:sp>
+      <p:sp>
+        <p:nvSpPr>
+          <p:cNvPr id="3" name="Notes Placeholder 2"/>
+          <p:cNvSpPr>
+            <a:spLocks noGrp="1"/>
+          </p:cNvSpPr>
+          <p:nvPr>
+            <p:ph type="body" idx="1"/>
+          </p:nvPr>
+        </p:nvSpPr>
+        <p:spPr/>
+        <p:txBody>
+          <a:bodyPr/>
+          <a:lstStyle/>
+          <a:p>
+            <a:endParaRPr lang="en-US" dirty="0"/>
+          </a:p>
+        </p:txBody>
+      </p:sp>
+      <p:sp>
+        <p:nvSpPr>
+          <p:cNvPr id="4" name="Slide Number Placeholder 3"/>
+          <p:cNvSpPr>
+            <a:spLocks noGrp="1"/>
+          </p:cNvSpPr>
+          <p:nvPr>
+            <p:ph type="sldNum" sz="quarter" idx="10"/>
+          </p:nvPr>
+        </p:nvSpPr>
+        <p:spPr/>
+        <p:txBody>
+          <a:bodyPr/>
+          <a:lstStyle/>
+          <a:p>
+            <a:fld id="{CFAD290B-5269-4E99-8A8A-8691B1EB0AE9}" type="slidenum">
+              <a:rPr lang="en-US" smtClean="0"/>
+              <a:t>44</a:t>
+            </a:fld>
+            <a:endParaRPr lang="en-US"/>
+          </a:p>
+        </p:txBody>
+      </p:sp>
+    </p:spTree>
+    <p:extLst>
+      <p:ext uri="{BB962C8B-B14F-4D97-AF65-F5344CB8AC3E}">
+        <p14:creationId xmlns:p14="http://schemas.microsoft.com/office/powerpoint/2010/main" val="3204929844"/>
+      </p:ext>
+    </p:extLst>
+  </p:cSld>
+  <p:clrMapOvr>
+    <a:masterClrMapping/>
+  </p:clrMapOvr>
+</p:notes>
+</file>
+
+<file path=ppt/notesSlides/notesSlide45.xml><?xml version="1.0" encoding="utf-8"?>
+<p:notes xmlns:a="http://schemas.openxmlformats.org/drawingml/2006/main" xmlns:r="http://schemas.openxmlformats.org/officeDocument/2006/relationships" xmlns:p="http://schemas.openxmlformats.org/presentationml/2006/main">
+  <p:cSld>
+    <p:spTree>
+      <p:nvGrpSpPr>
+        <p:cNvPr id="1" name=""/>
+        <p:cNvGrpSpPr/>
+        <p:nvPr/>
+      </p:nvGrpSpPr>
+      <p:grpSpPr>
+        <a:xfrm>
+          <a:off x="0" y="0"/>
+          <a:ext cx="0" cy="0"/>
+          <a:chOff x="0" y="0"/>
+          <a:chExt cx="0" cy="0"/>
+        </a:xfrm>
+      </p:grpSpPr>
+      <p:sp>
+        <p:nvSpPr>
+          <p:cNvPr id="2" name="Slide Image Placeholder 1"/>
+          <p:cNvSpPr>
+            <a:spLocks noGrp="1" noRot="1" noChangeAspect="1"/>
+          </p:cNvSpPr>
+          <p:nvPr>
+            <p:ph type="sldImg"/>
+          </p:nvPr>
+        </p:nvSpPr>
+        <p:spPr/>
+      </p:sp>
+      <p:sp>
+        <p:nvSpPr>
+          <p:cNvPr id="3" name="Notes Placeholder 2"/>
+          <p:cNvSpPr>
+            <a:spLocks noGrp="1"/>
+          </p:cNvSpPr>
+          <p:nvPr>
+            <p:ph type="body" idx="1"/>
+          </p:nvPr>
+        </p:nvSpPr>
+        <p:spPr/>
+        <p:txBody>
+          <a:bodyPr/>
+          <a:lstStyle/>
+          <a:p>
+            <a:endParaRPr lang="en-US" dirty="0"/>
+          </a:p>
+        </p:txBody>
+      </p:sp>
+      <p:sp>
+        <p:nvSpPr>
+          <p:cNvPr id="4" name="Slide Number Placeholder 3"/>
+          <p:cNvSpPr>
+            <a:spLocks noGrp="1"/>
+          </p:cNvSpPr>
+          <p:nvPr>
+            <p:ph type="sldNum" sz="quarter" idx="10"/>
+          </p:nvPr>
+        </p:nvSpPr>
+        <p:spPr/>
+        <p:txBody>
+          <a:bodyPr/>
+          <a:lstStyle/>
+          <a:p>
+            <a:fld id="{CFAD290B-5269-4E99-8A8A-8691B1EB0AE9}" type="slidenum">
+              <a:rPr lang="en-US" smtClean="0"/>
+              <a:t>45</a:t>
+            </a:fld>
+            <a:endParaRPr lang="en-US"/>
+          </a:p>
+        </p:txBody>
+      </p:sp>
+    </p:spTree>
+    <p:extLst>
+      <p:ext uri="{BB962C8B-B14F-4D97-AF65-F5344CB8AC3E}">
+        <p14:creationId xmlns:p14="http://schemas.microsoft.com/office/powerpoint/2010/main" val="4285779939"/>
       </p:ext>
     </p:extLst>
   </p:cSld>
@@ -9491,15 +8953,7 @@
           <a:lstStyle/>
           <a:p>
             <a:r>
-              <a:rPr lang="en-US" sz="1200" kern="1200" dirty="0" smtClean="0">
-                <a:solidFill>
-                  <a:schemeClr val="tx1"/>
-                </a:solidFill>
-                <a:effectLst/>
-                <a:latin typeface="+mn-lt"/>
-                <a:ea typeface="+mn-ea"/>
-                <a:cs typeface="+mn-cs"/>
-              </a:rPr>
+              <a:rPr lang="en-US" sz="1300" dirty="0"/>
               <a:t>JVM is an Adaptive VM</a:t>
             </a:r>
             <a:r>
@@ -9522,23 +8976,7 @@
           <a:p>
             <a:r>
               <a:rPr lang="en-US" dirty="0" smtClean="0"/>
-              <a:t>This </a:t>
-            </a:r>
-            <a:r>
-              <a:rPr lang="en-US" dirty="0" smtClean="0"/>
-              <a:t>happens </a:t>
-            </a:r>
-            <a:r>
-              <a:rPr lang="en-US" dirty="0" smtClean="0"/>
-              <a:t>after </a:t>
-            </a:r>
-            <a:r>
-              <a:rPr lang="en-US" dirty="0" smtClean="0"/>
-              <a:t>a method has been called 10.000 </a:t>
-            </a:r>
-            <a:r>
-              <a:rPr lang="en-US" dirty="0" smtClean="0"/>
-              <a:t>times in server mode</a:t>
+              <a:t>This happens after a method has been called 10.000 times in server mode</a:t>
             </a:r>
             <a:r>
               <a:rPr lang="en-US" baseline="0" dirty="0" smtClean="0"/>
@@ -9546,11 +8984,7 @@
             </a:r>
             <a:r>
               <a:rPr lang="en-US" dirty="0" smtClean="0"/>
-              <a:t> </a:t>
-            </a:r>
-            <a:r>
-              <a:rPr lang="en-US" dirty="0" smtClean="0"/>
-              <a:t>(see an article about </a:t>
+              <a:t> (see an article about </a:t>
             </a:r>
             <a:r>
               <a:rPr lang="en-US" dirty="0" smtClean="0">
@@ -9584,7 +9018,6 @@
               <a:rPr lang="en-US" dirty="0" smtClean="0"/>
               <a:t>). </a:t>
             </a:r>
-            <a:endParaRPr lang="en-US" dirty="0" smtClean="0"/>
           </a:p>
           <a:p>
             <a:endParaRPr lang="en-US" dirty="0" smtClean="0"/>
@@ -9778,248 +9211,220 @@
           <a:bodyPr/>
           <a:lstStyle/>
           <a:p>
-            <a:pPr marL="0" marR="0" indent="0" algn="l" defTabSz="914400" rtl="0" eaLnBrk="1" fontAlgn="auto" latinLnBrk="0" hangingPunct="1">
-              <a:lnSpc>
-                <a:spcPct val="100000"/>
-              </a:lnSpc>
-              <a:spcBef>
-                <a:spcPts val="0"/>
-              </a:spcBef>
-              <a:spcAft>
-                <a:spcPts val="0"/>
-              </a:spcAft>
-              <a:buClrTx/>
-              <a:buSzTx/>
-              <a:buFontTx/>
-              <a:buNone/>
-              <a:tabLst/>
+            <a:pPr defTabSz="966612">
               <a:defRPr/>
             </a:pPr>
             <a:r>
               <a:rPr lang="en-US" dirty="0" smtClean="0"/>
-              <a:t>Run the benchmarked code often enough before the actual measurement starts to ensure that all benchmarked code has been JIT-compiled beforehand. This can easily be verified by providing -XX:+</a:t>
-            </a:r>
-            <a:r>
-              <a:rPr lang="en-US" dirty="0" err="1" smtClean="0"/>
-              <a:t>PrintCompilation</a:t>
-            </a:r>
-            <a:r>
-              <a:rPr lang="en-US" dirty="0" smtClean="0"/>
-              <a:t>. You should not see any JIT-compiler activity after the warmup phase</a:t>
-            </a:r>
-            <a:r>
-              <a:rPr lang="en-US" dirty="0" smtClean="0"/>
-              <a:t>.</a:t>
-            </a:r>
-          </a:p>
-          <a:p>
-            <a:pPr marL="0" marR="0" indent="0" algn="l" defTabSz="914400" rtl="0" eaLnBrk="1" fontAlgn="auto" latinLnBrk="0" hangingPunct="1">
-              <a:lnSpc>
-                <a:spcPct val="100000"/>
-              </a:lnSpc>
-              <a:spcBef>
-                <a:spcPts val="0"/>
-              </a:spcBef>
-              <a:spcAft>
-                <a:spcPts val="0"/>
-              </a:spcAft>
-              <a:buClrTx/>
-              <a:buSzTx/>
-              <a:buFontTx/>
-              <a:buNone/>
-              <a:tabLst/>
+              <a:t>Prevent it from tainting our measurement results</a:t>
+            </a:r>
+            <a:r>
+              <a:rPr lang="en-US" baseline="0" dirty="0" smtClean="0"/>
+              <a:t> – making “slower” </a:t>
+            </a:r>
+            <a:r>
+              <a:rPr lang="en-US" baseline="0" dirty="0" err="1" smtClean="0"/>
+              <a:t>algoritms</a:t>
+            </a:r>
+            <a:r>
+              <a:rPr lang="en-US" baseline="0" dirty="0" smtClean="0"/>
+              <a:t>/code samples look faster.  Want an even playing field for all our code.</a:t>
+            </a:r>
+            <a:endParaRPr lang="en-US" dirty="0" smtClean="0"/>
+          </a:p>
+          <a:p>
+            <a:pPr defTabSz="966612">
               <a:defRPr/>
             </a:pPr>
             <a:endParaRPr lang="en-US" dirty="0" smtClean="0"/>
           </a:p>
           <a:p>
-            <a:r>
-              <a:rPr lang="en-US" dirty="0" smtClean="0"/>
-              <a:t>Keeping testing until run-times stabilize</a:t>
-            </a:r>
-          </a:p>
-          <a:p>
-            <a:r>
-              <a:rPr lang="en-US" dirty="0" smtClean="0"/>
-              <a:t>Not allowing warmup is a common mistake</a:t>
-            </a:r>
-          </a:p>
-          <a:p>
-            <a:r>
-              <a:rPr lang="en-US" dirty="0" smtClean="0"/>
-              <a:t> most desktop/server apps expect:</a:t>
-            </a:r>
-          </a:p>
-          <a:p>
-            <a:r>
-              <a:rPr lang="en-US" dirty="0" smtClean="0"/>
-              <a:t>●Reboots are minutes long and days apart</a:t>
-            </a:r>
-          </a:p>
-          <a:p>
-            <a:r>
-              <a:rPr lang="en-US" dirty="0" smtClean="0"/>
-              <a:t>●Steady-state throughput after warmup is key</a:t>
-            </a:r>
-          </a:p>
-          <a:p>
-            <a:r>
-              <a:rPr lang="en-US" dirty="0" smtClean="0"/>
-              <a:t>●So a benchmark that ends in &lt;10sec</a:t>
-            </a:r>
-          </a:p>
-          <a:p>
-            <a:r>
-              <a:rPr lang="en-US" dirty="0" smtClean="0"/>
-              <a:t>probably does not measure anything interesting</a:t>
-            </a:r>
-          </a:p>
-          <a:p>
-            <a:pPr marL="0" marR="0" indent="0" algn="l" defTabSz="914400" rtl="0" eaLnBrk="1" fontAlgn="auto" latinLnBrk="0" hangingPunct="1">
-              <a:lnSpc>
-                <a:spcPct val="100000"/>
-              </a:lnSpc>
-              <a:spcBef>
-                <a:spcPts val="0"/>
-              </a:spcBef>
-              <a:spcAft>
-                <a:spcPts val="0"/>
-              </a:spcAft>
-              <a:buClrTx/>
-              <a:buSzTx/>
-              <a:buFontTx/>
-              <a:buNone/>
-              <a:tabLst/>
+            <a:pPr defTabSz="966612">
+              <a:defRPr/>
+            </a:pPr>
+            <a:r>
+              <a:rPr lang="en-US" dirty="0" smtClean="0"/>
+              <a:t>Run the benchmarked code often enough before the actual measurement starts to ensure that all benchmarked code has been JIT-compiled beforehand. This can easily be verified by providing -XX:+</a:t>
+            </a:r>
+            <a:r>
+              <a:rPr lang="en-US" dirty="0" err="1" smtClean="0"/>
+              <a:t>PrintCompilation</a:t>
+            </a:r>
+            <a:r>
+              <a:rPr lang="en-US" dirty="0" smtClean="0"/>
+              <a:t>. You should not see any JIT-compiler activity after the warmup phase.</a:t>
+            </a:r>
+          </a:p>
+          <a:p>
+            <a:pPr defTabSz="966612">
               <a:defRPr/>
             </a:pPr>
             <a:endParaRPr lang="en-US" dirty="0" smtClean="0"/>
           </a:p>
           <a:p>
-            <a:pPr marL="0" marR="0" indent="0" algn="l" defTabSz="914400" rtl="0" eaLnBrk="1" fontAlgn="auto" latinLnBrk="0" hangingPunct="1">
-              <a:lnSpc>
-                <a:spcPct val="100000"/>
-              </a:lnSpc>
-              <a:spcBef>
-                <a:spcPts val="0"/>
-              </a:spcBef>
-              <a:spcAft>
-                <a:spcPts val="0"/>
-              </a:spcAft>
-              <a:buClrTx/>
-              <a:buSzTx/>
-              <a:buFontTx/>
-              <a:buNone/>
-              <a:tabLst/>
-              <a:defRPr/>
-            </a:pPr>
+            <a:r>
+              <a:rPr lang="en-US" dirty="0" smtClean="0"/>
+              <a:t>Keeping testing until run-times stabilize</a:t>
+            </a:r>
+          </a:p>
+          <a:p>
+            <a:r>
+              <a:rPr lang="en-US" dirty="0" smtClean="0"/>
+              <a:t>Not allowing warmup is a common mistake</a:t>
+            </a:r>
+          </a:p>
+          <a:p>
+            <a:r>
+              <a:rPr lang="en-US" dirty="0" smtClean="0"/>
+              <a:t> most desktop/server apps expect:</a:t>
+            </a:r>
+          </a:p>
+          <a:p>
+            <a:r>
+              <a:rPr lang="en-US" dirty="0" smtClean="0"/>
+              <a:t>●Reboots are minutes long and days apart</a:t>
+            </a:r>
+          </a:p>
+          <a:p>
+            <a:r>
+              <a:rPr lang="en-US" dirty="0" smtClean="0"/>
+              <a:t>●Steady-state throughput after warmup is key</a:t>
+            </a:r>
+          </a:p>
+          <a:p>
+            <a:r>
+              <a:rPr lang="en-US" dirty="0" smtClean="0"/>
+              <a:t>●So a benchmark that ends in &lt;10sec</a:t>
+            </a:r>
+          </a:p>
+          <a:p>
+            <a:r>
+              <a:rPr lang="en-US" dirty="0" smtClean="0"/>
+              <a:t>probably does not measure anything interesting</a:t>
+            </a:r>
+          </a:p>
+          <a:p>
             <a:endParaRPr lang="en-US" dirty="0" smtClean="0"/>
           </a:p>
           <a:p>
             <a:r>
               <a:rPr lang="en-US" dirty="0" smtClean="0"/>
-              <a:t>GC: Either no (or trivial) allocation, or use</a:t>
-            </a:r>
-          </a:p>
-          <a:p>
-            <a:r>
-              <a:rPr lang="en-US" dirty="0" err="1" smtClean="0"/>
-              <a:t>verbose:gc</a:t>
-            </a:r>
+              <a:t>Mitigating the Errors of Stopwatch bench marking</a:t>
+            </a:r>
+            <a:br>
+              <a:rPr lang="en-US" dirty="0" smtClean="0"/>
+            </a:br>
             <a:endParaRPr lang="en-US" dirty="0" smtClean="0"/>
           </a:p>
           <a:p>
-            <a:r>
-              <a:rPr lang="en-US" dirty="0" smtClean="0"/>
-              <a:t>to make sure you hit steady-state</a:t>
-            </a:r>
-            <a:endParaRPr lang="en-US" dirty="0" smtClean="0"/>
-          </a:p>
-          <a:p>
-            <a:endParaRPr lang="en-US" dirty="0" smtClean="0">
-              <a:effectLst/>
-            </a:endParaRPr>
-          </a:p>
-          <a:p>
-            <a:r>
-              <a:rPr lang="en-US" sz="1200" kern="1200" dirty="0" smtClean="0">
-                <a:solidFill>
-                  <a:schemeClr val="tx1"/>
-                </a:solidFill>
+            <a:pPr lvl="1"/>
+            <a:r>
+              <a:rPr lang="en-US" dirty="0" err="1" smtClean="0">
                 <a:effectLst/>
-                <a:latin typeface="+mn-lt"/>
-                <a:ea typeface="+mn-ea"/>
-                <a:cs typeface="+mn-cs"/>
               </a:rPr>
-              <a:t>Use -</a:t>
-            </a:r>
-            <a:r>
-              <a:rPr lang="en-US" sz="1200" kern="1200" dirty="0" err="1" smtClean="0">
-                <a:solidFill>
-                  <a:schemeClr val="tx1"/>
-                </a:solidFill>
-                <a:effectLst/>
-                <a:latin typeface="+mn-lt"/>
-                <a:ea typeface="+mn-ea"/>
-                <a:cs typeface="+mn-cs"/>
-              </a:rPr>
-              <a:t>Xbatch</a:t>
-            </a:r>
-            <a:r>
-              <a:rPr lang="en-US" sz="1200" kern="1200" dirty="0" smtClean="0">
-                <a:solidFill>
-                  <a:schemeClr val="tx1"/>
-                </a:solidFill>
-                <a:effectLst/>
-                <a:latin typeface="+mn-lt"/>
-                <a:ea typeface="+mn-ea"/>
-                <a:cs typeface="+mn-cs"/>
-              </a:rPr>
-              <a:t> to serialize the compiler with the application</a:t>
-            </a:r>
-            <a:br>
-              <a:rPr lang="en-US" sz="1200" kern="1200" dirty="0" smtClean="0">
-                <a:solidFill>
-                  <a:schemeClr val="tx1"/>
-                </a:solidFill>
-                <a:effectLst/>
-                <a:latin typeface="+mn-lt"/>
-                <a:ea typeface="+mn-ea"/>
-                <a:cs typeface="+mn-cs"/>
-              </a:rPr>
-            </a:br>
-            <a:r>
-              <a:rPr lang="en-US" dirty="0" smtClean="0"/>
-              <a:t>"Disables background compilation. Typically, the Java VM compiles the method as a background task, running the method in interpreter mode until the background compilation is finished. The -</a:t>
-            </a:r>
-            <a:r>
-              <a:rPr lang="en-US" dirty="0" err="1" smtClean="0"/>
-              <a:t>Xbatch</a:t>
-            </a:r>
-            <a:r>
-              <a:rPr lang="en-US" dirty="0" smtClean="0"/>
-              <a:t> flag disables background compilation so that compilation of all methods proceeds as a foreground task until completed."</a:t>
-            </a:r>
-          </a:p>
-          <a:p>
-            <a:pPr lvl="1"/>
-            <a:r>
-              <a:rPr lang="en-US" sz="1200" kern="1200" dirty="0" smtClean="0">
-                <a:solidFill>
-                  <a:schemeClr val="tx1"/>
-                </a:solidFill>
-                <a:effectLst/>
-                <a:latin typeface="+mn-lt"/>
-                <a:ea typeface="+mn-ea"/>
-                <a:cs typeface="+mn-cs"/>
-                <a:hlinkClick r:id="rId3"/>
-              </a:rPr>
-              <a:t>http://docs.oracle.com/javase/7/docs/technotes/tools/solaris/java.html</a:t>
+              <a:t>prerunning</a:t>
             </a:r>
             <a:r>
               <a:rPr lang="en-US" dirty="0" smtClean="0">
                 <a:effectLst/>
               </a:rPr>
-              <a:t/>
+              <a:t> the tested code to mitigate "warm-up" effects</a:t>
+            </a:r>
+          </a:p>
+          <a:p>
+            <a:pPr lvl="2"/>
+            <a:r>
+              <a:rPr lang="en-US" dirty="0" smtClean="0">
+                <a:effectLst/>
+              </a:rPr>
+              <a:t>run a "warm-up" cycle of *the same code*</a:t>
+            </a:r>
+          </a:p>
+          <a:p>
+            <a:pPr lvl="2"/>
+            <a:r>
+              <a:rPr lang="en-US" dirty="0" smtClean="0">
+                <a:effectLst/>
+              </a:rPr>
+              <a:t>don't load new classes out of the warn-up phase</a:t>
+            </a:r>
+          </a:p>
+          <a:p>
+            <a:pPr lvl="1"/>
+            <a:r>
+              <a:rPr lang="en-US" dirty="0" smtClean="0">
+                <a:effectLst/>
+              </a:rPr>
+              <a:t>long runs minimize error percentage</a:t>
+            </a:r>
+          </a:p>
+          <a:p>
+            <a:pPr lvl="2"/>
+            <a:r>
+              <a:rPr lang="en-US" dirty="0" smtClean="0">
+                <a:effectLst/>
+              </a:rPr>
+              <a:t>Make sure you run it for long enough to be able to measure the results in seconds or (better) tens of seconds</a:t>
+            </a:r>
+          </a:p>
+          <a:p>
+            <a:pPr lvl="1"/>
+            <a:r>
+              <a:rPr lang="en-US" dirty="0" smtClean="0">
+                <a:effectLst/>
+              </a:rPr>
+              <a:t>many runs minimize error percentage</a:t>
+            </a:r>
+          </a:p>
+          <a:p>
+            <a:pPr lvl="2"/>
+            <a:r>
+              <a:rPr lang="en-US" dirty="0" smtClean="0">
+                <a:effectLst/>
+              </a:rPr>
+              <a:t>Timing a single lap versus averaging over multiple laps</a:t>
+            </a:r>
+          </a:p>
+          <a:p>
+            <a:pPr lvl="2"/>
+            <a:r>
+              <a:rPr lang="en-US" dirty="0" smtClean="0">
+                <a:effectLst/>
+              </a:rPr>
+              <a:t>At least be aware when the GC or JIT are affecting your code:</a:t>
+            </a:r>
+          </a:p>
+          <a:p>
+            <a:pPr lvl="2"/>
+            <a:r>
+              <a:rPr lang="en-US" dirty="0" smtClean="0">
+                <a:effectLst/>
+              </a:rPr>
+              <a:t>-XX:+</a:t>
+            </a:r>
+            <a:r>
+              <a:rPr lang="en-US" dirty="0" err="1" smtClean="0">
+                <a:effectLst/>
+              </a:rPr>
+              <a:t>PrintCompilation</a:t>
+            </a:r>
+            <a:r>
+              <a:rPr lang="en-US" dirty="0" smtClean="0">
+                <a:effectLst/>
+              </a:rPr>
+              <a:t>, -</a:t>
+            </a:r>
+            <a:r>
+              <a:rPr lang="en-US" dirty="0" err="1" smtClean="0">
+                <a:effectLst/>
+              </a:rPr>
+              <a:t>verbose:gc</a:t>
+            </a:r>
+            <a:r>
+              <a:rPr lang="en-US" dirty="0" smtClean="0">
+                <a:effectLst/>
+              </a:rPr>
+              <a:t>     </a:t>
             </a:r>
             <a:br>
               <a:rPr lang="en-US" dirty="0" smtClean="0">
@@ -10031,28 +9436,141 @@
             </a:endParaRPr>
           </a:p>
           <a:p>
-            <a:r>
-              <a:rPr lang="en-US" sz="1200" kern="1200" dirty="0" smtClean="0">
-                <a:solidFill>
-                  <a:schemeClr val="tx1"/>
-                </a:solidFill>
+            <a:pPr lvl="1"/>
+            <a:r>
+              <a:rPr lang="en-US" sz="1300" dirty="0" err="1" smtClean="0"/>
+              <a:t>Deoptimization</a:t>
+            </a:r>
+            <a:r>
+              <a:rPr lang="en-US" sz="1300" dirty="0" smtClean="0"/>
+              <a:t>/recompilation effects must be mitigated</a:t>
+            </a:r>
+            <a:r>
+              <a:rPr lang="en-US" dirty="0" smtClean="0">
                 <a:effectLst/>
-                <a:latin typeface="+mn-lt"/>
-                <a:ea typeface="+mn-ea"/>
-                <a:cs typeface="+mn-cs"/>
               </a:rPr>
+              <a:t/>
+            </a:r>
+            <a:br>
+              <a:rPr lang="en-US" dirty="0" smtClean="0">
+                <a:effectLst/>
+              </a:rPr>
+            </a:br>
+            <a:endParaRPr lang="en-US" dirty="0" smtClean="0">
+              <a:effectLst/>
+            </a:endParaRPr>
+          </a:p>
+          <a:p>
+            <a:pPr lvl="2"/>
+            <a:r>
+              <a:rPr lang="en-US" sz="1300" dirty="0" smtClean="0"/>
+              <a:t>"Do not take any code path for the first time in the "timing phase"</a:t>
+            </a:r>
+            <a:endParaRPr lang="en-US" dirty="0" smtClean="0">
+              <a:effectLst/>
+            </a:endParaRPr>
+          </a:p>
+          <a:p>
+            <a:pPr lvl="2"/>
+            <a:r>
+              <a:rPr lang="en-US" sz="1300" dirty="0" err="1" smtClean="0"/>
+              <a:t>compilier</a:t>
+            </a:r>
+            <a:r>
+              <a:rPr lang="en-US" sz="1300" dirty="0" smtClean="0"/>
+              <a:t> might "optimistically" assume a path will never/rarely be taken and anti-optimize it</a:t>
+            </a:r>
+            <a:endParaRPr lang="en-US" dirty="0" smtClean="0"/>
+          </a:p>
+          <a:p>
+            <a:pPr defTabSz="966612">
+              <a:defRPr/>
+            </a:pPr>
+            <a:endParaRPr lang="en-US" dirty="0" smtClean="0"/>
+          </a:p>
+          <a:p>
+            <a:r>
+              <a:rPr lang="en-US" dirty="0" smtClean="0"/>
+              <a:t>GC: Either no (or trivial) allocation, or use</a:t>
+            </a:r>
+          </a:p>
+          <a:p>
+            <a:r>
+              <a:rPr lang="en-US" dirty="0" err="1" smtClean="0"/>
+              <a:t>verbose:gc</a:t>
+            </a:r>
+            <a:endParaRPr lang="en-US" dirty="0" smtClean="0"/>
+          </a:p>
+          <a:p>
+            <a:r>
+              <a:rPr lang="en-US" dirty="0" smtClean="0"/>
+              <a:t>to make sure you hit steady-state</a:t>
+            </a:r>
+          </a:p>
+          <a:p>
+            <a:endParaRPr lang="en-US" dirty="0" smtClean="0">
+              <a:effectLst/>
+            </a:endParaRPr>
+          </a:p>
+          <a:p>
+            <a:r>
+              <a:rPr lang="en-US" sz="1300" dirty="0"/>
+              <a:t>Use -</a:t>
+            </a:r>
+            <a:r>
+              <a:rPr lang="en-US" sz="1300" dirty="0" err="1"/>
+              <a:t>Xbatch</a:t>
+            </a:r>
+            <a:r>
+              <a:rPr lang="en-US" sz="1300" dirty="0"/>
+              <a:t> to serialize the compiler with the application</a:t>
+            </a:r>
+            <a:br>
+              <a:rPr lang="en-US" sz="1300" dirty="0"/>
+            </a:br>
+            <a:r>
+              <a:rPr lang="en-US" dirty="0" smtClean="0"/>
+              <a:t>"Disables background compilation. Typically, the Java VM compiles the method as a background task, running the method in interpreter mode until the background compilation is finished. The -</a:t>
+            </a:r>
+            <a:r>
+              <a:rPr lang="en-US" dirty="0" err="1" smtClean="0"/>
+              <a:t>Xbatch</a:t>
+            </a:r>
+            <a:r>
+              <a:rPr lang="en-US" dirty="0" smtClean="0"/>
+              <a:t> flag disables background compilation so that compilation of all methods proceeds as a foreground task until completed."</a:t>
+            </a:r>
+          </a:p>
+          <a:p>
+            <a:pPr lvl="1"/>
+            <a:r>
+              <a:rPr lang="en-US" sz="1300" dirty="0">
+                <a:hlinkClick r:id="rId3"/>
+              </a:rPr>
+              <a:t>http://docs.oracle.com/javase/7/docs/technotes/tools/solaris/java.html</a:t>
+            </a:r>
+            <a:r>
+              <a:rPr lang="en-US" dirty="0" smtClean="0">
+                <a:effectLst/>
+              </a:rPr>
+              <a:t/>
+            </a:r>
+            <a:br>
+              <a:rPr lang="en-US" dirty="0" smtClean="0">
+                <a:effectLst/>
+              </a:rPr>
+            </a:br>
+            <a:endParaRPr lang="en-US" dirty="0" smtClean="0">
+              <a:effectLst/>
+            </a:endParaRPr>
+          </a:p>
+          <a:p>
+            <a:r>
+              <a:rPr lang="en-US" sz="1300" dirty="0"/>
               <a:t>-</a:t>
             </a:r>
             <a:r>
-              <a:rPr lang="en-US" sz="1200" kern="1200" dirty="0" err="1" smtClean="0">
-                <a:solidFill>
-                  <a:schemeClr val="tx1"/>
-                </a:solidFill>
-                <a:effectLst/>
-                <a:latin typeface="+mn-lt"/>
-                <a:ea typeface="+mn-ea"/>
-                <a:cs typeface="+mn-cs"/>
-              </a:rPr>
+              <a:rPr lang="en-US" sz="1300" dirty="0" err="1"/>
               <a:t>Xcomp</a:t>
             </a:r>
             <a:r>
@@ -10090,51 +9608,19 @@
             </a:r>
           </a:p>
           <a:p>
-            <a:endParaRPr lang="en-US" sz="1200" kern="1200" dirty="0" smtClean="0">
-              <a:solidFill>
-                <a:schemeClr val="tx1"/>
-              </a:solidFill>
-              <a:effectLst/>
-              <a:latin typeface="+mn-lt"/>
-              <a:ea typeface="+mn-ea"/>
-              <a:cs typeface="+mn-cs"/>
-            </a:endParaRPr>
-          </a:p>
-          <a:p>
-            <a:r>
-              <a:rPr lang="en-US" sz="1200" kern="1200" dirty="0" smtClean="0">
-                <a:solidFill>
-                  <a:schemeClr val="tx1"/>
-                </a:solidFill>
-                <a:effectLst/>
-                <a:latin typeface="+mn-lt"/>
-                <a:ea typeface="+mn-ea"/>
-                <a:cs typeface="+mn-cs"/>
-              </a:rPr>
+            <a:endParaRPr lang="en-US" sz="1300" dirty="0"/>
+          </a:p>
+          <a:p>
+            <a:r>
+              <a:rPr lang="en-US" sz="1300" dirty="0"/>
               <a:t>Alternately, setting -</a:t>
             </a:r>
             <a:r>
-              <a:rPr lang="en-US" sz="1200" kern="1200" dirty="0" err="1" smtClean="0">
-                <a:solidFill>
-                  <a:schemeClr val="tx1"/>
-                </a:solidFill>
-                <a:effectLst/>
-                <a:latin typeface="+mn-lt"/>
-                <a:ea typeface="+mn-ea"/>
-                <a:cs typeface="+mn-cs"/>
-              </a:rPr>
+              <a:rPr lang="en-US" sz="1300" dirty="0" err="1"/>
               <a:t>XX:CICompilerCount</a:t>
             </a:r>
             <a:r>
-              <a:rPr lang="en-US" sz="1200" kern="1200" dirty="0" smtClean="0">
-                <a:solidFill>
-                  <a:schemeClr val="tx1"/>
-                </a:solidFill>
-                <a:effectLst/>
-                <a:latin typeface="+mn-lt"/>
-                <a:ea typeface="+mn-ea"/>
-                <a:cs typeface="+mn-cs"/>
-              </a:rPr>
+              <a:rPr lang="en-US" sz="1300" dirty="0"/>
               <a:t>=1 to prevent the compiler from running in parallel with itself.</a:t>
             </a:r>
             <a:endParaRPr lang="en-US" dirty="0" smtClean="0">
@@ -10226,21 +9712,7 @@
           <a:bodyPr/>
           <a:lstStyle/>
           <a:p>
-            <a:pPr marL="0" marR="0" indent="0" algn="l" defTabSz="914400" rtl="0" eaLnBrk="1" fontAlgn="auto" latinLnBrk="0" hangingPunct="1">
-              <a:lnSpc>
-                <a:spcPct val="100000"/>
-              </a:lnSpc>
-              <a:spcBef>
-                <a:spcPts val="0"/>
-              </a:spcBef>
-              <a:spcAft>
-                <a:spcPts val="0"/>
-              </a:spcAft>
-              <a:buClrTx/>
-              <a:buSzTx/>
-              <a:buFontTx/>
-              <a:buNone/>
-              <a:tabLst/>
+            <a:pPr defTabSz="966612">
               <a:defRPr/>
             </a:pPr>
             <a:r>
@@ -10262,41 +9734,13 @@
             <a:endParaRPr lang="en-US" dirty="0" smtClean="0"/>
           </a:p>
           <a:p>
-            <a:pPr marL="0" marR="0" indent="0" algn="l" defTabSz="914400" rtl="0" eaLnBrk="1" fontAlgn="auto" latinLnBrk="0" hangingPunct="1">
-              <a:lnSpc>
-                <a:spcPct val="100000"/>
-              </a:lnSpc>
-              <a:spcBef>
-                <a:spcPts val="0"/>
-              </a:spcBef>
-              <a:spcAft>
-                <a:spcPts val="0"/>
-              </a:spcAft>
-              <a:buClrTx/>
-              <a:buSzTx/>
-              <a:buFontTx/>
-              <a:buNone/>
-              <a:tabLst/>
+            <a:pPr defTabSz="966612">
               <a:defRPr/>
             </a:pPr>
             <a:endParaRPr lang="en-US" dirty="0" smtClean="0"/>
           </a:p>
           <a:p>
-            <a:pPr marL="0" marR="0" indent="0" algn="l" defTabSz="914400" rtl="0" eaLnBrk="1" fontAlgn="auto" latinLnBrk="0" hangingPunct="1">
-              <a:lnSpc>
-                <a:spcPct val="100000"/>
-              </a:lnSpc>
-              <a:spcBef>
-                <a:spcPts val="0"/>
-              </a:spcBef>
-              <a:spcAft>
-                <a:spcPts val="0"/>
-              </a:spcAft>
-              <a:buClrTx/>
-              <a:buSzTx/>
-              <a:buFontTx/>
-              <a:buNone/>
-              <a:tabLst/>
+            <a:pPr defTabSz="966612">
               <a:defRPr/>
             </a:pPr>
             <a:r>
@@ -10309,41 +9753,13 @@
             </a:r>
           </a:p>
           <a:p>
-            <a:pPr marL="0" marR="0" indent="0" algn="l" defTabSz="914400" rtl="0" eaLnBrk="1" fontAlgn="auto" latinLnBrk="0" hangingPunct="1">
-              <a:lnSpc>
-                <a:spcPct val="100000"/>
-              </a:lnSpc>
-              <a:spcBef>
-                <a:spcPts val="0"/>
-              </a:spcBef>
-              <a:spcAft>
-                <a:spcPts val="0"/>
-              </a:spcAft>
-              <a:buClrTx/>
-              <a:buSzTx/>
-              <a:buFontTx/>
-              <a:buNone/>
-              <a:tabLst/>
+            <a:pPr defTabSz="966612">
               <a:defRPr/>
             </a:pPr>
             <a:endParaRPr lang="en-US" dirty="0" smtClean="0"/>
           </a:p>
           <a:p>
-            <a:pPr marL="0" marR="0" indent="0" algn="l" defTabSz="914400" rtl="0" eaLnBrk="1" fontAlgn="auto" latinLnBrk="0" hangingPunct="1">
-              <a:lnSpc>
-                <a:spcPct val="100000"/>
-              </a:lnSpc>
-              <a:spcBef>
-                <a:spcPts val="0"/>
-              </a:spcBef>
-              <a:spcAft>
-                <a:spcPts val="0"/>
-              </a:spcAft>
-              <a:buClrTx/>
-              <a:buSzTx/>
-              <a:buFontTx/>
-              <a:buNone/>
-              <a:tabLst/>
+            <a:pPr defTabSz="966612">
               <a:defRPr/>
             </a:pPr>
             <a:r>
@@ -10604,7 +10020,7 @@
           <a:p>
             <a:fld id="{389CBC56-3CF8-4B9B-874C-BFFEBE1619EE}" type="datetimeFigureOut">
               <a:rPr lang="en-US" smtClean="0"/>
-              <a:t>2/4/2016</a:t>
+              <a:t>2/5/2016</a:t>
             </a:fld>
             <a:endParaRPr lang="en-US"/>
           </a:p>
@@ -10774,7 +10190,7 @@
           <a:p>
             <a:fld id="{389CBC56-3CF8-4B9B-874C-BFFEBE1619EE}" type="datetimeFigureOut">
               <a:rPr lang="en-US" smtClean="0"/>
-              <a:t>2/4/2016</a:t>
+              <a:t>2/5/2016</a:t>
             </a:fld>
             <a:endParaRPr lang="en-US"/>
           </a:p>
@@ -10954,7 +10370,7 @@
           <a:p>
             <a:fld id="{389CBC56-3CF8-4B9B-874C-BFFEBE1619EE}" type="datetimeFigureOut">
               <a:rPr lang="en-US" smtClean="0"/>
-              <a:t>2/4/2016</a:t>
+              <a:t>2/5/2016</a:t>
             </a:fld>
             <a:endParaRPr lang="en-US"/>
           </a:p>
@@ -11124,7 +10540,7 @@
           <a:p>
             <a:fld id="{389CBC56-3CF8-4B9B-874C-BFFEBE1619EE}" type="datetimeFigureOut">
               <a:rPr lang="en-US" smtClean="0"/>
-              <a:t>2/4/2016</a:t>
+              <a:t>2/5/2016</a:t>
             </a:fld>
             <a:endParaRPr lang="en-US"/>
           </a:p>
@@ -11370,7 +10786,7 @@
           <a:p>
             <a:fld id="{389CBC56-3CF8-4B9B-874C-BFFEBE1619EE}" type="datetimeFigureOut">
               <a:rPr lang="en-US" smtClean="0"/>
-              <a:t>2/4/2016</a:t>
+              <a:t>2/5/2016</a:t>
             </a:fld>
             <a:endParaRPr lang="en-US"/>
           </a:p>
@@ -11602,7 +11018,7 @@
           <a:p>
             <a:fld id="{389CBC56-3CF8-4B9B-874C-BFFEBE1619EE}" type="datetimeFigureOut">
               <a:rPr lang="en-US" smtClean="0"/>
-              <a:t>2/4/2016</a:t>
+              <a:t>2/5/2016</a:t>
             </a:fld>
             <a:endParaRPr lang="en-US"/>
           </a:p>
@@ -11969,7 +11385,7 @@
           <a:p>
             <a:fld id="{389CBC56-3CF8-4B9B-874C-BFFEBE1619EE}" type="datetimeFigureOut">
               <a:rPr lang="en-US" smtClean="0"/>
-              <a:t>2/4/2016</a:t>
+              <a:t>2/5/2016</a:t>
             </a:fld>
             <a:endParaRPr lang="en-US"/>
           </a:p>
@@ -12087,7 +11503,7 @@
           <a:p>
             <a:fld id="{389CBC56-3CF8-4B9B-874C-BFFEBE1619EE}" type="datetimeFigureOut">
               <a:rPr lang="en-US" smtClean="0"/>
-              <a:t>2/4/2016</a:t>
+              <a:t>2/5/2016</a:t>
             </a:fld>
             <a:endParaRPr lang="en-US"/>
           </a:p>
@@ -12182,7 +11598,7 @@
           <a:p>
             <a:fld id="{389CBC56-3CF8-4B9B-874C-BFFEBE1619EE}" type="datetimeFigureOut">
               <a:rPr lang="en-US" smtClean="0"/>
-              <a:t>2/4/2016</a:t>
+              <a:t>2/5/2016</a:t>
             </a:fld>
             <a:endParaRPr lang="en-US"/>
           </a:p>
@@ -12459,7 +11875,7 @@
           <a:p>
             <a:fld id="{389CBC56-3CF8-4B9B-874C-BFFEBE1619EE}" type="datetimeFigureOut">
               <a:rPr lang="en-US" smtClean="0"/>
-              <a:t>2/4/2016</a:t>
+              <a:t>2/5/2016</a:t>
             </a:fld>
             <a:endParaRPr lang="en-US"/>
           </a:p>
@@ -12712,7 +12128,7 @@
           <a:p>
             <a:fld id="{389CBC56-3CF8-4B9B-874C-BFFEBE1619EE}" type="datetimeFigureOut">
               <a:rPr lang="en-US" smtClean="0"/>
-              <a:t>2/4/2016</a:t>
+              <a:t>2/5/2016</a:t>
             </a:fld>
             <a:endParaRPr lang="en-US"/>
           </a:p>
@@ -12925,7 +12341,7 @@
           <a:p>
             <a:fld id="{389CBC56-3CF8-4B9B-874C-BFFEBE1619EE}" type="datetimeFigureOut">
               <a:rPr lang="en-US" smtClean="0"/>
-              <a:t>2/4/2016</a:t>
+              <a:t>2/5/2016</a:t>
             </a:fld>
             <a:endParaRPr lang="en-US"/>
           </a:p>
@@ -13519,7 +12935,7 @@
             </a:r>
             <a:r>
               <a:rPr lang="en-US" dirty="0" err="1" smtClean="0"/>
-              <a:t>Meegamorphic</a:t>
+              <a:t>Megamorphic</a:t>
             </a:r>
             <a:endParaRPr lang="en-US" dirty="0"/>
           </a:p>
@@ -15838,7 +15254,15 @@
           <a:p>
             <a:r>
               <a:rPr lang="en-US" dirty="0" smtClean="0"/>
-              <a:t>Measure the performance a </a:t>
+              <a:t>Measure the </a:t>
+            </a:r>
+            <a:r>
+              <a:rPr lang="en-US" dirty="0" smtClean="0"/>
+              <a:t>performance of </a:t>
+            </a:r>
+            <a:r>
+              <a:rPr lang="en-US" dirty="0" smtClean="0"/>
+              <a:t>a </a:t>
             </a:r>
             <a:r>
               <a:rPr lang="en-US" dirty="0"/>
@@ -16049,8 +15473,116 @@
           <a:p>
             <a:r>
               <a:rPr lang="en-US" dirty="0" smtClean="0"/>
-              <a:t>Must be public</a:t>
-            </a:r>
+              <a:t>Must be </a:t>
+            </a:r>
+            <a:r>
+              <a:rPr lang="en-US" dirty="0" smtClean="0"/>
+              <a:t>public</a:t>
+            </a:r>
+          </a:p>
+          <a:p>
+            <a:r>
+              <a:rPr lang="en-US" dirty="0" smtClean="0"/>
+              <a:t>Contains the “payload” to benchmark</a:t>
+            </a:r>
+          </a:p>
+          <a:p>
+            <a:r>
+              <a:rPr lang="en-US" dirty="0" smtClean="0"/>
+              <a:t>For each @Benchmark method JMH </a:t>
+            </a:r>
+            <a:r>
+              <a:rPr lang="en-US" dirty="0"/>
+              <a:t>will </a:t>
+            </a:r>
+            <a:endParaRPr lang="en-US" dirty="0" smtClean="0"/>
+          </a:p>
+          <a:p>
+            <a:pPr marL="914400" lvl="1" indent="-457200">
+              <a:buFont typeface="+mj-lt"/>
+              <a:buAutoNum type="arabicPeriod"/>
+            </a:pPr>
+            <a:r>
+              <a:rPr lang="en-US" dirty="0" smtClean="0"/>
+              <a:t>produce </a:t>
+            </a:r>
+            <a:r>
+              <a:rPr lang="en-US" dirty="0"/>
+              <a:t>the generated benchmark code for this method during </a:t>
+            </a:r>
+            <a:r>
+              <a:rPr lang="en-US" dirty="0" smtClean="0"/>
+              <a:t>compilation</a:t>
+            </a:r>
+          </a:p>
+          <a:p>
+            <a:pPr marL="914400" lvl="1" indent="-457200">
+              <a:buFont typeface="+mj-lt"/>
+              <a:buAutoNum type="arabicPeriod"/>
+            </a:pPr>
+            <a:r>
+              <a:rPr lang="en-US" dirty="0" smtClean="0"/>
+              <a:t>register </a:t>
+            </a:r>
+            <a:r>
+              <a:rPr lang="en-US" dirty="0"/>
+              <a:t>this method as </a:t>
+            </a:r>
+            <a:r>
+              <a:rPr lang="en-US" dirty="0" smtClean="0"/>
+              <a:t>a benchmark </a:t>
+            </a:r>
+            <a:r>
+              <a:rPr lang="en-US" dirty="0"/>
+              <a:t>in the benchmark </a:t>
+            </a:r>
+            <a:r>
+              <a:rPr lang="en-US" dirty="0" smtClean="0"/>
+              <a:t>list</a:t>
+            </a:r>
+          </a:p>
+          <a:p>
+            <a:pPr marL="914400" lvl="1" indent="-457200">
+              <a:buFont typeface="+mj-lt"/>
+              <a:buAutoNum type="arabicPeriod"/>
+            </a:pPr>
+            <a:r>
+              <a:rPr lang="en-US" dirty="0" smtClean="0"/>
+              <a:t>read </a:t>
+            </a:r>
+            <a:r>
+              <a:rPr lang="en-US" dirty="0"/>
+              <a:t>out the default values from the </a:t>
+            </a:r>
+            <a:r>
+              <a:rPr lang="en-US" dirty="0" smtClean="0"/>
+              <a:t>annotations</a:t>
+            </a:r>
+          </a:p>
+          <a:p>
+            <a:pPr marL="914400" lvl="1" indent="-457200">
+              <a:buFont typeface="+mj-lt"/>
+              <a:buAutoNum type="arabicPeriod"/>
+            </a:pPr>
+            <a:r>
+              <a:rPr lang="en-US" dirty="0" smtClean="0"/>
+              <a:t>prepare </a:t>
+            </a:r>
+            <a:r>
+              <a:rPr lang="en-US" dirty="0"/>
+              <a:t>the environment for the benchmark to </a:t>
+            </a:r>
+            <a:r>
+              <a:rPr lang="en-US" dirty="0" smtClean="0"/>
+              <a:t>run</a:t>
+            </a:r>
+            <a:endParaRPr lang="en-US" dirty="0"/>
+          </a:p>
+          <a:p>
+            <a:endParaRPr lang="en-US" dirty="0" smtClean="0"/>
+          </a:p>
+          <a:p>
+            <a:endParaRPr lang="en-US" dirty="0" smtClean="0"/>
           </a:p>
           <a:p>
             <a:endParaRPr lang="en-US" dirty="0"/>
@@ -16807,19 +16339,7 @@
             </a:r>
             <a:r>
               <a:rPr lang="en-US" dirty="0" smtClean="0"/>
-              <a:t> </a:t>
-            </a:r>
-            <a:r>
-              <a:rPr lang="en-US" dirty="0" smtClean="0"/>
-              <a:t>(</a:t>
-            </a:r>
-            <a:r>
-              <a:rPr lang="en-US" dirty="0" smtClean="0"/>
-              <a:t>demo-basics</a:t>
-            </a:r>
-            <a:r>
-              <a:rPr lang="en-US" dirty="0" smtClean="0"/>
-              <a:t>)</a:t>
+              <a:t> (demo-basics)</a:t>
             </a:r>
             <a:endParaRPr lang="en-US" dirty="0"/>
           </a:p>
@@ -18126,7 +17646,11 @@
           <a:p>
             <a:r>
               <a:rPr lang="en-US" dirty="0" smtClean="0"/>
-              <a:t>JVM “profiles”</a:t>
+              <a:t>JVM maintains class </a:t>
+            </a:r>
+            <a:r>
+              <a:rPr lang="en-US" dirty="0" smtClean="0"/>
+              <a:t>“profiles”</a:t>
             </a:r>
           </a:p>
           <a:p>
@@ -18168,7 +17692,19 @@
             <a:pPr lvl="1"/>
             <a:r>
               <a:rPr lang="en-US" dirty="0" smtClean="0"/>
-              <a:t>Keep usage of each implementation isolated by @Benchmark, everything tested as if mono-</a:t>
+              <a:t>Keep usage of each implementation isolated by @Benchmark, </a:t>
+            </a:r>
+            <a:r>
+              <a:rPr lang="en-US" dirty="0" smtClean="0"/>
+              <a:t>attempt to have everything </a:t>
+            </a:r>
+            <a:r>
+              <a:rPr lang="en-US" dirty="0" smtClean="0"/>
+              <a:t>tested </a:t>
+            </a:r>
+            <a:r>
+              <a:rPr lang="en-US" dirty="0" smtClean="0"/>
+              <a:t>as if mono-</a:t>
             </a:r>
             <a:r>
               <a:rPr lang="en-US" dirty="0" err="1" smtClean="0"/>
@@ -18263,11 +17799,7 @@
             </a:r>
             <a:r>
               <a:rPr lang="en-US" dirty="0" smtClean="0"/>
-              <a:t> </a:t>
-            </a:r>
-            <a:r>
-              <a:rPr lang="en-US" dirty="0" smtClean="0"/>
-              <a:t>(demo-</a:t>
+              <a:t> (demo-</a:t>
             </a:r>
             <a:r>
               <a:rPr lang="en-US" dirty="0" err="1" smtClean="0"/>
@@ -18933,7 +18465,17 @@
           <a:p>
             <a:r>
               <a:rPr lang="en-US" dirty="0" smtClean="0"/>
-              <a:t>Test calculation (single operation) as much as possible</a:t>
+              <a:t>Test calculation (single operation) as much as </a:t>
+            </a:r>
+            <a:r>
+              <a:rPr lang="en-US" dirty="0" smtClean="0"/>
+              <a:t>possible</a:t>
+            </a:r>
+          </a:p>
+          <a:p>
+            <a:r>
+              <a:rPr lang="en-US" dirty="0" smtClean="0"/>
+              <a:t>Other JMH annotations exist for controlling looping within a @Benchmark</a:t>
             </a:r>
             <a:endParaRPr lang="en-US" dirty="0"/>
           </a:p>
@@ -19174,7 +18716,11 @@
           <a:p>
             <a:r>
               <a:rPr lang="en-US" dirty="0" smtClean="0"/>
-              <a:t>Some Interesting Results</a:t>
+              <a:t>Demos - Some Interesting </a:t>
+            </a:r>
+            <a:r>
+              <a:rPr lang="en-US" dirty="0" smtClean="0"/>
+              <a:t>Results (Finally)</a:t>
             </a:r>
             <a:endParaRPr lang="en-US" dirty="0"/>
           </a:p>
@@ -19182,12 +18728,12 @@
       </p:sp>
       <p:sp>
         <p:nvSpPr>
-          <p:cNvPr id="7" name="Content Placeholder 6"/>
-          <p:cNvSpPr>
-            <a:spLocks noGrp="1"/>
-          </p:cNvSpPr>
-          <p:nvPr>
-            <p:ph idx="1"/>
+          <p:cNvPr id="2" name="Text Placeholder 1"/>
+          <p:cNvSpPr>
+            <a:spLocks noGrp="1"/>
+          </p:cNvSpPr>
+          <p:nvPr>
+            <p:ph type="body" idx="1"/>
           </p:nvPr>
         </p:nvSpPr>
         <p:spPr/>
@@ -19195,7 +18741,7 @@
           <a:bodyPr/>
           <a:lstStyle/>
           <a:p>
-            <a:endParaRPr lang="en-US" dirty="0"/>
+            <a:endParaRPr lang="en-US"/>
           </a:p>
         </p:txBody>
       </p:sp>
@@ -19666,8 +19212,13 @@
           <a:p>
             <a:r>
               <a:rPr lang="en-US" dirty="0" smtClean="0"/>
-              <a:t>Don’t worry about giving the computer too much work</a:t>
-            </a:r>
+              <a:t>Don’t worry about giving the computer too much </a:t>
+            </a:r>
+            <a:r>
+              <a:rPr lang="en-US" dirty="0" smtClean="0"/>
+              <a:t>work!</a:t>
+            </a:r>
+            <a:endParaRPr lang="en-US" dirty="0" smtClean="0"/>
           </a:p>
           <a:p>
             <a:pPr lvl="1"/>
@@ -19687,8 +19238,13 @@
             <a:pPr lvl="1"/>
             <a:r>
               <a:rPr lang="en-US" dirty="0" smtClean="0"/>
-              <a:t>Delay the Machine Uprising</a:t>
-            </a:r>
+              <a:t>Delay the Machine </a:t>
+            </a:r>
+            <a:r>
+              <a:rPr lang="en-US" dirty="0" smtClean="0"/>
+              <a:t>Uprising by assigning busywork</a:t>
+            </a:r>
+            <a:endParaRPr lang="en-US" dirty="0" smtClean="0"/>
           </a:p>
           <a:p>
             <a:pPr lvl="1"/>
@@ -19771,8 +19327,12 @@
           <a:lstStyle/>
           <a:p>
             <a:r>
+              <a:rPr lang="en-US" dirty="0" smtClean="0"/>
+              <a:t>JMH </a:t>
+            </a:r>
+            <a:r>
               <a:rPr lang="en-US" dirty="0"/>
-              <a:t> JMH is useful for all sorts of </a:t>
+              <a:t>is useful for all sorts of </a:t>
             </a:r>
             <a:r>
               <a:rPr lang="en-US" dirty="0" err="1"/>
@@ -20040,15 +19600,7 @@
             </a:pPr>
             <a:r>
               <a:rPr lang="en-US" dirty="0" smtClean="0"/>
-              <a:t>(The basis for this </a:t>
-            </a:r>
-            <a:r>
-              <a:rPr lang="en-US" dirty="0" smtClean="0"/>
-              <a:t>presentation</a:t>
-            </a:r>
-            <a:r>
-              <a:rPr lang="en-US" dirty="0" smtClean="0"/>
-              <a:t>)</a:t>
+              <a:t>(The basis for this presentation)</a:t>
             </a:r>
           </a:p>
           <a:p>
@@ -20124,7 +19676,6 @@
               <a:rPr lang="en-US" dirty="0" smtClean="0"/>
               <a:t> most influential resource for putting this together)</a:t>
             </a:r>
-            <a:endParaRPr lang="en-US" dirty="0" smtClean="0"/>
           </a:p>
           <a:p>
             <a:pPr marL="914400" lvl="1" indent="-457200">
@@ -20702,13 +20253,8 @@
           <a:p>
             <a:r>
               <a:rPr lang="en-US" dirty="0" smtClean="0"/>
-              <a:t>Set various arcane JVM flags to be control the </a:t>
-            </a:r>
-            <a:r>
-              <a:rPr lang="en-US" dirty="0" smtClean="0"/>
-              <a:t>JIT compiler</a:t>
-            </a:r>
-            <a:endParaRPr lang="en-US" dirty="0" smtClean="0"/>
+              <a:t>Set various arcane JVM flags to be control the JIT compiler</a:t>
+            </a:r>
           </a:p>
           <a:p>
             <a:pPr lvl="1"/>

</xml_diff>